<commit_message>
updates to the WELCOME pdf file
</commit_message>
<xml_diff>
--- a/vagrant/biobakery-gui/WELCOME.pptx
+++ b/vagrant/biobakery-gui/WELCOME.pptx
@@ -5,16 +5,17 @@
     <p:sldMasterId id="2147483648" r:id="rId1"/>
   </p:sldMasterIdLst>
   <p:notesMasterIdLst>
-    <p:notesMasterId r:id="rId9"/>
+    <p:notesMasterId r:id="rId10"/>
   </p:notesMasterIdLst>
   <p:sldIdLst>
     <p:sldId id="585" r:id="rId2"/>
     <p:sldId id="586" r:id="rId3"/>
     <p:sldId id="587" r:id="rId4"/>
-    <p:sldId id="588" r:id="rId5"/>
-    <p:sldId id="589" r:id="rId6"/>
-    <p:sldId id="590" r:id="rId7"/>
-    <p:sldId id="591" r:id="rId8"/>
+    <p:sldId id="592" r:id="rId5"/>
+    <p:sldId id="588" r:id="rId6"/>
+    <p:sldId id="593" r:id="rId7"/>
+    <p:sldId id="594" r:id="rId8"/>
+    <p:sldId id="595" r:id="rId9"/>
   </p:sldIdLst>
   <p:sldSz cx="9144000" cy="6858000" type="screen4x3"/>
   <p:notesSz cx="6858000" cy="9144000"/>
@@ -4240,21 +4241,24 @@
               </a:rPr>
             </a:br>
             <a:r>
-              <a:rPr lang="en-US" sz="2800" kern="0" dirty="0">
-                <a:latin typeface="Calibri" pitchFamily="34" charset="0"/>
+              <a:rPr lang="en-US" sz="2400" kern="0" dirty="0">
+                <a:latin typeface="Consolas" panose="020B0609020204030204" pitchFamily="49" charset="0"/>
+                <a:cs typeface="Consolas" panose="020B0609020204030204" pitchFamily="49" charset="0"/>
                 <a:hlinkClick r:id="rId2"/>
               </a:rPr>
               <a:t>http://huttenhower.sph.harvard.edu</a:t>
             </a:r>
             <a:r>
-              <a:rPr lang="en-US" sz="2800" kern="0" dirty="0" smtClean="0">
-                <a:latin typeface="Calibri" pitchFamily="34" charset="0"/>
+              <a:rPr lang="en-US" sz="2400" kern="0" dirty="0" smtClean="0">
+                <a:latin typeface="Consolas" panose="020B0609020204030204" pitchFamily="49" charset="0"/>
+                <a:cs typeface="Consolas" panose="020B0609020204030204" pitchFamily="49" charset="0"/>
                 <a:hlinkClick r:id="rId2"/>
               </a:rPr>
               <a:t>/</a:t>
             </a:r>
-            <a:endParaRPr lang="en-US" sz="2800" kern="0" dirty="0" smtClean="0">
-              <a:latin typeface="Calibri" pitchFamily="34" charset="0"/>
+            <a:endParaRPr lang="en-US" sz="2400" kern="0" dirty="0" smtClean="0">
+              <a:latin typeface="Consolas" panose="020B0609020204030204" pitchFamily="49" charset="0"/>
+              <a:cs typeface="Consolas" panose="020B0609020204030204" pitchFamily="49" charset="0"/>
             </a:endParaRPr>
           </a:p>
           <a:p>
@@ -4326,11 +4330,11 @@
   <p:clrMapOvr>
     <a:masterClrMapping/>
   </p:clrMapOvr>
-  <mc:AlternateContent xmlns:mc="http://schemas.openxmlformats.org/markup-compatibility/2006">
-    <mc:Choice xmlns:p14="http://schemas.microsoft.com/office/powerpoint/2010/main" Requires="p14">
+  <mc:AlternateContent xmlns:mc="http://schemas.openxmlformats.org/markup-compatibility/2006" xmlns:p14="http://schemas.microsoft.com/office/powerpoint/2010/main">
+    <mc:Choice Requires="p14">
       <p:transition p14:dur="0"/>
     </mc:Choice>
-    <mc:Fallback>
+    <mc:Fallback xmlns="">
       <p:transition/>
     </mc:Fallback>
   </mc:AlternateContent>
@@ -4760,7 +4764,13 @@
               <a:rPr lang="en-US" sz="2800" kern="0" dirty="0" smtClean="0">
                 <a:latin typeface="Calibri" pitchFamily="34" charset="0"/>
               </a:rPr>
-              <a:t>This tutorial is designed to familiarize you with the </a:t>
+              <a:t>This </a:t>
+            </a:r>
+            <a:r>
+              <a:rPr lang="en-US" sz="2800" kern="0" dirty="0" smtClean="0">
+                <a:latin typeface="Calibri" pitchFamily="34" charset="0"/>
+              </a:rPr>
+              <a:t>document introduces some important details of the </a:t>
             </a:r>
             <a:r>
               <a:rPr lang="en-US" sz="2800" b="1" kern="0" dirty="0" err="1" smtClean="0">
@@ -4775,16 +4785,10 @@
               <a:t> </a:t>
             </a:r>
             <a:r>
-              <a:rPr lang="en-US" sz="2800" i="1" kern="0" dirty="0" smtClean="0">
-                <a:latin typeface="Calibri" pitchFamily="34" charset="0"/>
-              </a:rPr>
-              <a:t>environment</a:t>
-            </a:r>
-            <a:r>
               <a:rPr lang="en-US" sz="2800" kern="0" dirty="0" smtClean="0">
                 <a:latin typeface="Calibri" pitchFamily="34" charset="0"/>
               </a:rPr>
-              <a:t>.</a:t>
+              <a:t>environment.</a:t>
             </a:r>
           </a:p>
           <a:p>
@@ -4814,7 +4818,13 @@
               <a:rPr lang="en-US" sz="2800" kern="0" dirty="0" smtClean="0">
                 <a:latin typeface="Calibri" pitchFamily="34" charset="0"/>
               </a:rPr>
-              <a:t>, please visit:</a:t>
+              <a:t>, please visit</a:t>
+            </a:r>
+            <a:r>
+              <a:rPr lang="en-US" sz="2800" kern="0" dirty="0" smtClean="0">
+                <a:latin typeface="Calibri" pitchFamily="34" charset="0"/>
+              </a:rPr>
+              <a:t>:</a:t>
             </a:r>
             <a:br>
               <a:rPr lang="en-US" sz="2800" kern="0" dirty="0" smtClean="0">
@@ -4823,27 +4833,15 @@
             </a:br>
             <a:r>
               <a:rPr lang="en-US" sz="2400" kern="0" dirty="0" smtClean="0">
-                <a:latin typeface="Calibri" pitchFamily="34" charset="0"/>
+                <a:latin typeface="Consolas" panose="020B0609020204030204" pitchFamily="49" charset="0"/>
+                <a:cs typeface="Consolas" panose="020B0609020204030204" pitchFamily="49" charset="0"/>
                 <a:hlinkClick r:id="rId2"/>
               </a:rPr>
-              <a:t>https</a:t>
-            </a:r>
-            <a:r>
-              <a:rPr lang="en-US" sz="2400" kern="0" dirty="0">
-                <a:latin typeface="Calibri" pitchFamily="34" charset="0"/>
-                <a:hlinkClick r:id="rId2"/>
-              </a:rPr>
-              <a:t>://</a:t>
-            </a:r>
-            <a:r>
-              <a:rPr lang="en-US" sz="2400" kern="0" dirty="0" smtClean="0">
-                <a:latin typeface="Calibri" pitchFamily="34" charset="0"/>
-                <a:hlinkClick r:id="rId2"/>
-              </a:rPr>
-              <a:t>bitbucket.org/timothyltickle/biobakery/wiki/Home</a:t>
+              <a:t>https://bitbucket.org/biobakery/biobakery</a:t>
             </a:r>
             <a:endParaRPr lang="en-US" sz="2400" kern="0" dirty="0" smtClean="0">
-              <a:latin typeface="Calibri" pitchFamily="34" charset="0"/>
+              <a:latin typeface="Consolas" panose="020B0609020204030204" pitchFamily="49" charset="0"/>
+              <a:cs typeface="Consolas" panose="020B0609020204030204" pitchFamily="49" charset="0"/>
             </a:endParaRPr>
           </a:p>
           <a:p>
@@ -4870,27 +4868,15 @@
             </a:br>
             <a:r>
               <a:rPr lang="en-US" sz="2400" kern="0" dirty="0" smtClean="0">
-                <a:latin typeface="Calibri" pitchFamily="34" charset="0"/>
+                <a:latin typeface="Consolas" panose="020B0609020204030204" pitchFamily="49" charset="0"/>
+                <a:cs typeface="Consolas" panose="020B0609020204030204" pitchFamily="49" charset="0"/>
                 <a:hlinkClick r:id="rId3"/>
               </a:rPr>
-              <a:t>http</a:t>
-            </a:r>
-            <a:r>
-              <a:rPr lang="en-US" sz="2400" kern="0" dirty="0">
-                <a:latin typeface="Calibri" pitchFamily="34" charset="0"/>
-                <a:hlinkClick r:id="rId3"/>
-              </a:rPr>
-              <a:t>://</a:t>
-            </a:r>
-            <a:r>
-              <a:rPr lang="en-US" sz="2400" kern="0" dirty="0" smtClean="0">
-                <a:latin typeface="Calibri" pitchFamily="34" charset="0"/>
-                <a:hlinkClick r:id="rId3"/>
-              </a:rPr>
-              <a:t>huttenhower.sph.harvard.edu/biobakery</a:t>
+              <a:t>http://huttenhower.sph.harvard.edu/biobakery</a:t>
             </a:r>
             <a:endParaRPr lang="en-US" sz="2400" kern="0" dirty="0" smtClean="0">
-              <a:latin typeface="Calibri" pitchFamily="34" charset="0"/>
+              <a:latin typeface="Consolas" panose="020B0609020204030204" pitchFamily="49" charset="0"/>
+              <a:cs typeface="Consolas" panose="020B0609020204030204" pitchFamily="49" charset="0"/>
             </a:endParaRPr>
           </a:p>
           <a:p>
@@ -4920,11 +4906,11 @@
   <p:clrMapOvr>
     <a:masterClrMapping/>
   </p:clrMapOvr>
-  <mc:AlternateContent xmlns:mc="http://schemas.openxmlformats.org/markup-compatibility/2006">
-    <mc:Choice xmlns:p14="http://schemas.microsoft.com/office/powerpoint/2010/main" Requires="p14">
+  <mc:AlternateContent xmlns:mc="http://schemas.openxmlformats.org/markup-compatibility/2006" xmlns:p14="http://schemas.microsoft.com/office/powerpoint/2010/main">
+    <mc:Choice Requires="p14">
       <p:transition p14:dur="0"/>
     </mc:Choice>
-    <mc:Fallback>
+    <mc:Fallback xmlns="">
       <p:transition/>
     </mc:Fallback>
   </mc:AlternateContent>
@@ -5153,25 +5139,19 @@
               <a:rPr lang="en-US" sz="3600" b="1" kern="0" dirty="0" smtClean="0">
                 <a:latin typeface="Calibri" pitchFamily="34" charset="0"/>
               </a:rPr>
-              <a:t>Differences between </a:t>
+              <a:t>Differences from standard </a:t>
             </a:r>
             <a:r>
               <a:rPr lang="en-US" sz="3600" b="1" kern="0" dirty="0" err="1" smtClean="0">
                 <a:latin typeface="Calibri" pitchFamily="34" charset="0"/>
               </a:rPr>
-              <a:t>bioBakery</a:t>
+              <a:t>linux</a:t>
             </a:r>
             <a:r>
               <a:rPr lang="en-US" sz="3600" b="1" kern="0" dirty="0" smtClean="0">
                 <a:latin typeface="Calibri" pitchFamily="34" charset="0"/>
               </a:rPr>
-              <a:t> and </a:t>
-            </a:r>
-            <a:r>
-              <a:rPr lang="en-US" sz="3600" b="1" kern="0" dirty="0" err="1" smtClean="0">
-                <a:latin typeface="Calibri" pitchFamily="34" charset="0"/>
-              </a:rPr>
-              <a:t>linux</a:t>
+              <a:t> (1)</a:t>
             </a:r>
             <a:endParaRPr lang="en-US" sz="3600" kern="0" dirty="0">
               <a:latin typeface="Calibri" pitchFamily="34" charset="0"/>
@@ -5429,31 +5409,58 @@
               <a:rPr lang="en-US" sz="2800" kern="0" dirty="0" smtClean="0">
                 <a:latin typeface="Calibri" pitchFamily="34" charset="0"/>
               </a:rPr>
-              <a:t>, typing “</a:t>
-            </a:r>
-            <a:r>
-              <a:rPr lang="en-US" sz="2800" kern="0" dirty="0" err="1" smtClean="0">
-                <a:latin typeface="Calibri" pitchFamily="34" charset="0"/>
+              <a:t>, typing </a:t>
+            </a:r>
+            <a:r>
+              <a:rPr lang="en-US" sz="2800" b="1" kern="0" dirty="0" err="1" smtClean="0">
+                <a:solidFill>
+                  <a:schemeClr val="accent1">
+                    <a:lumMod val="20000"/>
+                    <a:lumOff val="80000"/>
+                  </a:schemeClr>
+                </a:solidFill>
+                <a:latin typeface="Consolas" panose="020B0609020204030204" pitchFamily="49" charset="0"/>
+                <a:cs typeface="Consolas" panose="020B0609020204030204" pitchFamily="49" charset="0"/>
               </a:rPr>
               <a:t>rm</a:t>
             </a:r>
             <a:r>
+              <a:rPr lang="en-US" sz="2800" b="1" kern="0" dirty="0" smtClean="0">
+                <a:solidFill>
+                  <a:schemeClr val="accent1">
+                    <a:lumMod val="20000"/>
+                    <a:lumOff val="80000"/>
+                  </a:schemeClr>
+                </a:solidFill>
+                <a:latin typeface="Consolas" panose="020B0609020204030204" pitchFamily="49" charset="0"/>
+                <a:cs typeface="Consolas" panose="020B0609020204030204" pitchFamily="49" charset="0"/>
+              </a:rPr>
+              <a:t> </a:t>
+            </a:r>
+            <a:r>
+              <a:rPr lang="en-US" sz="2800" b="1" i="1" kern="0" dirty="0" smtClean="0">
+                <a:solidFill>
+                  <a:schemeClr val="accent1">
+                    <a:lumMod val="20000"/>
+                    <a:lumOff val="80000"/>
+                  </a:schemeClr>
+                </a:solidFill>
+                <a:latin typeface="Consolas" panose="020B0609020204030204" pitchFamily="49" charset="0"/>
+                <a:cs typeface="Consolas" panose="020B0609020204030204" pitchFamily="49" charset="0"/>
+              </a:rPr>
+              <a:t>file</a:t>
+            </a:r>
+            <a:r>
               <a:rPr lang="en-US" sz="2800" kern="0" dirty="0" smtClean="0">
                 <a:latin typeface="Calibri" pitchFamily="34" charset="0"/>
               </a:rPr>
               <a:t> </a:t>
             </a:r>
             <a:r>
-              <a:rPr lang="en-US" sz="2800" i="1" kern="0" dirty="0" smtClean="0">
-                <a:latin typeface="Calibri" pitchFamily="34" charset="0"/>
-              </a:rPr>
-              <a:t>file</a:t>
-            </a:r>
-            <a:r>
               <a:rPr lang="en-US" sz="2800" kern="0" dirty="0" smtClean="0">
                 <a:latin typeface="Calibri" pitchFamily="34" charset="0"/>
               </a:rPr>
-              <a:t>” in the command prompt will permanently delete the file; in </a:t>
+              <a:t>in the command prompt will permanently delete the file; in </a:t>
             </a:r>
             <a:r>
               <a:rPr lang="en-US" sz="2800" b="1" kern="0" dirty="0" err="1" smtClean="0">
@@ -5475,33 +5482,58 @@
             <a:r>
               <a:rPr lang="en-US" sz="2800" kern="0" dirty="0" smtClean="0">
                 <a:solidFill>
-                  <a:schemeClr val="accent2">
-                    <a:lumMod val="40000"/>
-                    <a:lumOff val="60000"/>
+                  <a:schemeClr val="tx1">
+                    <a:lumMod val="75000"/>
                   </a:schemeClr>
                 </a:solidFill>
                 <a:latin typeface="Calibri" pitchFamily="34" charset="0"/>
               </a:rPr>
-              <a:t>(Use “</a:t>
-            </a:r>
-            <a:r>
-              <a:rPr lang="en-US" sz="2800" kern="0" dirty="0" err="1" smtClean="0">
-                <a:solidFill>
-                  <a:schemeClr val="accent2">
-                    <a:lumMod val="40000"/>
-                    <a:lumOff val="60000"/>
+              <a:t>(Use </a:t>
+            </a:r>
+            <a:r>
+              <a:rPr lang="en-US" sz="2800" b="1" kern="0" dirty="0" err="1" smtClean="0">
+                <a:solidFill>
+                  <a:schemeClr val="accent1">
+                    <a:lumMod val="20000"/>
+                    <a:lumOff val="80000"/>
                   </a:schemeClr>
                 </a:solidFill>
-                <a:latin typeface="Calibri" pitchFamily="34" charset="0"/>
+                <a:latin typeface="Consolas" panose="020B0609020204030204" pitchFamily="49" charset="0"/>
+                <a:cs typeface="Consolas" panose="020B0609020204030204" pitchFamily="49" charset="0"/>
               </a:rPr>
               <a:t>hardrm</a:t>
             </a:r>
             <a:r>
+              <a:rPr lang="en-US" sz="2800" b="1" kern="0" dirty="0" smtClean="0">
+                <a:solidFill>
+                  <a:schemeClr val="accent1">
+                    <a:lumMod val="20000"/>
+                    <a:lumOff val="80000"/>
+                  </a:schemeClr>
+                </a:solidFill>
+                <a:latin typeface="Consolas" panose="020B0609020204030204" pitchFamily="49" charset="0"/>
+                <a:cs typeface="Consolas" panose="020B0609020204030204" pitchFamily="49" charset="0"/>
+              </a:rPr>
+              <a:t> </a:t>
+            </a:r>
+            <a:r>
+              <a:rPr lang="en-US" sz="2800" b="1" i="1" kern="0" dirty="0" smtClean="0">
+                <a:solidFill>
+                  <a:schemeClr val="accent1">
+                    <a:lumMod val="20000"/>
+                    <a:lumOff val="80000"/>
+                  </a:schemeClr>
+                </a:solidFill>
+                <a:latin typeface="Consolas" panose="020B0609020204030204" pitchFamily="49" charset="0"/>
+                <a:cs typeface="Consolas" panose="020B0609020204030204" pitchFamily="49" charset="0"/>
+              </a:rPr>
+              <a:t>file</a:t>
+            </a:r>
+            <a:r>
               <a:rPr lang="en-US" sz="2800" kern="0" dirty="0" smtClean="0">
                 <a:solidFill>
-                  <a:schemeClr val="accent2">
-                    <a:lumMod val="40000"/>
-                    <a:lumOff val="60000"/>
+                  <a:schemeClr val="tx1">
+                    <a:lumMod val="75000"/>
                   </a:schemeClr>
                 </a:solidFill>
                 <a:latin typeface="Calibri" pitchFamily="34" charset="0"/>
@@ -5509,47 +5541,32 @@
               <a:t> </a:t>
             </a:r>
             <a:r>
-              <a:rPr lang="en-US" sz="2800" i="1" kern="0" dirty="0" smtClean="0">
-                <a:solidFill>
-                  <a:schemeClr val="accent2">
-                    <a:lumMod val="40000"/>
-                    <a:lumOff val="60000"/>
+              <a:rPr lang="en-US" sz="2800" kern="0" dirty="0" smtClean="0">
+                <a:solidFill>
+                  <a:schemeClr val="tx1">
+                    <a:lumMod val="75000"/>
                   </a:schemeClr>
                 </a:solidFill>
                 <a:latin typeface="Calibri" pitchFamily="34" charset="0"/>
               </a:rPr>
-              <a:t>file</a:t>
+              <a:t>to </a:t>
+            </a:r>
+            <a:r>
+              <a:rPr lang="en-US" sz="2800" kern="0" dirty="0">
+                <a:solidFill>
+                  <a:schemeClr val="tx1">
+                    <a:lumMod val="75000"/>
+                  </a:schemeClr>
+                </a:solidFill>
+                <a:latin typeface="Calibri" pitchFamily="34" charset="0"/>
+              </a:rPr>
+              <a:t>delete </a:t>
             </a:r>
             <a:r>
               <a:rPr lang="en-US" sz="2800" kern="0" dirty="0" smtClean="0">
                 <a:solidFill>
-                  <a:schemeClr val="accent2">
-                    <a:lumMod val="40000"/>
-                    <a:lumOff val="60000"/>
-                  </a:schemeClr>
-                </a:solidFill>
-                <a:latin typeface="Calibri" pitchFamily="34" charset="0"/>
-              </a:rPr>
-              <a:t>” to </a:t>
-            </a:r>
-            <a:r>
-              <a:rPr lang="en-US" sz="2800" kern="0" dirty="0">
-                <a:solidFill>
-                  <a:schemeClr val="accent2">
-                    <a:lumMod val="40000"/>
-                    <a:lumOff val="60000"/>
-                  </a:schemeClr>
-                </a:solidFill>
-                <a:latin typeface="Calibri" pitchFamily="34" charset="0"/>
-              </a:rPr>
-              <a:t>delete </a:t>
-            </a:r>
-            <a:r>
-              <a:rPr lang="en-US" sz="2800" kern="0" dirty="0" smtClean="0">
-                <a:solidFill>
-                  <a:schemeClr val="accent2">
-                    <a:lumMod val="40000"/>
-                    <a:lumOff val="60000"/>
+                  <a:schemeClr val="tx1">
+                    <a:lumMod val="75000"/>
                   </a:schemeClr>
                 </a:solidFill>
                 <a:latin typeface="Calibri" pitchFamily="34" charset="0"/>
@@ -5598,20 +5615,40 @@
             <a:r>
               <a:rPr lang="en-US" sz="2800" kern="0" dirty="0" smtClean="0">
                 <a:solidFill>
-                  <a:schemeClr val="accent2">
-                    <a:lumMod val="40000"/>
-                    <a:lumOff val="60000"/>
+                  <a:schemeClr val="tx1">
+                    <a:lumMod val="75000"/>
                   </a:schemeClr>
                 </a:solidFill>
                 <a:latin typeface="Calibri" pitchFamily="34" charset="0"/>
               </a:rPr>
-              <a:t>(E.g. if you attempt to copy a file to a location with an identically named file.)</a:t>
+              <a:t>(E.g. if you attempt to </a:t>
+            </a:r>
+            <a:r>
+              <a:rPr lang="en-US" sz="2800" kern="0" dirty="0" smtClean="0">
+                <a:solidFill>
+                  <a:schemeClr val="tx1">
+                    <a:lumMod val="75000"/>
+                  </a:schemeClr>
+                </a:solidFill>
+                <a:latin typeface="Calibri" pitchFamily="34" charset="0"/>
+              </a:rPr>
+              <a:t>move or copy </a:t>
+            </a:r>
+            <a:r>
+              <a:rPr lang="en-US" sz="2800" kern="0" dirty="0" smtClean="0">
+                <a:solidFill>
+                  <a:schemeClr val="tx1">
+                    <a:lumMod val="75000"/>
+                  </a:schemeClr>
+                </a:solidFill>
+                <a:latin typeface="Calibri" pitchFamily="34" charset="0"/>
+              </a:rPr>
+              <a:t>a file to a location with an identically named file.)</a:t>
             </a:r>
             <a:endParaRPr lang="en-US" sz="2800" kern="0" dirty="0">
               <a:solidFill>
-                <a:schemeClr val="accent2">
-                  <a:lumMod val="40000"/>
-                  <a:lumOff val="60000"/>
+                <a:schemeClr val="tx1">
+                  <a:lumMod val="75000"/>
                 </a:schemeClr>
               </a:solidFill>
               <a:latin typeface="Calibri" pitchFamily="34" charset="0"/>
@@ -5629,11 +5666,11 @@
   <p:clrMapOvr>
     <a:masterClrMapping/>
   </p:clrMapOvr>
-  <mc:AlternateContent xmlns:mc="http://schemas.openxmlformats.org/markup-compatibility/2006">
-    <mc:Choice xmlns:p14="http://schemas.microsoft.com/office/powerpoint/2010/main" Requires="p14">
+  <mc:AlternateContent xmlns:mc="http://schemas.openxmlformats.org/markup-compatibility/2006" xmlns:p14="http://schemas.microsoft.com/office/powerpoint/2010/main">
+    <mc:Choice Requires="p14">
       <p:transition p14:dur="0"/>
     </mc:Choice>
-    <mc:Fallback>
+    <mc:Fallback xmlns="">
       <p:transition/>
     </mc:Fallback>
   </mc:AlternateContent>
@@ -5862,13 +5899,19 @@
               <a:rPr lang="en-US" sz="3600" b="1" kern="0" dirty="0" smtClean="0">
                 <a:latin typeface="Calibri" pitchFamily="34" charset="0"/>
               </a:rPr>
-              <a:t>Sharing files with </a:t>
+              <a:t>Differences from standard </a:t>
             </a:r>
             <a:r>
               <a:rPr lang="en-US" sz="3600" b="1" kern="0" dirty="0" err="1" smtClean="0">
                 <a:latin typeface="Calibri" pitchFamily="34" charset="0"/>
               </a:rPr>
-              <a:t>bioBakery</a:t>
+              <a:t>linux</a:t>
+            </a:r>
+            <a:r>
+              <a:rPr lang="en-US" sz="3600" b="1" kern="0" dirty="0" smtClean="0">
+                <a:latin typeface="Calibri" pitchFamily="34" charset="0"/>
+              </a:rPr>
+              <a:t> (2)</a:t>
             </a:r>
             <a:endParaRPr lang="en-US" sz="3600" kern="0" dirty="0">
               <a:latin typeface="Calibri" pitchFamily="34" charset="0"/>
@@ -6057,31 +6100,51 @@
               <a:rPr lang="en-US" sz="2800" kern="0" dirty="0" smtClean="0">
                 <a:latin typeface="Calibri" pitchFamily="34" charset="0"/>
               </a:rPr>
-              <a:t>The </a:t>
+              <a:t>You can open a file in </a:t>
             </a:r>
             <a:r>
               <a:rPr lang="en-US" sz="2800" kern="0" dirty="0" err="1" smtClean="0">
                 <a:latin typeface="Calibri" pitchFamily="34" charset="0"/>
               </a:rPr>
-              <a:t>VirtualBox</a:t>
+              <a:t>bioBakery</a:t>
             </a:r>
             <a:r>
               <a:rPr lang="en-US" sz="2800" kern="0" dirty="0" smtClean="0">
                 <a:latin typeface="Calibri" pitchFamily="34" charset="0"/>
               </a:rPr>
-              <a:t> app runs </a:t>
-            </a:r>
-            <a:r>
-              <a:rPr lang="en-US" sz="2800" kern="0" dirty="0" err="1" smtClean="0">
-                <a:latin typeface="Calibri" pitchFamily="34" charset="0"/>
-              </a:rPr>
-              <a:t>bioBakery</a:t>
+              <a:t> </a:t>
             </a:r>
             <a:r>
               <a:rPr lang="en-US" sz="2800" kern="0" dirty="0" smtClean="0">
                 <a:latin typeface="Calibri" pitchFamily="34" charset="0"/>
               </a:rPr>
-              <a:t> as a “guest” operating system (OS) within your computer’s primary OS, which we call the “host” OS.</a:t>
+              <a:t>by typing </a:t>
+            </a:r>
+            <a:r>
+              <a:rPr lang="en-US" sz="2800" b="1" kern="0" dirty="0" smtClean="0">
+                <a:solidFill>
+                  <a:schemeClr val="tx2"/>
+                </a:solidFill>
+                <a:latin typeface="Consolas" panose="020B0609020204030204" pitchFamily="49" charset="0"/>
+                <a:cs typeface="Consolas" panose="020B0609020204030204" pitchFamily="49" charset="0"/>
+              </a:rPr>
+              <a:t>open </a:t>
+            </a:r>
+            <a:r>
+              <a:rPr lang="en-US" sz="2800" b="1" i="1" kern="0" dirty="0" smtClean="0">
+                <a:solidFill>
+                  <a:schemeClr val="tx2"/>
+                </a:solidFill>
+                <a:latin typeface="Consolas" panose="020B0609020204030204" pitchFamily="49" charset="0"/>
+                <a:cs typeface="Consolas" panose="020B0609020204030204" pitchFamily="49" charset="0"/>
+              </a:rPr>
+              <a:t>file</a:t>
+            </a:r>
+            <a:r>
+              <a:rPr lang="en-US" sz="2800" kern="0" dirty="0" smtClean="0">
+                <a:latin typeface="Calibri" pitchFamily="34" charset="0"/>
+              </a:rPr>
+              <a:t> at the command prompt; this will open the file in its associated default program.</a:t>
             </a:r>
           </a:p>
           <a:p>
@@ -6114,7 +6177,7 @@
               <a:rPr lang="en-US" sz="2800" kern="0" dirty="0" smtClean="0">
                 <a:latin typeface="Calibri" pitchFamily="34" charset="0"/>
               </a:rPr>
-              <a:t>By default, the guest OS cannot see files on the host OS. However, it is possible to configure folders to be shared between the guest and host.</a:t>
+              <a:t>Right clicking on the desktop, a folder icon, or inside of a folder will give you the option to open a command prompt at that location.</a:t>
             </a:r>
             <a:endParaRPr lang="en-US" sz="2800" kern="0" dirty="0">
               <a:latin typeface="Calibri" pitchFamily="34" charset="0"/>
@@ -6125,18 +6188,18 @@
     </p:spTree>
     <p:extLst>
       <p:ext uri="{BB962C8B-B14F-4D97-AF65-F5344CB8AC3E}">
-        <p14:creationId xmlns:p14="http://schemas.microsoft.com/office/powerpoint/2010/main" val="1730739676"/>
+        <p14:creationId xmlns:p14="http://schemas.microsoft.com/office/powerpoint/2010/main" val="4288614739"/>
       </p:ext>
     </p:extLst>
   </p:cSld>
   <p:clrMapOvr>
     <a:masterClrMapping/>
   </p:clrMapOvr>
-  <mc:AlternateContent xmlns:mc="http://schemas.openxmlformats.org/markup-compatibility/2006">
-    <mc:Choice xmlns:p14="http://schemas.microsoft.com/office/powerpoint/2010/main" Requires="p14">
+  <mc:AlternateContent xmlns:mc="http://schemas.openxmlformats.org/markup-compatibility/2006" xmlns:p14="http://schemas.microsoft.com/office/powerpoint/2010/main">
+    <mc:Choice Requires="p14">
       <p:transition p14:dur="0"/>
     </mc:Choice>
-    <mc:Fallback>
+    <mc:Fallback xmlns="">
       <p:transition/>
     </mc:Fallback>
   </mc:AlternateContent>
@@ -6169,7 +6232,7 @@
       </p:grpSpPr>
       <p:sp>
         <p:nvSpPr>
-          <p:cNvPr id="2" name="Slide Number Placeholder 1"/>
+          <p:cNvPr id="4" name="Slide Number Placeholder 3"/>
           <p:cNvSpPr>
             <a:spLocks noGrp="1"/>
           </p:cNvSpPr>
@@ -6187,13 +6250,13 @@
               <a:pPr/>
               <a:t>5</a:t>
             </a:fld>
-            <a:endParaRPr lang="en-US" dirty="0"/>
+            <a:endParaRPr lang="en-US"/>
           </a:p>
         </p:txBody>
       </p:sp>
       <p:sp>
         <p:nvSpPr>
-          <p:cNvPr id="4" name="Title 1"/>
+          <p:cNvPr id="6" name="Title 1"/>
           <p:cNvSpPr txBox="1">
             <a:spLocks/>
           </p:cNvSpPr>
@@ -6379,326 +6442,9 @@
           </a:p>
         </p:txBody>
       </p:sp>
-      <p:grpSp>
-        <p:nvGrpSpPr>
-          <p:cNvPr id="13" name="Group 12"/>
-          <p:cNvGrpSpPr/>
-          <p:nvPr/>
-        </p:nvGrpSpPr>
-        <p:grpSpPr>
-          <a:xfrm>
-            <a:off x="2819400" y="1447800"/>
-            <a:ext cx="6019800" cy="4348115"/>
-            <a:chOff x="2667000" y="1524000"/>
-            <a:chExt cx="6019800" cy="4348115"/>
-          </a:xfrm>
-        </p:grpSpPr>
-        <p:pic>
-          <p:nvPicPr>
-            <p:cNvPr id="3" name="Picture 2"/>
-            <p:cNvPicPr>
-              <a:picLocks noChangeAspect="1" noChangeArrowheads="1"/>
-            </p:cNvPicPr>
-            <p:nvPr/>
-          </p:nvPicPr>
-          <p:blipFill rotWithShape="1">
-            <a:blip r:embed="rId2">
-              <a:extLst>
-                <a:ext uri="{28A0092B-C50C-407E-A947-70E740481C1C}">
-                  <a14:useLocalDpi xmlns:a14="http://schemas.microsoft.com/office/drawing/2010/main" val="0"/>
-                </a:ext>
-              </a:extLst>
-            </a:blip>
-            <a:srcRect l="16568" t="10317" r="14484" b="10000"/>
-            <a:stretch/>
-          </p:blipFill>
-          <p:spPr bwMode="auto">
-            <a:xfrm>
-              <a:off x="2667000" y="1524000"/>
-              <a:ext cx="6019800" cy="4348115"/>
-            </a:xfrm>
-            <a:prstGeom prst="rect">
-              <a:avLst/>
-            </a:prstGeom>
-            <a:noFill/>
-            <a:ln>
-              <a:noFill/>
-            </a:ln>
-            <a:extLst>
-              <a:ext uri="{909E8E84-426E-40DD-AFC4-6F175D3DCCD1}">
-                <a14:hiddenFill xmlns:a14="http://schemas.microsoft.com/office/drawing/2010/main">
-                  <a:solidFill>
-                    <a:schemeClr val="accent1"/>
-                  </a:solidFill>
-                </a14:hiddenFill>
-              </a:ext>
-              <a:ext uri="{91240B29-F687-4F45-9708-019B960494DF}">
-                <a14:hiddenLine xmlns:a14="http://schemas.microsoft.com/office/drawing/2010/main" w="9525">
-                  <a:solidFill>
-                    <a:schemeClr val="tx1"/>
-                  </a:solidFill>
-                  <a:miter lim="800000"/>
-                  <a:headEnd/>
-                  <a:tailEnd/>
-                </a14:hiddenLine>
-              </a:ext>
-            </a:extLst>
-          </p:spPr>
-        </p:pic>
-        <p:sp>
-          <p:nvSpPr>
-            <p:cNvPr id="5" name="Rectangle 4"/>
-            <p:cNvSpPr/>
-            <p:nvPr/>
-          </p:nvSpPr>
-          <p:spPr bwMode="auto">
-            <a:xfrm>
-              <a:off x="2918085" y="1616440"/>
-              <a:ext cx="395990" cy="381000"/>
-            </a:xfrm>
-            <a:prstGeom prst="rect">
-              <a:avLst/>
-            </a:prstGeom>
-            <a:noFill/>
-            <a:ln w="38100" cap="flat" cmpd="sng" algn="ctr">
-              <a:solidFill>
-                <a:srgbClr val="92D050"/>
-              </a:solidFill>
-              <a:prstDash val="solid"/>
-              <a:round/>
-              <a:headEnd type="none" w="med" len="med"/>
-              <a:tailEnd type="none" w="med" len="med"/>
-            </a:ln>
-            <a:effectLst/>
-          </p:spPr>
-          <p:txBody>
-            <a:bodyPr vert="horz" wrap="square" lIns="91440" tIns="45720" rIns="91440" bIns="45720" numCol="1" rtlCol="0" anchor="t" anchorCtr="0" compatLnSpc="1">
-              <a:prstTxWarp prst="textNoShape">
-                <a:avLst/>
-              </a:prstTxWarp>
-            </a:bodyPr>
-            <a:lstStyle/>
-            <a:p>
-              <a:pPr marL="0" marR="0" indent="0" algn="l" defTabSz="914400" rtl="0" eaLnBrk="0" fontAlgn="base" latinLnBrk="0" hangingPunct="0">
-                <a:lnSpc>
-                  <a:spcPct val="100000"/>
-                </a:lnSpc>
-                <a:spcBef>
-                  <a:spcPct val="0"/>
-                </a:spcBef>
-                <a:spcAft>
-                  <a:spcPct val="0"/>
-                </a:spcAft>
-                <a:buClrTx/>
-                <a:buSzTx/>
-                <a:buFontTx/>
-                <a:buNone/>
-                <a:tabLst/>
-              </a:pPr>
-              <a:endParaRPr kumimoji="0" lang="en-US" sz="2400" b="0" i="0" u="none" strike="noStrike" cap="none" normalizeH="0" baseline="0" smtClean="0">
-                <a:ln>
-                  <a:noFill/>
-                </a:ln>
-                <a:solidFill>
-                  <a:schemeClr val="tx1"/>
-                </a:solidFill>
-                <a:effectLst/>
-                <a:latin typeface="Arial" charset="0"/>
-                <a:ea typeface="ＭＳ Ｐゴシック" pitchFamily="1" charset="-128"/>
-              </a:endParaRPr>
-            </a:p>
-          </p:txBody>
-        </p:sp>
-        <p:sp>
-          <p:nvSpPr>
-            <p:cNvPr id="6" name="Rectangle 5"/>
-            <p:cNvSpPr/>
-            <p:nvPr/>
-          </p:nvSpPr>
-          <p:spPr bwMode="auto">
-            <a:xfrm>
-              <a:off x="5478904" y="4572000"/>
-              <a:ext cx="921895" cy="304800"/>
-            </a:xfrm>
-            <a:prstGeom prst="rect">
-              <a:avLst/>
-            </a:prstGeom>
-            <a:noFill/>
-            <a:ln w="38100" cap="flat" cmpd="sng" algn="ctr">
-              <a:solidFill>
-                <a:srgbClr val="92D050"/>
-              </a:solidFill>
-              <a:prstDash val="solid"/>
-              <a:round/>
-              <a:headEnd type="none" w="med" len="med"/>
-              <a:tailEnd type="none" w="med" len="med"/>
-            </a:ln>
-            <a:effectLst/>
-          </p:spPr>
-          <p:txBody>
-            <a:bodyPr vert="horz" wrap="square" lIns="91440" tIns="45720" rIns="91440" bIns="45720" numCol="1" rtlCol="0" anchor="t" anchorCtr="0" compatLnSpc="1">
-              <a:prstTxWarp prst="textNoShape">
-                <a:avLst/>
-              </a:prstTxWarp>
-            </a:bodyPr>
-            <a:lstStyle/>
-            <a:p>
-              <a:pPr marL="0" marR="0" indent="0" algn="l" defTabSz="914400" rtl="0" eaLnBrk="0" fontAlgn="base" latinLnBrk="0" hangingPunct="0">
-                <a:lnSpc>
-                  <a:spcPct val="100000"/>
-                </a:lnSpc>
-                <a:spcBef>
-                  <a:spcPct val="0"/>
-                </a:spcBef>
-                <a:spcAft>
-                  <a:spcPct val="0"/>
-                </a:spcAft>
-                <a:buClrTx/>
-                <a:buSzTx/>
-                <a:buFontTx/>
-                <a:buNone/>
-                <a:tabLst/>
-              </a:pPr>
-              <a:endParaRPr kumimoji="0" lang="en-US" sz="2400" b="0" i="0" u="none" strike="noStrike" cap="none" normalizeH="0" baseline="0" smtClean="0">
-                <a:ln>
-                  <a:noFill/>
-                </a:ln>
-                <a:solidFill>
-                  <a:schemeClr val="tx1"/>
-                </a:solidFill>
-                <a:effectLst/>
-                <a:latin typeface="Arial" charset="0"/>
-                <a:ea typeface="ＭＳ Ｐゴシック" pitchFamily="1" charset="-128"/>
-              </a:endParaRPr>
-            </a:p>
-          </p:txBody>
-        </p:sp>
-        <p:sp>
-          <p:nvSpPr>
-            <p:cNvPr id="7" name="Rectangle 6"/>
-            <p:cNvSpPr/>
-            <p:nvPr/>
-          </p:nvSpPr>
-          <p:spPr bwMode="auto">
-            <a:xfrm>
-              <a:off x="8320791" y="4001125"/>
-              <a:ext cx="304800" cy="304800"/>
-            </a:xfrm>
-            <a:prstGeom prst="rect">
-              <a:avLst/>
-            </a:prstGeom>
-            <a:noFill/>
-            <a:ln w="38100" cap="flat" cmpd="sng" algn="ctr">
-              <a:solidFill>
-                <a:srgbClr val="92D050"/>
-              </a:solidFill>
-              <a:prstDash val="solid"/>
-              <a:round/>
-              <a:headEnd type="none" w="med" len="med"/>
-              <a:tailEnd type="none" w="med" len="med"/>
-            </a:ln>
-            <a:effectLst/>
-          </p:spPr>
-          <p:txBody>
-            <a:bodyPr vert="horz" wrap="square" lIns="91440" tIns="45720" rIns="91440" bIns="45720" numCol="1" rtlCol="0" anchor="t" anchorCtr="0" compatLnSpc="1">
-              <a:prstTxWarp prst="textNoShape">
-                <a:avLst/>
-              </a:prstTxWarp>
-            </a:bodyPr>
-            <a:lstStyle/>
-            <a:p>
-              <a:pPr marL="0" marR="0" indent="0" algn="l" defTabSz="914400" rtl="0" eaLnBrk="0" fontAlgn="base" latinLnBrk="0" hangingPunct="0">
-                <a:lnSpc>
-                  <a:spcPct val="100000"/>
-                </a:lnSpc>
-                <a:spcBef>
-                  <a:spcPct val="0"/>
-                </a:spcBef>
-                <a:spcAft>
-                  <a:spcPct val="0"/>
-                </a:spcAft>
-                <a:buClrTx/>
-                <a:buSzTx/>
-                <a:buFontTx/>
-                <a:buNone/>
-                <a:tabLst/>
-              </a:pPr>
-              <a:endParaRPr kumimoji="0" lang="en-US" sz="2400" b="0" i="0" u="none" strike="noStrike" cap="none" normalizeH="0" baseline="0" smtClean="0">
-                <a:ln>
-                  <a:noFill/>
-                </a:ln>
-                <a:solidFill>
-                  <a:schemeClr val="tx1"/>
-                </a:solidFill>
-                <a:effectLst/>
-                <a:latin typeface="Arial" charset="0"/>
-                <a:ea typeface="ＭＳ Ｐゴシック" pitchFamily="1" charset="-128"/>
-              </a:endParaRPr>
-            </a:p>
-          </p:txBody>
-        </p:sp>
-        <p:cxnSp>
-          <p:nvCxnSpPr>
-            <p:cNvPr id="9" name="Straight Arrow Connector 8"/>
-            <p:cNvCxnSpPr/>
-            <p:nvPr/>
-          </p:nvCxnSpPr>
-          <p:spPr bwMode="auto">
-            <a:xfrm>
-              <a:off x="3319072" y="2069892"/>
-              <a:ext cx="2049904" cy="2590800"/>
-            </a:xfrm>
-            <a:prstGeom prst="straightConnector1">
-              <a:avLst/>
-            </a:prstGeom>
-            <a:solidFill>
-              <a:schemeClr val="accent1"/>
-            </a:solidFill>
-            <a:ln w="38100" cap="flat" cmpd="sng" algn="ctr">
-              <a:solidFill>
-                <a:srgbClr val="92D050"/>
-              </a:solidFill>
-              <a:prstDash val="solid"/>
-              <a:round/>
-              <a:headEnd type="none" w="med" len="med"/>
-              <a:tailEnd type="arrow"/>
-            </a:ln>
-            <a:effectLst/>
-          </p:spPr>
-        </p:cxnSp>
-        <p:cxnSp>
-          <p:nvCxnSpPr>
-            <p:cNvPr id="10" name="Straight Arrow Connector 9"/>
-            <p:cNvCxnSpPr/>
-            <p:nvPr/>
-          </p:nvCxnSpPr>
-          <p:spPr bwMode="auto">
-            <a:xfrm flipV="1">
-              <a:off x="6477000" y="4191000"/>
-              <a:ext cx="1752600" cy="533400"/>
-            </a:xfrm>
-            <a:prstGeom prst="straightConnector1">
-              <a:avLst/>
-            </a:prstGeom>
-            <a:solidFill>
-              <a:schemeClr val="accent1"/>
-            </a:solidFill>
-            <a:ln w="38100" cap="flat" cmpd="sng" algn="ctr">
-              <a:solidFill>
-                <a:srgbClr val="92D050"/>
-              </a:solidFill>
-              <a:prstDash val="solid"/>
-              <a:round/>
-              <a:headEnd type="none" w="med" len="med"/>
-              <a:tailEnd type="arrow"/>
-            </a:ln>
-            <a:effectLst/>
-          </p:spPr>
-        </p:cxnSp>
-      </p:grpSp>
       <p:sp>
         <p:nvSpPr>
-          <p:cNvPr id="14" name="Content Placeholder 2"/>
+          <p:cNvPr id="9" name="Content Placeholder 2"/>
           <p:cNvSpPr txBox="1">
             <a:spLocks/>
           </p:cNvSpPr>
@@ -6706,8 +6452,8 @@
         </p:nvSpPr>
         <p:spPr>
           <a:xfrm>
-            <a:off x="266700" y="1295400"/>
-            <a:ext cx="2324100" cy="4724400"/>
+            <a:off x="266700" y="1143000"/>
+            <a:ext cx="8610600" cy="5410200"/>
           </a:xfrm>
           <a:prstGeom prst="rect">
             <a:avLst/>
@@ -6874,36 +6620,36 @@
               <a:buNone/>
             </a:pPr>
             <a:r>
-              <a:rPr lang="en-US" sz="2400" kern="0" dirty="0" smtClean="0">
-                <a:latin typeface="Calibri" pitchFamily="34" charset="0"/>
-              </a:rPr>
-              <a:t>In the </a:t>
-            </a:r>
-            <a:r>
-              <a:rPr lang="en-US" sz="2400" kern="0" dirty="0" err="1" smtClean="0">
+              <a:rPr lang="en-US" sz="2800" kern="0" dirty="0" smtClean="0">
+                <a:latin typeface="Calibri" pitchFamily="34" charset="0"/>
+              </a:rPr>
+              <a:t>Using Vagrant and </a:t>
+            </a:r>
+            <a:r>
+              <a:rPr lang="en-US" sz="2800" kern="0" dirty="0" err="1" smtClean="0">
                 <a:latin typeface="Calibri" pitchFamily="34" charset="0"/>
               </a:rPr>
               <a:t>VirtualBox</a:t>
             </a:r>
             <a:r>
-              <a:rPr lang="en-US" sz="2400" kern="0" dirty="0" smtClean="0">
-                <a:latin typeface="Calibri" pitchFamily="34" charset="0"/>
-              </a:rPr>
-              <a:t> app running on the host OS…</a:t>
-            </a:r>
-          </a:p>
-          <a:p>
-            <a:pPr marL="0" indent="0" eaLnBrk="1" hangingPunct="1">
-              <a:spcBef>
-                <a:spcPts val="0"/>
-              </a:spcBef>
-              <a:spcAft>
-                <a:spcPts val="600"/>
-              </a:spcAft>
-              <a:buFontTx/>
-              <a:buNone/>
-            </a:pPr>
-            <a:endParaRPr lang="en-US" sz="2400" kern="0" dirty="0" smtClean="0">
+              <a:rPr lang="en-US" sz="2800" kern="0" dirty="0" smtClean="0">
+                <a:latin typeface="Calibri" pitchFamily="34" charset="0"/>
+              </a:rPr>
+              <a:t>, your computer’s operating system (the “host OS”) runs </a:t>
+            </a:r>
+            <a:r>
+              <a:rPr lang="en-US" sz="2800" b="1" kern="0" dirty="0" err="1" smtClean="0">
+                <a:latin typeface="Calibri" pitchFamily="34" charset="0"/>
+              </a:rPr>
+              <a:t>bioBakery</a:t>
+            </a:r>
+            <a:r>
+              <a:rPr lang="en-US" sz="2800" kern="0" dirty="0" smtClean="0">
+                <a:latin typeface="Calibri" pitchFamily="34" charset="0"/>
+              </a:rPr>
+              <a:t> within a window as a separate operating system (the “guest OS”).</a:t>
+            </a:r>
+            <a:endParaRPr lang="en-US" sz="2800" kern="0" dirty="0" smtClean="0">
               <a:latin typeface="Calibri" pitchFamily="34" charset="0"/>
             </a:endParaRPr>
           </a:p>
@@ -6918,25 +6664,7 @@
               <a:buFontTx/>
               <a:buNone/>
             </a:pPr>
-            <a:r>
-              <a:rPr lang="en-US" sz="2400" kern="0" dirty="0" smtClean="0">
-                <a:latin typeface="Calibri" pitchFamily="34" charset="0"/>
-              </a:rPr>
-              <a:t>Select settings…</a:t>
-            </a:r>
-          </a:p>
-          <a:p>
-            <a:pPr marL="0" indent="0" eaLnBrk="1" hangingPunct="1">
-              <a:spcBef>
-                <a:spcPts val="0"/>
-              </a:spcBef>
-              <a:spcAft>
-                <a:spcPts val="600"/>
-              </a:spcAft>
-              <a:buFontTx/>
-              <a:buNone/>
-            </a:pPr>
-            <a:endParaRPr lang="en-US" sz="2400" kern="0" dirty="0">
+            <a:endParaRPr lang="en-US" sz="2000" kern="0" dirty="0">
               <a:latin typeface="Calibri" pitchFamily="34" charset="0"/>
             </a:endParaRPr>
           </a:p>
@@ -6952,10 +6680,16 @@
               <a:buNone/>
             </a:pPr>
             <a:r>
-              <a:rPr lang="en-US" sz="2400" kern="0" dirty="0" smtClean="0">
-                <a:latin typeface="Calibri" pitchFamily="34" charset="0"/>
-              </a:rPr>
-              <a:t>Then shared folders… </a:t>
+              <a:rPr lang="en-US" sz="2800" kern="0" dirty="0" smtClean="0">
+                <a:latin typeface="Calibri" pitchFamily="34" charset="0"/>
+              </a:rPr>
+              <a:t>By default, the guest OS </a:t>
+            </a:r>
+            <a:r>
+              <a:rPr lang="en-US" sz="2800" kern="0" dirty="0" smtClean="0">
+                <a:latin typeface="Calibri" pitchFamily="34" charset="0"/>
+              </a:rPr>
+              <a:t>can only see files on the host OS if they are located within the Vagrant folder.</a:t>
             </a:r>
           </a:p>
           <a:p>
@@ -6969,7 +6703,7 @@
               <a:buFontTx/>
               <a:buNone/>
             </a:pPr>
-            <a:endParaRPr lang="en-US" sz="2400" kern="0" dirty="0">
+            <a:endParaRPr lang="en-US" sz="2000" kern="0" dirty="0">
               <a:latin typeface="Calibri" pitchFamily="34" charset="0"/>
             </a:endParaRPr>
           </a:p>
@@ -6985,13 +6719,88 @@
               <a:buNone/>
             </a:pPr>
             <a:r>
-              <a:rPr lang="en-US" sz="2400" kern="0" dirty="0" smtClean="0">
-                <a:latin typeface="Calibri" pitchFamily="34" charset="0"/>
-              </a:rPr>
-              <a:t>Then click the tiny plus icon.</a:t>
-            </a:r>
-            <a:endParaRPr lang="en-US" sz="2400" kern="0" dirty="0">
+              <a:rPr lang="en-US" sz="2800" kern="0" dirty="0" smtClean="0">
+                <a:latin typeface="Calibri" pitchFamily="34" charset="0"/>
+                <a:hlinkClick r:id="rId2"/>
+              </a:rPr>
+              <a:t>Click here to learn how to share additional </a:t>
+            </a:r>
+            <a:r>
+              <a:rPr lang="en-US" sz="2800" kern="0" dirty="0" smtClean="0">
+                <a:latin typeface="Calibri" pitchFamily="34" charset="0"/>
+                <a:hlinkClick r:id="rId2"/>
+              </a:rPr>
+              <a:t>folders/files from the host OS with </a:t>
+            </a:r>
+            <a:r>
+              <a:rPr lang="en-US" sz="2800" kern="0" dirty="0" err="1" smtClean="0">
+                <a:latin typeface="Calibri" pitchFamily="34" charset="0"/>
+                <a:hlinkClick r:id="rId2"/>
+              </a:rPr>
+              <a:t>bioBakery</a:t>
+            </a:r>
+            <a:r>
+              <a:rPr lang="en-US" sz="2800" kern="0" dirty="0" smtClean="0">
+                <a:latin typeface="Calibri" pitchFamily="34" charset="0"/>
+                <a:hlinkClick r:id="rId2"/>
+              </a:rPr>
+              <a:t>.</a:t>
+            </a:r>
+            <a:endParaRPr lang="en-US" sz="2800" kern="0" dirty="0" smtClean="0">
               <a:latin typeface="Calibri" pitchFamily="34" charset="0"/>
+            </a:endParaRPr>
+          </a:p>
+          <a:p>
+            <a:pPr marL="0" indent="0" eaLnBrk="1" hangingPunct="1">
+              <a:spcBef>
+                <a:spcPts val="0"/>
+              </a:spcBef>
+              <a:spcAft>
+                <a:spcPts val="600"/>
+              </a:spcAft>
+              <a:buFontTx/>
+              <a:buNone/>
+            </a:pPr>
+            <a:endParaRPr lang="en-US" sz="2000" kern="0" dirty="0">
+              <a:latin typeface="Calibri" pitchFamily="34" charset="0"/>
+              <a:cs typeface="Consolas" panose="020B0609020204030204" pitchFamily="49" charset="0"/>
+            </a:endParaRPr>
+          </a:p>
+          <a:p>
+            <a:pPr marL="0" indent="0" eaLnBrk="1" hangingPunct="1">
+              <a:spcBef>
+                <a:spcPts val="0"/>
+              </a:spcBef>
+              <a:spcAft>
+                <a:spcPts val="600"/>
+              </a:spcAft>
+              <a:buFontTx/>
+              <a:buNone/>
+            </a:pPr>
+            <a:r>
+              <a:rPr lang="en-US" sz="2800" kern="0" dirty="0" smtClean="0">
+                <a:latin typeface="Calibri" pitchFamily="34" charset="0"/>
+                <a:cs typeface="Consolas" panose="020B0609020204030204" pitchFamily="49" charset="0"/>
+              </a:rPr>
+              <a:t>We strongly recommend saving important files to the host OS so they are available outside of </a:t>
+            </a:r>
+            <a:r>
+              <a:rPr lang="en-US" sz="2800" kern="0" dirty="0" err="1" smtClean="0">
+                <a:latin typeface="Calibri" pitchFamily="34" charset="0"/>
+                <a:cs typeface="Consolas" panose="020B0609020204030204" pitchFamily="49" charset="0"/>
+              </a:rPr>
+              <a:t>bioBakery</a:t>
+            </a:r>
+            <a:r>
+              <a:rPr lang="en-US" sz="2800" kern="0" dirty="0" smtClean="0">
+                <a:latin typeface="Calibri" pitchFamily="34" charset="0"/>
+                <a:cs typeface="Consolas" panose="020B0609020204030204" pitchFamily="49" charset="0"/>
+              </a:rPr>
+              <a:t>.</a:t>
+            </a:r>
+            <a:endParaRPr lang="en-US" sz="2800" kern="0" dirty="0">
+              <a:latin typeface="Consolas" panose="020B0609020204030204" pitchFamily="49" charset="0"/>
+              <a:cs typeface="Consolas" panose="020B0609020204030204" pitchFamily="49" charset="0"/>
             </a:endParaRPr>
           </a:p>
         </p:txBody>
@@ -6999,18 +6808,18 @@
     </p:spTree>
     <p:extLst>
       <p:ext uri="{BB962C8B-B14F-4D97-AF65-F5344CB8AC3E}">
-        <p14:creationId xmlns:p14="http://schemas.microsoft.com/office/powerpoint/2010/main" val="1149118923"/>
+        <p14:creationId xmlns:p14="http://schemas.microsoft.com/office/powerpoint/2010/main" val="1730739676"/>
       </p:ext>
     </p:extLst>
   </p:cSld>
   <p:clrMapOvr>
     <a:masterClrMapping/>
   </p:clrMapOvr>
-  <mc:AlternateContent xmlns:mc="http://schemas.openxmlformats.org/markup-compatibility/2006">
-    <mc:Choice xmlns:p14="http://schemas.microsoft.com/office/powerpoint/2010/main" Requires="p14">
+  <mc:AlternateContent xmlns:mc="http://schemas.openxmlformats.org/markup-compatibility/2006" xmlns:p14="http://schemas.microsoft.com/office/powerpoint/2010/main">
+    <mc:Choice Requires="p14">
       <p:transition p14:dur="0"/>
     </mc:Choice>
-    <mc:Fallback>
+    <mc:Fallback xmlns="">
       <p:transition/>
     </mc:Fallback>
   </mc:AlternateContent>
@@ -7043,7 +6852,7 @@
       </p:grpSpPr>
       <p:sp>
         <p:nvSpPr>
-          <p:cNvPr id="2" name="Slide Number Placeholder 1"/>
+          <p:cNvPr id="4" name="Slide Number Placeholder 3"/>
           <p:cNvSpPr>
             <a:spLocks noGrp="1"/>
           </p:cNvSpPr>
@@ -7061,13 +6870,13 @@
               <a:pPr/>
               <a:t>6</a:t>
             </a:fld>
-            <a:endParaRPr lang="en-US" dirty="0"/>
+            <a:endParaRPr lang="en-US"/>
           </a:p>
         </p:txBody>
       </p:sp>
       <p:sp>
         <p:nvSpPr>
-          <p:cNvPr id="4" name="Title 1"/>
+          <p:cNvPr id="6" name="Title 1"/>
           <p:cNvSpPr txBox="1">
             <a:spLocks/>
           </p:cNvSpPr>
@@ -7239,13 +7048,7 @@
               <a:rPr lang="en-US" sz="3600" b="1" kern="0" dirty="0" smtClean="0">
                 <a:latin typeface="Calibri" pitchFamily="34" charset="0"/>
               </a:rPr>
-              <a:t>Sharing files with </a:t>
-            </a:r>
-            <a:r>
-              <a:rPr lang="en-US" sz="3600" b="1" kern="0" dirty="0" err="1" smtClean="0">
-                <a:latin typeface="Calibri" pitchFamily="34" charset="0"/>
-              </a:rPr>
-              <a:t>bioBakery</a:t>
+              <a:t>PATH details</a:t>
             </a:r>
             <a:endParaRPr lang="en-US" sz="3600" kern="0" dirty="0">
               <a:latin typeface="Calibri" pitchFamily="34" charset="0"/>
@@ -7255,7 +7058,7 @@
       </p:sp>
       <p:sp>
         <p:nvSpPr>
-          <p:cNvPr id="12" name="Content Placeholder 2"/>
+          <p:cNvPr id="9" name="Content Placeholder 2"/>
           <p:cNvSpPr txBox="1">
             <a:spLocks/>
           </p:cNvSpPr>
@@ -7425,7 +7228,7 @@
                 <a:spcPts val="0"/>
               </a:spcBef>
               <a:spcAft>
-                <a:spcPts val="3000"/>
+                <a:spcPts val="600"/>
               </a:spcAft>
               <a:buFontTx/>
               <a:buNone/>
@@ -7434,7 +7237,19 @@
               <a:rPr lang="en-US" sz="2800" kern="0" dirty="0" smtClean="0">
                 <a:latin typeface="Calibri" pitchFamily="34" charset="0"/>
               </a:rPr>
-              <a:t>Select a folder on the host OS from the dropdown menu. Tick the “auto-mount” and “make permanent” boxes.</a:t>
+              <a:t>All programs installed by </a:t>
+            </a:r>
+            <a:r>
+              <a:rPr lang="en-US" sz="2800" kern="0" dirty="0" err="1" smtClean="0">
+                <a:latin typeface="Calibri" pitchFamily="34" charset="0"/>
+              </a:rPr>
+              <a:t>biobakery</a:t>
+            </a:r>
+            <a:r>
+              <a:rPr lang="en-US" sz="2800" kern="0" dirty="0" smtClean="0">
+                <a:latin typeface="Calibri" pitchFamily="34" charset="0"/>
+              </a:rPr>
+              <a:t> are located in:</a:t>
             </a:r>
           </a:p>
           <a:p>
@@ -7443,116 +7258,228 @@
                 <a:spcPts val="0"/>
               </a:spcBef>
               <a:spcAft>
-                <a:spcPts val="3000"/>
+                <a:spcPts val="600"/>
               </a:spcAft>
               <a:buFontTx/>
               <a:buNone/>
             </a:pPr>
             <a:r>
               <a:rPr lang="en-US" sz="2800" kern="0" dirty="0" smtClean="0">
-                <a:latin typeface="Calibri" pitchFamily="34" charset="0"/>
-              </a:rPr>
-              <a:t>The next time you restart </a:t>
+                <a:solidFill>
+                  <a:schemeClr val="tx2"/>
+                </a:solidFill>
+                <a:latin typeface="Consolas" panose="020B0609020204030204" pitchFamily="49" charset="0"/>
+                <a:cs typeface="Consolas" panose="020B0609020204030204" pitchFamily="49" charset="0"/>
+              </a:rPr>
+              <a:t>/</a:t>
             </a:r>
             <a:r>
               <a:rPr lang="en-US" sz="2800" kern="0" dirty="0" err="1" smtClean="0">
-                <a:latin typeface="Calibri" pitchFamily="34" charset="0"/>
-              </a:rPr>
-              <a:t>bioBakery</a:t>
+                <a:solidFill>
+                  <a:schemeClr val="tx2"/>
+                </a:solidFill>
+                <a:latin typeface="Consolas" panose="020B0609020204030204" pitchFamily="49" charset="0"/>
+                <a:cs typeface="Consolas" panose="020B0609020204030204" pitchFamily="49" charset="0"/>
+              </a:rPr>
+              <a:t>usr</a:t>
             </a:r>
             <a:r>
               <a:rPr lang="en-US" sz="2800" kern="0" dirty="0" smtClean="0">
-                <a:latin typeface="Calibri" pitchFamily="34" charset="0"/>
-              </a:rPr>
-              <a:t>, this folder will be available under </a:t>
-            </a:r>
-            <a:r>
-              <a:rPr lang="en-US" sz="2800" b="1" kern="0" dirty="0" smtClean="0">
-                <a:latin typeface="Calibri" pitchFamily="34" charset="0"/>
-              </a:rPr>
-              <a:t>Computer/Media</a:t>
+                <a:solidFill>
+                  <a:schemeClr val="tx2"/>
+                </a:solidFill>
+                <a:latin typeface="Consolas" panose="020B0609020204030204" pitchFamily="49" charset="0"/>
+                <a:cs typeface="Consolas" panose="020B0609020204030204" pitchFamily="49" charset="0"/>
+              </a:rPr>
+              <a:t>/share/</a:t>
+            </a:r>
+            <a:r>
+              <a:rPr lang="en-US" sz="2800" kern="0" dirty="0" err="1" smtClean="0">
+                <a:solidFill>
+                  <a:schemeClr val="tx2"/>
+                </a:solidFill>
+                <a:latin typeface="Consolas" panose="020B0609020204030204" pitchFamily="49" charset="0"/>
+                <a:cs typeface="Consolas" panose="020B0609020204030204" pitchFamily="49" charset="0"/>
+              </a:rPr>
+              <a:t>biobakery</a:t>
+            </a:r>
+            <a:endParaRPr lang="en-US" sz="2800" kern="0" dirty="0" smtClean="0">
+              <a:solidFill>
+                <a:schemeClr val="tx2"/>
+              </a:solidFill>
+              <a:latin typeface="Consolas" panose="020B0609020204030204" pitchFamily="49" charset="0"/>
+              <a:cs typeface="Consolas" panose="020B0609020204030204" pitchFamily="49" charset="0"/>
+            </a:endParaRPr>
+          </a:p>
+          <a:p>
+            <a:pPr marL="0" indent="0" eaLnBrk="1" hangingPunct="1">
+              <a:spcBef>
+                <a:spcPts val="0"/>
+              </a:spcBef>
+              <a:spcAft>
+                <a:spcPts val="600"/>
+              </a:spcAft>
+              <a:buFontTx/>
+              <a:buNone/>
+            </a:pPr>
+            <a:endParaRPr lang="en-US" sz="2800" kern="0" dirty="0">
+              <a:latin typeface="Consolas" panose="020B0609020204030204" pitchFamily="49" charset="0"/>
+              <a:cs typeface="Consolas" panose="020B0609020204030204" pitchFamily="49" charset="0"/>
+            </a:endParaRPr>
+          </a:p>
+          <a:p>
+            <a:pPr marL="0" indent="0" eaLnBrk="1" hangingPunct="1">
+              <a:spcBef>
+                <a:spcPts val="0"/>
+              </a:spcBef>
+              <a:spcAft>
+                <a:spcPts val="600"/>
+              </a:spcAft>
+              <a:buFontTx/>
+              <a:buNone/>
+            </a:pPr>
+            <a:r>
+              <a:rPr lang="en-US" sz="2800" kern="0" dirty="0">
+                <a:latin typeface="Calibri" pitchFamily="34" charset="0"/>
+              </a:rPr>
+              <a:t>Executable programs </a:t>
             </a:r>
             <a:r>
               <a:rPr lang="en-US" sz="2800" kern="0" dirty="0" smtClean="0">
                 <a:latin typeface="Calibri" pitchFamily="34" charset="0"/>
               </a:rPr>
-              <a:t>.</a:t>
-            </a:r>
+              <a:t>located in this folder have </a:t>
+            </a:r>
+            <a:r>
+              <a:rPr lang="en-US" sz="2800" kern="0" dirty="0">
+                <a:latin typeface="Calibri" pitchFamily="34" charset="0"/>
+              </a:rPr>
+              <a:t>been added to the </a:t>
+            </a:r>
+            <a:r>
+              <a:rPr lang="en-US" sz="2800" kern="0" dirty="0" smtClean="0">
+                <a:latin typeface="Calibri" pitchFamily="34" charset="0"/>
+              </a:rPr>
+              <a:t>PATH environment variable.</a:t>
+            </a:r>
+          </a:p>
+          <a:p>
+            <a:pPr marL="0" indent="0" eaLnBrk="1" hangingPunct="1">
+              <a:spcBef>
+                <a:spcPts val="0"/>
+              </a:spcBef>
+              <a:spcAft>
+                <a:spcPts val="600"/>
+              </a:spcAft>
+              <a:buFontTx/>
+              <a:buNone/>
+            </a:pPr>
             <a:endParaRPr lang="en-US" sz="2800" kern="0" dirty="0">
               <a:latin typeface="Calibri" pitchFamily="34" charset="0"/>
             </a:endParaRPr>
           </a:p>
+          <a:p>
+            <a:pPr marL="0" indent="0" eaLnBrk="1" hangingPunct="1">
+              <a:spcBef>
+                <a:spcPts val="0"/>
+              </a:spcBef>
+              <a:spcAft>
+                <a:spcPts val="600"/>
+              </a:spcAft>
+              <a:buFontTx/>
+              <a:buNone/>
+            </a:pPr>
+            <a:r>
+              <a:rPr lang="en-US" sz="2800" kern="0" dirty="0" smtClean="0">
+                <a:latin typeface="Calibri" pitchFamily="34" charset="0"/>
+              </a:rPr>
+              <a:t>This means that </a:t>
+            </a:r>
+            <a:r>
+              <a:rPr lang="en-US" sz="2800" kern="0" dirty="0">
+                <a:latin typeface="Calibri" pitchFamily="34" charset="0"/>
+              </a:rPr>
+              <a:t>y</a:t>
+            </a:r>
+            <a:r>
+              <a:rPr lang="en-US" sz="2800" kern="0" dirty="0" smtClean="0">
+                <a:latin typeface="Calibri" pitchFamily="34" charset="0"/>
+              </a:rPr>
+              <a:t>ou can type a command like </a:t>
+            </a:r>
+          </a:p>
+          <a:p>
+            <a:pPr marL="0" indent="0" eaLnBrk="1" hangingPunct="1">
+              <a:spcBef>
+                <a:spcPts val="0"/>
+              </a:spcBef>
+              <a:spcAft>
+                <a:spcPts val="600"/>
+              </a:spcAft>
+              <a:buFontTx/>
+              <a:buNone/>
+            </a:pPr>
+            <a:r>
+              <a:rPr lang="en-US" sz="2800" kern="0" dirty="0" smtClean="0">
+                <a:solidFill>
+                  <a:schemeClr val="tx2"/>
+                </a:solidFill>
+                <a:latin typeface="Consolas" panose="020B0609020204030204" pitchFamily="49" charset="0"/>
+                <a:cs typeface="Consolas" panose="020B0609020204030204" pitchFamily="49" charset="0"/>
+              </a:rPr>
+              <a:t>$ python metaphlan.py --help </a:t>
+            </a:r>
+          </a:p>
+          <a:p>
+            <a:pPr marL="0" indent="0" eaLnBrk="1" hangingPunct="1">
+              <a:spcBef>
+                <a:spcPts val="0"/>
+              </a:spcBef>
+              <a:spcAft>
+                <a:spcPts val="600"/>
+              </a:spcAft>
+              <a:buFontTx/>
+              <a:buNone/>
+            </a:pPr>
+            <a:r>
+              <a:rPr lang="en-US" sz="2800" kern="0" dirty="0" smtClean="0">
+                <a:latin typeface="Calibri" pitchFamily="34" charset="0"/>
+              </a:rPr>
+              <a:t>from anywhere to see </a:t>
+            </a:r>
+            <a:r>
+              <a:rPr lang="en-US" sz="2800" kern="0" dirty="0" err="1" smtClean="0">
+                <a:latin typeface="Calibri" pitchFamily="34" charset="0"/>
+              </a:rPr>
+              <a:t>MetaPhlAn’s</a:t>
+            </a:r>
+            <a:r>
+              <a:rPr lang="en-US" sz="2800" kern="0" dirty="0" smtClean="0">
+                <a:latin typeface="Calibri" pitchFamily="34" charset="0"/>
+              </a:rPr>
+              <a:t> help output.</a:t>
+            </a:r>
+            <a:endParaRPr lang="en-US" sz="2800" kern="0" dirty="0">
+              <a:latin typeface="Calibri" pitchFamily="34" charset="0"/>
+            </a:endParaRPr>
+          </a:p>
         </p:txBody>
       </p:sp>
-      <p:pic>
-        <p:nvPicPr>
-          <p:cNvPr id="2050" name="Picture 2"/>
-          <p:cNvPicPr>
-            <a:picLocks noChangeAspect="1" noChangeArrowheads="1"/>
-          </p:cNvPicPr>
-          <p:nvPr/>
-        </p:nvPicPr>
-        <p:blipFill>
-          <a:blip r:embed="rId2">
-            <a:extLst>
-              <a:ext uri="{28A0092B-C50C-407E-A947-70E740481C1C}">
-                <a14:useLocalDpi xmlns:a14="http://schemas.microsoft.com/office/drawing/2010/main" val="0"/>
-              </a:ext>
-            </a:extLst>
-          </a:blip>
-          <a:srcRect/>
-          <a:stretch>
-            <a:fillRect/>
-          </a:stretch>
-        </p:blipFill>
-        <p:spPr bwMode="auto">
-          <a:xfrm>
-            <a:off x="3010515" y="3810000"/>
-            <a:ext cx="3122971" cy="2514600"/>
-          </a:xfrm>
-          <a:prstGeom prst="rect">
-            <a:avLst/>
-          </a:prstGeom>
-          <a:noFill/>
-          <a:ln>
-            <a:noFill/>
-          </a:ln>
-          <a:extLst>
-            <a:ext uri="{909E8E84-426E-40DD-AFC4-6F175D3DCCD1}">
-              <a14:hiddenFill xmlns:a14="http://schemas.microsoft.com/office/drawing/2010/main">
-                <a:solidFill>
-                  <a:schemeClr val="accent1"/>
-                </a:solidFill>
-              </a14:hiddenFill>
-            </a:ext>
-            <a:ext uri="{91240B29-F687-4F45-9708-019B960494DF}">
-              <a14:hiddenLine xmlns:a14="http://schemas.microsoft.com/office/drawing/2010/main" w="9525">
-                <a:solidFill>
-                  <a:schemeClr val="tx1"/>
-                </a:solidFill>
-                <a:miter lim="800000"/>
-                <a:headEnd/>
-                <a:tailEnd/>
-              </a14:hiddenLine>
-            </a:ext>
-          </a:extLst>
-        </p:spPr>
-      </p:pic>
     </p:spTree>
     <p:extLst>
       <p:ext uri="{BB962C8B-B14F-4D97-AF65-F5344CB8AC3E}">
-        <p14:creationId xmlns:p14="http://schemas.microsoft.com/office/powerpoint/2010/main" val="196162069"/>
+        <p14:creationId xmlns:p14="http://schemas.microsoft.com/office/powerpoint/2010/main" val="1509606621"/>
       </p:ext>
     </p:extLst>
   </p:cSld>
   <p:clrMapOvr>
     <a:masterClrMapping/>
   </p:clrMapOvr>
-  <mc:AlternateContent xmlns:mc="http://schemas.openxmlformats.org/markup-compatibility/2006">
-    <mc:Choice xmlns:p14="http://schemas.microsoft.com/office/powerpoint/2010/main" Requires="p14">
+  <mc:AlternateContent xmlns:mc="http://schemas.openxmlformats.org/markup-compatibility/2006" xmlns:p14="http://schemas.microsoft.com/office/powerpoint/2010/main">
+    <mc:Choice Requires="p14">
       <p:transition p14:dur="0"/>
     </mc:Choice>
-    <mc:Fallback>
+    <mc:Fallback xmlns="">
       <p:transition/>
     </mc:Fallback>
   </mc:AlternateContent>
@@ -7585,7 +7512,7 @@
       </p:grpSpPr>
       <p:sp>
         <p:nvSpPr>
-          <p:cNvPr id="2" name="Slide Number Placeholder 1"/>
+          <p:cNvPr id="4" name="Slide Number Placeholder 3"/>
           <p:cNvSpPr>
             <a:spLocks noGrp="1"/>
           </p:cNvSpPr>
@@ -7603,13 +7530,13 @@
               <a:pPr/>
               <a:t>7</a:t>
             </a:fld>
-            <a:endParaRPr lang="en-US" dirty="0"/>
+            <a:endParaRPr lang="en-US"/>
           </a:p>
         </p:txBody>
       </p:sp>
       <p:sp>
         <p:nvSpPr>
-          <p:cNvPr id="4" name="Title 1"/>
+          <p:cNvPr id="6" name="Title 1"/>
           <p:cNvSpPr txBox="1">
             <a:spLocks/>
           </p:cNvSpPr>
@@ -7781,13 +7708,7 @@
               <a:rPr lang="en-US" sz="3600" b="1" kern="0" dirty="0" smtClean="0">
                 <a:latin typeface="Calibri" pitchFamily="34" charset="0"/>
               </a:rPr>
-              <a:t>Sharing files with </a:t>
-            </a:r>
-            <a:r>
-              <a:rPr lang="en-US" sz="3600" b="1" kern="0" dirty="0" err="1" smtClean="0">
-                <a:latin typeface="Calibri" pitchFamily="34" charset="0"/>
-              </a:rPr>
-              <a:t>bioBakery</a:t>
+              <a:t>Adding/upgrading programs</a:t>
             </a:r>
             <a:endParaRPr lang="en-US" sz="3600" kern="0" dirty="0">
               <a:latin typeface="Calibri" pitchFamily="34" charset="0"/>
@@ -7797,7 +7718,7 @@
       </p:sp>
       <p:sp>
         <p:nvSpPr>
-          <p:cNvPr id="12" name="Content Placeholder 2"/>
+          <p:cNvPr id="9" name="Content Placeholder 2"/>
           <p:cNvSpPr txBox="1">
             <a:spLocks/>
           </p:cNvSpPr>
@@ -7967,7 +7888,7 @@
                 <a:spcPts val="0"/>
               </a:spcBef>
               <a:spcAft>
-                <a:spcPts val="3000"/>
+                <a:spcPts val="600"/>
               </a:spcAft>
               <a:buFontTx/>
               <a:buNone/>
@@ -7976,261 +7897,560 @@
               <a:rPr lang="en-US" sz="2800" kern="0" dirty="0" smtClean="0">
                 <a:latin typeface="Calibri" pitchFamily="34" charset="0"/>
               </a:rPr>
-              <a:t>Sharing the clipboard between the host and guest is also helpful (this lets you copy on the host and paste on the guest, and vice versa).</a:t>
-            </a:r>
-            <a:endParaRPr lang="en-US" sz="2800" b="1" kern="0" dirty="0">
-              <a:latin typeface="Calibri" pitchFamily="34" charset="0"/>
+              <a:t>&lt;*.deb&gt; </a:t>
+            </a:r>
+            <a:r>
+              <a:rPr lang="en-US" sz="2800" kern="0" dirty="0" smtClean="0">
+                <a:latin typeface="Calibri" pitchFamily="34" charset="0"/>
+              </a:rPr>
+              <a:t>installation files are available for </a:t>
+            </a:r>
+            <a:r>
+              <a:rPr lang="en-US" sz="2800" kern="0" dirty="0" err="1" smtClean="0">
+                <a:latin typeface="Calibri" pitchFamily="34" charset="0"/>
+              </a:rPr>
+              <a:t>Huttenhower</a:t>
+            </a:r>
+            <a:r>
+              <a:rPr lang="en-US" sz="2800" kern="0" dirty="0" smtClean="0">
+                <a:latin typeface="Calibri" pitchFamily="34" charset="0"/>
+              </a:rPr>
+              <a:t> Lab tools in this repository:</a:t>
+            </a:r>
+          </a:p>
+          <a:p>
+            <a:pPr marL="0" indent="0" eaLnBrk="1" hangingPunct="1">
+              <a:spcBef>
+                <a:spcPts val="0"/>
+              </a:spcBef>
+              <a:spcAft>
+                <a:spcPts val="600"/>
+              </a:spcAft>
+              <a:buFontTx/>
+              <a:buNone/>
+            </a:pPr>
+            <a:r>
+              <a:rPr lang="en-US" sz="1800" kern="0" dirty="0">
+                <a:latin typeface="Consolas" panose="020B0609020204030204" pitchFamily="49" charset="0"/>
+                <a:cs typeface="Consolas" panose="020B0609020204030204" pitchFamily="49" charset="0"/>
+                <a:hlinkClick r:id="rId2"/>
+              </a:rPr>
+              <a:t>http://</a:t>
+            </a:r>
+            <a:r>
+              <a:rPr lang="en-US" sz="1800" kern="0" dirty="0" smtClean="0">
+                <a:latin typeface="Consolas" panose="020B0609020204030204" pitchFamily="49" charset="0"/>
+                <a:cs typeface="Consolas" panose="020B0609020204030204" pitchFamily="49" charset="0"/>
+                <a:hlinkClick r:id="rId2"/>
+              </a:rPr>
+              <a:t>huttenhower.sph.harvard.edu/biobakery-shop/deb-packages</a:t>
+            </a:r>
+            <a:endParaRPr lang="en-US" sz="1800" kern="0" dirty="0" smtClean="0">
+              <a:latin typeface="Consolas" panose="020B0609020204030204" pitchFamily="49" charset="0"/>
+              <a:cs typeface="Consolas" panose="020B0609020204030204" pitchFamily="49" charset="0"/>
+            </a:endParaRPr>
+          </a:p>
+          <a:p>
+            <a:pPr marL="0" indent="0" eaLnBrk="1" hangingPunct="1">
+              <a:spcBef>
+                <a:spcPts val="0"/>
+              </a:spcBef>
+              <a:spcAft>
+                <a:spcPts val="600"/>
+              </a:spcAft>
+              <a:buFontTx/>
+              <a:buNone/>
+            </a:pPr>
+            <a:endParaRPr lang="en-US" sz="1800" kern="0" dirty="0" smtClean="0">
+              <a:latin typeface="Consolas" panose="020B0609020204030204" pitchFamily="49" charset="0"/>
+              <a:cs typeface="Consolas" panose="020B0609020204030204" pitchFamily="49" charset="0"/>
+            </a:endParaRPr>
+          </a:p>
+          <a:p>
+            <a:pPr marL="0" indent="0" eaLnBrk="1" hangingPunct="1">
+              <a:spcBef>
+                <a:spcPts val="0"/>
+              </a:spcBef>
+              <a:spcAft>
+                <a:spcPts val="600"/>
+              </a:spcAft>
+              <a:buFontTx/>
+              <a:buNone/>
+            </a:pPr>
+            <a:r>
+              <a:rPr lang="en-US" sz="2800" kern="0" dirty="0">
+                <a:latin typeface="Calibri" pitchFamily="34" charset="0"/>
+              </a:rPr>
+              <a:t>To add or upgrade a </a:t>
+            </a:r>
+            <a:r>
+              <a:rPr lang="en-US" sz="2800" kern="0" dirty="0" err="1">
+                <a:latin typeface="Calibri" pitchFamily="34" charset="0"/>
+              </a:rPr>
+              <a:t>Huttenhower</a:t>
+            </a:r>
+            <a:r>
+              <a:rPr lang="en-US" sz="2800" kern="0" dirty="0">
+                <a:latin typeface="Calibri" pitchFamily="34" charset="0"/>
+              </a:rPr>
+              <a:t> Lab </a:t>
+            </a:r>
+            <a:r>
+              <a:rPr lang="en-US" sz="2800" kern="0" dirty="0" smtClean="0">
+                <a:latin typeface="Calibri" pitchFamily="34" charset="0"/>
+              </a:rPr>
+              <a:t>tool </a:t>
+            </a:r>
+            <a:r>
+              <a:rPr lang="en-US" sz="2800" kern="0" dirty="0">
+                <a:latin typeface="Calibri" pitchFamily="34" charset="0"/>
+              </a:rPr>
+              <a:t>run:</a:t>
+            </a:r>
+          </a:p>
+          <a:p>
+            <a:pPr marL="0" indent="0" eaLnBrk="1" hangingPunct="1">
+              <a:spcBef>
+                <a:spcPts val="0"/>
+              </a:spcBef>
+              <a:spcAft>
+                <a:spcPts val="600"/>
+              </a:spcAft>
+              <a:buFontTx/>
+              <a:buNone/>
+            </a:pPr>
+            <a:r>
+              <a:rPr lang="en-US" sz="2800" kern="0" dirty="0" smtClean="0">
+                <a:solidFill>
+                  <a:schemeClr val="tx2"/>
+                </a:solidFill>
+                <a:latin typeface="Consolas" panose="020B0609020204030204" pitchFamily="49" charset="0"/>
+                <a:cs typeface="Consolas" panose="020B0609020204030204" pitchFamily="49" charset="0"/>
+              </a:rPr>
+              <a:t>$ </a:t>
+            </a:r>
+            <a:r>
+              <a:rPr lang="en-US" sz="2800" kern="0" dirty="0" err="1" smtClean="0">
+                <a:solidFill>
+                  <a:schemeClr val="tx2"/>
+                </a:solidFill>
+                <a:latin typeface="Consolas" panose="020B0609020204030204" pitchFamily="49" charset="0"/>
+                <a:cs typeface="Consolas" panose="020B0609020204030204" pitchFamily="49" charset="0"/>
+              </a:rPr>
+              <a:t>sudo</a:t>
+            </a:r>
+            <a:r>
+              <a:rPr lang="en-US" sz="2800" kern="0" dirty="0" smtClean="0">
+                <a:solidFill>
+                  <a:schemeClr val="tx2"/>
+                </a:solidFill>
+                <a:latin typeface="Consolas" panose="020B0609020204030204" pitchFamily="49" charset="0"/>
+                <a:cs typeface="Consolas" panose="020B0609020204030204" pitchFamily="49" charset="0"/>
+              </a:rPr>
+              <a:t> </a:t>
+            </a:r>
+            <a:r>
+              <a:rPr lang="en-US" sz="2800" kern="0" dirty="0">
+                <a:solidFill>
+                  <a:schemeClr val="tx2"/>
+                </a:solidFill>
+                <a:latin typeface="Consolas" panose="020B0609020204030204" pitchFamily="49" charset="0"/>
+                <a:cs typeface="Consolas" panose="020B0609020204030204" pitchFamily="49" charset="0"/>
+              </a:rPr>
+              <a:t>apt-get install </a:t>
+            </a:r>
+            <a:r>
+              <a:rPr lang="en-US" sz="2800" i="1" kern="0" dirty="0" err="1" smtClean="0">
+                <a:solidFill>
+                  <a:schemeClr val="tx2"/>
+                </a:solidFill>
+                <a:latin typeface="Consolas" panose="020B0609020204030204" pitchFamily="49" charset="0"/>
+                <a:cs typeface="Consolas" panose="020B0609020204030204" pitchFamily="49" charset="0"/>
+              </a:rPr>
+              <a:t>hutlab_tool</a:t>
+            </a:r>
+            <a:endParaRPr lang="en-US" sz="2800" kern="0" dirty="0" smtClean="0">
+              <a:solidFill>
+                <a:schemeClr val="tx2"/>
+              </a:solidFill>
+              <a:latin typeface="Consolas" panose="020B0609020204030204" pitchFamily="49" charset="0"/>
+              <a:cs typeface="Consolas" panose="020B0609020204030204" pitchFamily="49" charset="0"/>
+            </a:endParaRPr>
+          </a:p>
+          <a:p>
+            <a:pPr marL="0" indent="0" eaLnBrk="1" hangingPunct="1">
+              <a:spcBef>
+                <a:spcPts val="0"/>
+              </a:spcBef>
+              <a:spcAft>
+                <a:spcPts val="600"/>
+              </a:spcAft>
+              <a:buFontTx/>
+              <a:buNone/>
+            </a:pPr>
+            <a:endParaRPr lang="en-US" sz="2800" kern="0" dirty="0">
+              <a:solidFill>
+                <a:schemeClr val="tx2"/>
+              </a:solidFill>
+              <a:latin typeface="Consolas" panose="020B0609020204030204" pitchFamily="49" charset="0"/>
+              <a:cs typeface="Consolas" panose="020B0609020204030204" pitchFamily="49" charset="0"/>
+            </a:endParaRPr>
+          </a:p>
+          <a:p>
+            <a:pPr marL="0" indent="0" eaLnBrk="1" hangingPunct="1">
+              <a:spcBef>
+                <a:spcPts val="0"/>
+              </a:spcBef>
+              <a:spcAft>
+                <a:spcPts val="600"/>
+              </a:spcAft>
+              <a:buFontTx/>
+              <a:buNone/>
+            </a:pPr>
+            <a:r>
+              <a:rPr lang="en-US" sz="2800" kern="0" dirty="0" smtClean="0">
+                <a:latin typeface="Calibri" pitchFamily="34" charset="0"/>
+              </a:rPr>
+              <a:t>The same command can be used to install other </a:t>
+            </a:r>
+            <a:r>
+              <a:rPr lang="en-US" sz="2800" kern="0" dirty="0" err="1" smtClean="0">
+                <a:latin typeface="Calibri" pitchFamily="34" charset="0"/>
+              </a:rPr>
+              <a:t>linux</a:t>
+            </a:r>
+            <a:r>
+              <a:rPr lang="en-US" sz="2800" kern="0" dirty="0" smtClean="0">
+                <a:latin typeface="Calibri" pitchFamily="34" charset="0"/>
+              </a:rPr>
+              <a:t> utilities (these are not supported):</a:t>
+            </a:r>
+          </a:p>
+          <a:p>
+            <a:pPr marL="0" indent="0" eaLnBrk="1" hangingPunct="1">
+              <a:spcBef>
+                <a:spcPts val="0"/>
+              </a:spcBef>
+              <a:spcAft>
+                <a:spcPts val="600"/>
+              </a:spcAft>
+              <a:buFontTx/>
+              <a:buNone/>
+            </a:pPr>
+            <a:r>
+              <a:rPr lang="en-US" sz="2800" kern="0" dirty="0" smtClean="0">
+                <a:solidFill>
+                  <a:schemeClr val="tx2"/>
+                </a:solidFill>
+                <a:latin typeface="Consolas" panose="020B0609020204030204" pitchFamily="49" charset="0"/>
+                <a:cs typeface="Consolas" panose="020B0609020204030204" pitchFamily="49" charset="0"/>
+              </a:rPr>
+              <a:t>$ </a:t>
+            </a:r>
+            <a:r>
+              <a:rPr lang="en-US" sz="2800" kern="0" dirty="0" err="1" smtClean="0">
+                <a:solidFill>
+                  <a:schemeClr val="tx2"/>
+                </a:solidFill>
+                <a:latin typeface="Consolas" panose="020B0609020204030204" pitchFamily="49" charset="0"/>
+                <a:cs typeface="Consolas" panose="020B0609020204030204" pitchFamily="49" charset="0"/>
+              </a:rPr>
+              <a:t>sudo</a:t>
+            </a:r>
+            <a:r>
+              <a:rPr lang="en-US" sz="2800" kern="0" dirty="0" smtClean="0">
+                <a:solidFill>
+                  <a:schemeClr val="tx2"/>
+                </a:solidFill>
+                <a:latin typeface="Consolas" panose="020B0609020204030204" pitchFamily="49" charset="0"/>
+                <a:cs typeface="Consolas" panose="020B0609020204030204" pitchFamily="49" charset="0"/>
+              </a:rPr>
+              <a:t> </a:t>
+            </a:r>
+            <a:r>
+              <a:rPr lang="en-US" sz="2800" kern="0" dirty="0">
+                <a:solidFill>
+                  <a:schemeClr val="tx2"/>
+                </a:solidFill>
+                <a:latin typeface="Consolas" panose="020B0609020204030204" pitchFamily="49" charset="0"/>
+                <a:cs typeface="Consolas" panose="020B0609020204030204" pitchFamily="49" charset="0"/>
+              </a:rPr>
+              <a:t>apt-get install </a:t>
+            </a:r>
+            <a:r>
+              <a:rPr lang="en-US" sz="2800" i="1" kern="0" dirty="0" err="1" smtClean="0">
+                <a:solidFill>
+                  <a:schemeClr val="tx2"/>
+                </a:solidFill>
+                <a:latin typeface="Consolas" panose="020B0609020204030204" pitchFamily="49" charset="0"/>
+                <a:cs typeface="Consolas" panose="020B0609020204030204" pitchFamily="49" charset="0"/>
+              </a:rPr>
+              <a:t>other_utility</a:t>
+            </a:r>
+            <a:endParaRPr lang="en-US" sz="2800" kern="0" dirty="0">
+              <a:solidFill>
+                <a:schemeClr val="tx2"/>
+              </a:solidFill>
+              <a:latin typeface="Consolas" panose="020B0609020204030204" pitchFamily="49" charset="0"/>
+              <a:cs typeface="Consolas" panose="020B0609020204030204" pitchFamily="49" charset="0"/>
             </a:endParaRPr>
           </a:p>
         </p:txBody>
       </p:sp>
-      <p:pic>
-        <p:nvPicPr>
-          <p:cNvPr id="3074" name="Picture 2"/>
-          <p:cNvPicPr>
-            <a:picLocks noChangeAspect="1" noChangeArrowheads="1"/>
-          </p:cNvPicPr>
+    </p:spTree>
+    <p:extLst>
+      <p:ext uri="{BB962C8B-B14F-4D97-AF65-F5344CB8AC3E}">
+        <p14:creationId xmlns:p14="http://schemas.microsoft.com/office/powerpoint/2010/main" val="4102604449"/>
+      </p:ext>
+    </p:extLst>
+  </p:cSld>
+  <p:clrMapOvr>
+    <a:masterClrMapping/>
+  </p:clrMapOvr>
+  <mc:AlternateContent xmlns:mc="http://schemas.openxmlformats.org/markup-compatibility/2006" xmlns:p14="http://schemas.microsoft.com/office/powerpoint/2010/main">
+    <mc:Choice Requires="p14">
+      <p:transition p14:dur="0"/>
+    </mc:Choice>
+    <mc:Fallback xmlns="">
+      <p:transition/>
+    </mc:Fallback>
+  </mc:AlternateContent>
+  <p:timing>
+    <p:tnLst>
+      <p:par>
+        <p:cTn id="1" dur="indefinite" restart="never" nodeType="tmRoot"/>
+      </p:par>
+    </p:tnLst>
+  </p:timing>
+</p:sld>
+</file>
+
+<file path=ppt/slides/slide8.xml><?xml version="1.0" encoding="utf-8"?>
+<p:sld xmlns:a="http://schemas.openxmlformats.org/drawingml/2006/main" xmlns:r="http://schemas.openxmlformats.org/officeDocument/2006/relationships" xmlns:p="http://schemas.openxmlformats.org/presentationml/2006/main">
+  <p:cSld>
+    <p:spTree>
+      <p:nvGrpSpPr>
+        <p:cNvPr id="1" name=""/>
+        <p:cNvGrpSpPr/>
+        <p:nvPr/>
+      </p:nvGrpSpPr>
+      <p:grpSpPr>
+        <a:xfrm>
+          <a:off x="0" y="0"/>
+          <a:ext cx="0" cy="0"/>
+          <a:chOff x="0" y="0"/>
+          <a:chExt cx="0" cy="0"/>
+        </a:xfrm>
+      </p:grpSpPr>
+      <p:sp>
+        <p:nvSpPr>
+          <p:cNvPr id="4" name="Slide Number Placeholder 3"/>
+          <p:cNvSpPr>
+            <a:spLocks noGrp="1"/>
+          </p:cNvSpPr>
+          <p:nvPr>
+            <p:ph type="sldNum" sz="quarter" idx="12"/>
+          </p:nvPr>
+        </p:nvSpPr>
+        <p:spPr/>
+        <p:txBody>
+          <a:bodyPr/>
+          <a:lstStyle/>
+          <a:p>
+            <a:fld id="{C71C242F-20BE-4F6C-ABA6-9DCC8641EF60}" type="slidenum">
+              <a:rPr lang="en-US" smtClean="0"/>
+              <a:pPr/>
+              <a:t>8</a:t>
+            </a:fld>
+            <a:endParaRPr lang="en-US"/>
+          </a:p>
+        </p:txBody>
+      </p:sp>
+      <p:sp>
+        <p:nvSpPr>
+          <p:cNvPr id="6" name="Title 1"/>
+          <p:cNvSpPr txBox="1">
+            <a:spLocks/>
+          </p:cNvSpPr>
           <p:nvPr/>
-        </p:nvPicPr>
-        <p:blipFill rotWithShape="1">
-          <a:blip r:embed="rId2">
-            <a:extLst>
-              <a:ext uri="{28A0092B-C50C-407E-A947-70E740481C1C}">
-                <a14:useLocalDpi xmlns:a14="http://schemas.microsoft.com/office/drawing/2010/main" val="0"/>
-              </a:ext>
-            </a:extLst>
-          </a:blip>
-          <a:srcRect l="41750" t="37600" r="22833" b="21467"/>
-          <a:stretch/>
-        </p:blipFill>
+        </p:nvSpPr>
         <p:spPr bwMode="auto">
           <a:xfrm>
-            <a:off x="4483637" y="3048000"/>
-            <a:ext cx="4050763" cy="2926080"/>
+            <a:off x="914400" y="76200"/>
+            <a:ext cx="8153400" cy="685800"/>
           </a:xfrm>
           <a:prstGeom prst="rect">
             <a:avLst/>
           </a:prstGeom>
           <a:noFill/>
-          <a:ln>
+          <a:ln w="9525">
             <a:noFill/>
+            <a:miter lim="800000"/>
+            <a:headEnd/>
+            <a:tailEnd/>
           </a:ln>
-          <a:extLst>
-            <a:ext uri="{909E8E84-426E-40DD-AFC4-6F175D3DCCD1}">
-              <a14:hiddenFill xmlns:a14="http://schemas.microsoft.com/office/drawing/2010/main">
-                <a:solidFill>
-                  <a:schemeClr val="accent1"/>
-                </a:solidFill>
-              </a14:hiddenFill>
-            </a:ext>
-            <a:ext uri="{91240B29-F687-4F45-9708-019B960494DF}">
-              <a14:hiddenLine xmlns:a14="http://schemas.microsoft.com/office/drawing/2010/main" w="9525">
-                <a:solidFill>
-                  <a:schemeClr val="tx1"/>
-                </a:solidFill>
-                <a:miter lim="800000"/>
-                <a:headEnd/>
-                <a:tailEnd/>
-              </a14:hiddenLine>
-            </a:ext>
-          </a:extLst>
-        </p:spPr>
-      </p:pic>
-      <p:sp>
-        <p:nvSpPr>
-          <p:cNvPr id="7" name="Rectangle 6"/>
-          <p:cNvSpPr/>
-          <p:nvPr/>
-        </p:nvSpPr>
-        <p:spPr bwMode="auto">
-          <a:xfrm>
-            <a:off x="4495800" y="3200400"/>
-            <a:ext cx="914400" cy="304800"/>
-          </a:xfrm>
-          <a:prstGeom prst="rect">
-            <a:avLst/>
-          </a:prstGeom>
-          <a:noFill/>
-          <a:ln w="38100" cap="flat" cmpd="sng" algn="ctr">
-            <a:solidFill>
-              <a:srgbClr val="92D050"/>
-            </a:solidFill>
-            <a:prstDash val="solid"/>
-            <a:round/>
-            <a:headEnd type="none" w="med" len="med"/>
-            <a:tailEnd type="none" w="med" len="med"/>
-          </a:ln>
-          <a:effectLst/>
         </p:spPr>
         <p:txBody>
-          <a:bodyPr vert="horz" wrap="square" lIns="91440" tIns="45720" rIns="91440" bIns="45720" numCol="1" rtlCol="0" anchor="t" anchorCtr="0" compatLnSpc="1">
+          <a:bodyPr vert="horz" wrap="square" lIns="91440" tIns="45720" rIns="91440" bIns="45720" numCol="1" anchor="ctr" anchorCtr="0" compatLnSpc="1">
             <a:prstTxWarp prst="textNoShape">
               <a:avLst/>
             </a:prstTxWarp>
           </a:bodyPr>
-          <a:lstStyle/>
-          <a:p>
-            <a:pPr marL="0" marR="0" indent="0" algn="l" defTabSz="914400" rtl="0" eaLnBrk="0" fontAlgn="base" latinLnBrk="0" hangingPunct="0">
-              <a:lnSpc>
-                <a:spcPct val="100000"/>
-              </a:lnSpc>
-              <a:spcBef>
-                <a:spcPct val="0"/>
-              </a:spcBef>
-              <a:spcAft>
-                <a:spcPct val="0"/>
-              </a:spcAft>
-              <a:buClrTx/>
-              <a:buSzTx/>
-              <a:buFontTx/>
-              <a:buNone/>
-              <a:tabLst/>
-            </a:pPr>
-            <a:endParaRPr kumimoji="0" lang="en-US" sz="2400" b="0" i="0" u="none" strike="noStrike" cap="none" normalizeH="0" baseline="0" smtClean="0">
-              <a:ln>
-                <a:noFill/>
-              </a:ln>
-              <a:solidFill>
-                <a:schemeClr val="tx1"/>
-              </a:solidFill>
-              <a:effectLst/>
-              <a:latin typeface="Arial" charset="0"/>
-              <a:ea typeface="ＭＳ Ｐゴシック" pitchFamily="1" charset="-128"/>
+          <a:lstStyle>
+            <a:lvl1pPr algn="ctr" rtl="0" fontAlgn="base">
+              <a:spcBef>
+                <a:spcPct val="0"/>
+              </a:spcBef>
+              <a:spcAft>
+                <a:spcPct val="0"/>
+              </a:spcAft>
+              <a:defRPr sz="4000">
+                <a:solidFill>
+                  <a:schemeClr val="tx2"/>
+                </a:solidFill>
+                <a:latin typeface="+mj-lt"/>
+                <a:ea typeface="+mj-ea"/>
+                <a:cs typeface="+mj-cs"/>
+              </a:defRPr>
+            </a:lvl1pPr>
+            <a:lvl2pPr algn="ctr" rtl="0" fontAlgn="base">
+              <a:spcBef>
+                <a:spcPct val="0"/>
+              </a:spcBef>
+              <a:spcAft>
+                <a:spcPct val="0"/>
+              </a:spcAft>
+              <a:defRPr sz="4400">
+                <a:solidFill>
+                  <a:schemeClr val="tx2"/>
+                </a:solidFill>
+                <a:latin typeface="Arial" charset="0"/>
+                <a:ea typeface="ＭＳ Ｐゴシック" pitchFamily="1" charset="-128"/>
+              </a:defRPr>
+            </a:lvl2pPr>
+            <a:lvl3pPr algn="ctr" rtl="0" fontAlgn="base">
+              <a:spcBef>
+                <a:spcPct val="0"/>
+              </a:spcBef>
+              <a:spcAft>
+                <a:spcPct val="0"/>
+              </a:spcAft>
+              <a:defRPr sz="4400">
+                <a:solidFill>
+                  <a:schemeClr val="tx2"/>
+                </a:solidFill>
+                <a:latin typeface="Arial" charset="0"/>
+                <a:ea typeface="ＭＳ Ｐゴシック" pitchFamily="1" charset="-128"/>
+              </a:defRPr>
+            </a:lvl3pPr>
+            <a:lvl4pPr algn="ctr" rtl="0" fontAlgn="base">
+              <a:spcBef>
+                <a:spcPct val="0"/>
+              </a:spcBef>
+              <a:spcAft>
+                <a:spcPct val="0"/>
+              </a:spcAft>
+              <a:defRPr sz="4400">
+                <a:solidFill>
+                  <a:schemeClr val="tx2"/>
+                </a:solidFill>
+                <a:latin typeface="Arial" charset="0"/>
+                <a:ea typeface="ＭＳ Ｐゴシック" pitchFamily="1" charset="-128"/>
+              </a:defRPr>
+            </a:lvl4pPr>
+            <a:lvl5pPr algn="ctr" rtl="0" fontAlgn="base">
+              <a:spcBef>
+                <a:spcPct val="0"/>
+              </a:spcBef>
+              <a:spcAft>
+                <a:spcPct val="0"/>
+              </a:spcAft>
+              <a:defRPr sz="4400">
+                <a:solidFill>
+                  <a:schemeClr val="tx2"/>
+                </a:solidFill>
+                <a:latin typeface="Arial" charset="0"/>
+                <a:ea typeface="ＭＳ Ｐゴシック" pitchFamily="1" charset="-128"/>
+              </a:defRPr>
+            </a:lvl5pPr>
+            <a:lvl6pPr marL="457200" algn="ctr" rtl="0" fontAlgn="base">
+              <a:spcBef>
+                <a:spcPct val="0"/>
+              </a:spcBef>
+              <a:spcAft>
+                <a:spcPct val="0"/>
+              </a:spcAft>
+              <a:defRPr sz="4400">
+                <a:solidFill>
+                  <a:schemeClr val="tx2"/>
+                </a:solidFill>
+                <a:latin typeface="Arial" charset="0"/>
+                <a:ea typeface="ＭＳ Ｐゴシック" pitchFamily="1" charset="-128"/>
+              </a:defRPr>
+            </a:lvl6pPr>
+            <a:lvl7pPr marL="914400" algn="ctr" rtl="0" fontAlgn="base">
+              <a:spcBef>
+                <a:spcPct val="0"/>
+              </a:spcBef>
+              <a:spcAft>
+                <a:spcPct val="0"/>
+              </a:spcAft>
+              <a:defRPr sz="4400">
+                <a:solidFill>
+                  <a:schemeClr val="tx2"/>
+                </a:solidFill>
+                <a:latin typeface="Arial" charset="0"/>
+                <a:ea typeface="ＭＳ Ｐゴシック" pitchFamily="1" charset="-128"/>
+              </a:defRPr>
+            </a:lvl7pPr>
+            <a:lvl8pPr marL="1371600" algn="ctr" rtl="0" fontAlgn="base">
+              <a:spcBef>
+                <a:spcPct val="0"/>
+              </a:spcBef>
+              <a:spcAft>
+                <a:spcPct val="0"/>
+              </a:spcAft>
+              <a:defRPr sz="4400">
+                <a:solidFill>
+                  <a:schemeClr val="tx2"/>
+                </a:solidFill>
+                <a:latin typeface="Arial" charset="0"/>
+                <a:ea typeface="ＭＳ Ｐゴシック" pitchFamily="1" charset="-128"/>
+              </a:defRPr>
+            </a:lvl8pPr>
+            <a:lvl9pPr marL="1828800" algn="ctr" rtl="0" fontAlgn="base">
+              <a:spcBef>
+                <a:spcPct val="0"/>
+              </a:spcBef>
+              <a:spcAft>
+                <a:spcPct val="0"/>
+              </a:spcAft>
+              <a:defRPr sz="4400">
+                <a:solidFill>
+                  <a:schemeClr val="tx2"/>
+                </a:solidFill>
+                <a:latin typeface="Arial" charset="0"/>
+                <a:ea typeface="ＭＳ Ｐゴシック" pitchFamily="1" charset="-128"/>
+              </a:defRPr>
+            </a:lvl9pPr>
+          </a:lstStyle>
+          <a:p>
+            <a:pPr algn="l" eaLnBrk="1" hangingPunct="1"/>
+            <a:r>
+              <a:rPr lang="en-US" sz="3600" b="1" kern="0" dirty="0" smtClean="0">
+                <a:latin typeface="Calibri" pitchFamily="34" charset="0"/>
+              </a:rPr>
+              <a:t>For more help</a:t>
+            </a:r>
+            <a:endParaRPr lang="en-US" sz="3600" kern="0" dirty="0">
+              <a:latin typeface="Calibri" pitchFamily="34" charset="0"/>
             </a:endParaRPr>
           </a:p>
         </p:txBody>
       </p:sp>
       <p:sp>
         <p:nvSpPr>
-          <p:cNvPr id="8" name="Rectangle 7"/>
-          <p:cNvSpPr/>
-          <p:nvPr/>
-        </p:nvSpPr>
-        <p:spPr bwMode="auto">
-          <a:xfrm>
-            <a:off x="5691147" y="3505200"/>
-            <a:ext cx="609600" cy="342900"/>
-          </a:xfrm>
-          <a:prstGeom prst="rect">
-            <a:avLst/>
-          </a:prstGeom>
-          <a:noFill/>
-          <a:ln w="38100" cap="flat" cmpd="sng" algn="ctr">
-            <a:solidFill>
-              <a:srgbClr val="92D050"/>
-            </a:solidFill>
-            <a:prstDash val="solid"/>
-            <a:round/>
-            <a:headEnd type="none" w="med" len="med"/>
-            <a:tailEnd type="none" w="med" len="med"/>
-          </a:ln>
-          <a:effectLst/>
-        </p:spPr>
-        <p:txBody>
-          <a:bodyPr vert="horz" wrap="square" lIns="91440" tIns="45720" rIns="91440" bIns="45720" numCol="1" rtlCol="0" anchor="t" anchorCtr="0" compatLnSpc="1">
-            <a:prstTxWarp prst="textNoShape">
-              <a:avLst/>
-            </a:prstTxWarp>
-          </a:bodyPr>
-          <a:lstStyle/>
-          <a:p>
-            <a:pPr marL="0" marR="0" indent="0" algn="l" defTabSz="914400" rtl="0" eaLnBrk="0" fontAlgn="base" latinLnBrk="0" hangingPunct="0">
-              <a:lnSpc>
-                <a:spcPct val="100000"/>
-              </a:lnSpc>
-              <a:spcBef>
-                <a:spcPct val="0"/>
-              </a:spcBef>
-              <a:spcAft>
-                <a:spcPct val="0"/>
-              </a:spcAft>
-              <a:buClrTx/>
-              <a:buSzTx/>
-              <a:buFontTx/>
-              <a:buNone/>
-              <a:tabLst/>
-            </a:pPr>
-            <a:endParaRPr kumimoji="0" lang="en-US" sz="2400" b="0" i="0" u="none" strike="noStrike" cap="none" normalizeH="0" baseline="0" smtClean="0">
-              <a:ln>
-                <a:noFill/>
-              </a:ln>
-              <a:solidFill>
-                <a:schemeClr val="tx1"/>
-              </a:solidFill>
-              <a:effectLst/>
-              <a:latin typeface="Arial" charset="0"/>
-              <a:ea typeface="ＭＳ Ｐゴシック" pitchFamily="1" charset="-128"/>
-            </a:endParaRPr>
-          </a:p>
-        </p:txBody>
-      </p:sp>
-      <p:sp>
-        <p:nvSpPr>
-          <p:cNvPr id="9" name="Rectangle 8"/>
-          <p:cNvSpPr/>
-          <p:nvPr/>
-        </p:nvSpPr>
-        <p:spPr bwMode="auto">
-          <a:xfrm>
-            <a:off x="5442004" y="3962400"/>
-            <a:ext cx="1676399" cy="266700"/>
-          </a:xfrm>
-          <a:prstGeom prst="rect">
-            <a:avLst/>
-          </a:prstGeom>
-          <a:noFill/>
-          <a:ln w="38100" cap="flat" cmpd="sng" algn="ctr">
-            <a:solidFill>
-              <a:srgbClr val="92D050"/>
-            </a:solidFill>
-            <a:prstDash val="solid"/>
-            <a:round/>
-            <a:headEnd type="none" w="med" len="med"/>
-            <a:tailEnd type="none" w="med" len="med"/>
-          </a:ln>
-          <a:effectLst/>
-        </p:spPr>
-        <p:txBody>
-          <a:bodyPr vert="horz" wrap="square" lIns="91440" tIns="45720" rIns="91440" bIns="45720" numCol="1" rtlCol="0" anchor="t" anchorCtr="0" compatLnSpc="1">
-            <a:prstTxWarp prst="textNoShape">
-              <a:avLst/>
-            </a:prstTxWarp>
-          </a:bodyPr>
-          <a:lstStyle/>
-          <a:p>
-            <a:pPr marL="0" marR="0" indent="0" algn="l" defTabSz="914400" rtl="0" eaLnBrk="0" fontAlgn="base" latinLnBrk="0" hangingPunct="0">
-              <a:lnSpc>
-                <a:spcPct val="100000"/>
-              </a:lnSpc>
-              <a:spcBef>
-                <a:spcPct val="0"/>
-              </a:spcBef>
-              <a:spcAft>
-                <a:spcPct val="0"/>
-              </a:spcAft>
-              <a:buClrTx/>
-              <a:buSzTx/>
-              <a:buFontTx/>
-              <a:buNone/>
-              <a:tabLst/>
-            </a:pPr>
-            <a:endParaRPr kumimoji="0" lang="en-US" sz="2400" b="0" i="0" u="none" strike="noStrike" cap="none" normalizeH="0" baseline="0" smtClean="0">
-              <a:ln>
-                <a:noFill/>
-              </a:ln>
-              <a:solidFill>
-                <a:schemeClr val="tx1"/>
-              </a:solidFill>
-              <a:effectLst/>
-              <a:latin typeface="Arial" charset="0"/>
-              <a:ea typeface="ＭＳ Ｐゴシック" pitchFamily="1" charset="-128"/>
-            </a:endParaRPr>
-          </a:p>
-        </p:txBody>
-      </p:sp>
-      <p:sp>
-        <p:nvSpPr>
-          <p:cNvPr id="10" name="Content Placeholder 2"/>
+          <p:cNvPr id="9" name="Content Placeholder 2"/>
           <p:cNvSpPr txBox="1">
             <a:spLocks/>
           </p:cNvSpPr>
@@ -8238,8 +8458,8 @@
         </p:nvSpPr>
         <p:spPr>
           <a:xfrm>
-            <a:off x="266700" y="3200400"/>
-            <a:ext cx="3848100" cy="2743200"/>
+            <a:off x="266700" y="1143000"/>
+            <a:ext cx="8610600" cy="5410200"/>
           </a:xfrm>
           <a:prstGeom prst="rect">
             <a:avLst/>
@@ -8406,22 +8626,22 @@
               <a:buNone/>
             </a:pPr>
             <a:r>
-              <a:rPr lang="en-US" sz="2400" kern="0" dirty="0" smtClean="0">
-                <a:latin typeface="Calibri" pitchFamily="34" charset="0"/>
-              </a:rPr>
-              <a:t>In the </a:t>
-            </a:r>
-            <a:r>
-              <a:rPr lang="en-US" sz="2400" kern="0" dirty="0" err="1" smtClean="0">
-                <a:latin typeface="Calibri" pitchFamily="34" charset="0"/>
-              </a:rPr>
-              <a:t>VirtualBox</a:t>
-            </a:r>
-            <a:r>
-              <a:rPr lang="en-US" sz="2400" kern="0" dirty="0" smtClean="0">
-                <a:latin typeface="Calibri" pitchFamily="34" charset="0"/>
-              </a:rPr>
-              <a:t> app… </a:t>
+              <a:rPr lang="en-US" sz="2800" kern="0" dirty="0" smtClean="0">
+                <a:latin typeface="Calibri" pitchFamily="34" charset="0"/>
+              </a:rPr>
+              <a:t>Check out the </a:t>
+            </a:r>
+            <a:r>
+              <a:rPr lang="en-US" sz="2800" kern="0" dirty="0" err="1" smtClean="0">
+                <a:latin typeface="Calibri" pitchFamily="34" charset="0"/>
+              </a:rPr>
+              <a:t>bioBakery</a:t>
+            </a:r>
+            <a:r>
+              <a:rPr lang="en-US" sz="2800" kern="0" dirty="0" smtClean="0">
+                <a:latin typeface="Calibri" pitchFamily="34" charset="0"/>
+              </a:rPr>
+              <a:t> wiki for more information:</a:t>
             </a:r>
           </a:p>
           <a:p>
@@ -8436,11 +8656,25 @@
               <a:buNone/>
             </a:pPr>
             <a:r>
-              <a:rPr lang="en-US" sz="2400" kern="0" dirty="0" smtClean="0">
-                <a:latin typeface="Calibri" pitchFamily="34" charset="0"/>
-              </a:rPr>
-              <a:t>Under settings/General…</a:t>
-            </a:r>
+              <a:rPr lang="en-US" sz="1800" kern="0" dirty="0">
+                <a:latin typeface="Consolas" panose="020B0609020204030204" pitchFamily="49" charset="0"/>
+                <a:cs typeface="Consolas" panose="020B0609020204030204" pitchFamily="49" charset="0"/>
+                <a:hlinkClick r:id="rId2"/>
+              </a:rPr>
+              <a:t>https://</a:t>
+            </a:r>
+            <a:r>
+              <a:rPr lang="en-US" sz="1800" kern="0" dirty="0" smtClean="0">
+                <a:latin typeface="Consolas" panose="020B0609020204030204" pitchFamily="49" charset="0"/>
+                <a:cs typeface="Consolas" panose="020B0609020204030204" pitchFamily="49" charset="0"/>
+                <a:hlinkClick r:id="rId2"/>
+              </a:rPr>
+              <a:t>bitbucket.org/biobakery/biobakery/wiki/biobakery_wiki</a:t>
+            </a:r>
+            <a:endParaRPr lang="en-US" sz="1800" kern="0" dirty="0" smtClean="0">
+              <a:latin typeface="Consolas" panose="020B0609020204030204" pitchFamily="49" charset="0"/>
+              <a:cs typeface="Consolas" panose="020B0609020204030204" pitchFamily="49" charset="0"/>
+            </a:endParaRPr>
           </a:p>
           <a:p>
             <a:pPr marL="0" indent="0" eaLnBrk="1" hangingPunct="1">
@@ -8453,12 +8687,10 @@
               <a:buFontTx/>
               <a:buNone/>
             </a:pPr>
-            <a:r>
-              <a:rPr lang="en-US" sz="2400" kern="0" dirty="0" smtClean="0">
-                <a:latin typeface="Calibri" pitchFamily="34" charset="0"/>
-              </a:rPr>
-              <a:t>Select the Advanced tab… </a:t>
-            </a:r>
+            <a:endParaRPr lang="en-US" sz="1800" kern="0" dirty="0">
+              <a:latin typeface="Consolas" panose="020B0609020204030204" pitchFamily="49" charset="0"/>
+              <a:cs typeface="Consolas" panose="020B0609020204030204" pitchFamily="49" charset="0"/>
+            </a:endParaRPr>
           </a:p>
           <a:p>
             <a:pPr marL="0" indent="0" eaLnBrk="1" hangingPunct="1">
@@ -8468,17 +8700,65 @@
               <a:spcAft>
                 <a:spcPts val="600"/>
               </a:spcAft>
+              <a:buNone/>
+            </a:pPr>
+            <a:r>
+              <a:rPr lang="en-US" sz="2800" kern="0" dirty="0">
+                <a:latin typeface="Calibri" pitchFamily="34" charset="0"/>
+              </a:rPr>
+              <a:t>You can also join and email the </a:t>
+            </a:r>
+            <a:r>
+              <a:rPr lang="en-US" sz="2800" kern="0" dirty="0" err="1">
+                <a:latin typeface="Calibri" pitchFamily="34" charset="0"/>
+              </a:rPr>
+              <a:t>bioBakery</a:t>
+            </a:r>
+            <a:r>
+              <a:rPr lang="en-US" sz="2800" kern="0" dirty="0">
+                <a:latin typeface="Calibri" pitchFamily="34" charset="0"/>
+              </a:rPr>
+              <a:t> user group:</a:t>
+            </a:r>
+          </a:p>
+          <a:p>
+            <a:pPr marL="0" indent="0" eaLnBrk="1" hangingPunct="1">
+              <a:spcBef>
+                <a:spcPts val="0"/>
+              </a:spcBef>
+              <a:spcAft>
+                <a:spcPts val="600"/>
+              </a:spcAft>
               <a:buFontTx/>
               <a:buNone/>
             </a:pPr>
             <a:r>
-              <a:rPr lang="en-US" sz="2400" kern="0" dirty="0" smtClean="0">
-                <a:latin typeface="Calibri" pitchFamily="34" charset="0"/>
-              </a:rPr>
-              <a:t>Set “Shared Clipboard” to “Bidirectional”</a:t>
-            </a:r>
-            <a:endParaRPr lang="en-US" sz="2400" kern="0" dirty="0">
-              <a:latin typeface="Calibri" pitchFamily="34" charset="0"/>
+              <a:rPr lang="en-US" sz="1800" kern="0" dirty="0" smtClean="0">
+                <a:latin typeface="Consolas" panose="020B0609020204030204" pitchFamily="49" charset="0"/>
+                <a:cs typeface="Consolas" panose="020B0609020204030204" pitchFamily="49" charset="0"/>
+                <a:hlinkClick r:id="rId3"/>
+              </a:rPr>
+              <a:t>biobakery-users@googlegroups.com</a:t>
+            </a:r>
+            <a:endParaRPr lang="en-US" sz="1800" kern="0" dirty="0" smtClean="0">
+              <a:latin typeface="Consolas" panose="020B0609020204030204" pitchFamily="49" charset="0"/>
+              <a:cs typeface="Consolas" panose="020B0609020204030204" pitchFamily="49" charset="0"/>
+            </a:endParaRPr>
+          </a:p>
+          <a:p>
+            <a:pPr marL="0" indent="0" eaLnBrk="1" hangingPunct="1">
+              <a:spcBef>
+                <a:spcPts val="0"/>
+              </a:spcBef>
+              <a:spcAft>
+                <a:spcPts val="600"/>
+              </a:spcAft>
+              <a:buFontTx/>
+              <a:buNone/>
+            </a:pPr>
+            <a:endParaRPr lang="en-US" sz="1800" kern="0" dirty="0" smtClean="0">
+              <a:latin typeface="Consolas" panose="020B0609020204030204" pitchFamily="49" charset="0"/>
+              <a:cs typeface="Consolas" panose="020B0609020204030204" pitchFamily="49" charset="0"/>
             </a:endParaRPr>
           </a:p>
         </p:txBody>
@@ -8486,18 +8766,18 @@
     </p:spTree>
     <p:extLst>
       <p:ext uri="{BB962C8B-B14F-4D97-AF65-F5344CB8AC3E}">
-        <p14:creationId xmlns:p14="http://schemas.microsoft.com/office/powerpoint/2010/main" val="2901533625"/>
+        <p14:creationId xmlns:p14="http://schemas.microsoft.com/office/powerpoint/2010/main" val="1260589068"/>
       </p:ext>
     </p:extLst>
   </p:cSld>
   <p:clrMapOvr>
     <a:masterClrMapping/>
   </p:clrMapOvr>
-  <mc:AlternateContent xmlns:mc="http://schemas.openxmlformats.org/markup-compatibility/2006">
-    <mc:Choice xmlns:p14="http://schemas.microsoft.com/office/powerpoint/2010/main" Requires="p14">
+  <mc:AlternateContent xmlns:mc="http://schemas.openxmlformats.org/markup-compatibility/2006" xmlns:p14="http://schemas.microsoft.com/office/powerpoint/2010/main">
+    <mc:Choice Requires="p14">
       <p:transition p14:dur="0"/>
     </mc:Choice>
-    <mc:Fallback>
+    <mc:Fallback xmlns="">
       <p:transition/>
     </mc:Fallback>
   </mc:AlternateContent>

</xml_diff>

<commit_message>
updates to the internal welcome doc
</commit_message>
<xml_diff>
--- a/vagrant/biobakery-gui/WELCOME.pptx
+++ b/vagrant/biobakery-gui/WELCOME.pptx
@@ -5,17 +5,19 @@
     <p:sldMasterId id="2147483648" r:id="rId1"/>
   </p:sldMasterIdLst>
   <p:notesMasterIdLst>
-    <p:notesMasterId r:id="rId10"/>
+    <p:notesMasterId r:id="rId12"/>
   </p:notesMasterIdLst>
   <p:sldIdLst>
     <p:sldId id="585" r:id="rId2"/>
     <p:sldId id="586" r:id="rId3"/>
     <p:sldId id="587" r:id="rId4"/>
     <p:sldId id="592" r:id="rId5"/>
-    <p:sldId id="588" r:id="rId6"/>
-    <p:sldId id="593" r:id="rId7"/>
-    <p:sldId id="594" r:id="rId8"/>
-    <p:sldId id="595" r:id="rId9"/>
+    <p:sldId id="596" r:id="rId6"/>
+    <p:sldId id="588" r:id="rId7"/>
+    <p:sldId id="593" r:id="rId8"/>
+    <p:sldId id="597" r:id="rId9"/>
+    <p:sldId id="594" r:id="rId10"/>
+    <p:sldId id="595" r:id="rId11"/>
   </p:sldIdLst>
   <p:sldSz cx="9144000" cy="6858000" type="screen4x3"/>
   <p:notesSz cx="6858000" cy="9144000"/>
@@ -4179,7 +4181,13 @@
               <a:rPr lang="en-US" sz="2800" kern="0" dirty="0" smtClean="0">
                 <a:latin typeface="Calibri" pitchFamily="34" charset="0"/>
               </a:rPr>
-              <a:t> analyses.</a:t>
+              <a:t> </a:t>
+            </a:r>
+            <a:r>
+              <a:rPr lang="en-US" sz="2800" kern="0" dirty="0" smtClean="0">
+                <a:latin typeface="Calibri" pitchFamily="34" charset="0"/>
+              </a:rPr>
+              <a:t>analyses.</a:t>
             </a:r>
           </a:p>
           <a:p>
@@ -4215,48 +4223,22 @@
               <a:rPr lang="en-US" sz="2800" kern="0" dirty="0" smtClean="0">
                 <a:latin typeface="Calibri" pitchFamily="34" charset="0"/>
               </a:rPr>
-              <a:t> lab at the Harvard School of </a:t>
-            </a:r>
-            <a:r>
-              <a:rPr lang="en-US" sz="2800" kern="0" dirty="0">
-                <a:latin typeface="Calibri" pitchFamily="34" charset="0"/>
-              </a:rPr>
-              <a:t>Public </a:t>
-            </a:r>
-            <a:r>
-              <a:rPr lang="en-US" sz="2800" kern="0" dirty="0" smtClean="0">
-                <a:latin typeface="Calibri" pitchFamily="34" charset="0"/>
-              </a:rPr>
-              <a:t>Health:</a:t>
-            </a:r>
-            <a:r>
-              <a:rPr lang="en-US" sz="2800" kern="0" dirty="0">
-                <a:latin typeface="Calibri" pitchFamily="34" charset="0"/>
-              </a:rPr>
-              <a:t/>
+              <a:t> lab at the Harvard School of Public Health:</a:t>
             </a:r>
             <a:br>
-              <a:rPr lang="en-US" sz="2800" kern="0" dirty="0">
+              <a:rPr lang="en-US" sz="2800" kern="0" dirty="0" smtClean="0">
                 <a:latin typeface="Calibri" pitchFamily="34" charset="0"/>
               </a:rPr>
             </a:br>
             <a:r>
-              <a:rPr lang="en-US" sz="2400" kern="0" dirty="0">
+              <a:rPr lang="en-US" sz="2400" kern="0" cap="small" dirty="0" smtClean="0">
                 <a:latin typeface="Consolas" panose="020B0609020204030204" pitchFamily="49" charset="0"/>
                 <a:cs typeface="Consolas" panose="020B0609020204030204" pitchFamily="49" charset="0"/>
                 <a:hlinkClick r:id="rId2"/>
               </a:rPr>
-              <a:t>http://huttenhower.sph.harvard.edu</a:t>
-            </a:r>
-            <a:r>
-              <a:rPr lang="en-US" sz="2400" kern="0" dirty="0" smtClean="0">
-                <a:latin typeface="Consolas" panose="020B0609020204030204" pitchFamily="49" charset="0"/>
-                <a:cs typeface="Consolas" panose="020B0609020204030204" pitchFamily="49" charset="0"/>
-                <a:hlinkClick r:id="rId2"/>
-              </a:rPr>
-              <a:t>/</a:t>
-            </a:r>
-            <a:endParaRPr lang="en-US" sz="2400" kern="0" dirty="0" smtClean="0">
+              <a:t>http://huttenhower.sph.harvard.edu/</a:t>
+            </a:r>
+            <a:endParaRPr lang="en-US" sz="2400" kern="0" cap="small" dirty="0" smtClean="0">
               <a:latin typeface="Consolas" panose="020B0609020204030204" pitchFamily="49" charset="0"/>
               <a:cs typeface="Consolas" panose="020B0609020204030204" pitchFamily="49" charset="0"/>
             </a:endParaRPr>
@@ -4282,11 +4264,32 @@
               <a:rPr lang="en-US" sz="2800" kern="0" dirty="0" smtClean="0">
                 <a:latin typeface="Calibri" pitchFamily="34" charset="0"/>
               </a:rPr>
-              <a:t> is based on Ubuntu Linux 12.10.</a:t>
-            </a:r>
-            <a:endParaRPr lang="en-US" sz="2800" kern="0" dirty="0">
-              <a:latin typeface="Calibri" pitchFamily="34" charset="0"/>
-            </a:endParaRPr>
+              <a:t> is based </a:t>
+            </a:r>
+            <a:r>
+              <a:rPr lang="en-US" sz="2800" kern="0" dirty="0">
+                <a:latin typeface="Calibri" pitchFamily="34" charset="0"/>
+              </a:rPr>
+              <a:t>on </a:t>
+            </a:r>
+            <a:r>
+              <a:rPr lang="en-US" sz="2800" kern="0" dirty="0" smtClean="0">
+                <a:latin typeface="Calibri" pitchFamily="34" charset="0"/>
+              </a:rPr>
+              <a:t>Ubuntu </a:t>
+            </a:r>
+            <a:r>
+              <a:rPr lang="en-US" sz="2800" kern="0" dirty="0" err="1" smtClean="0">
+                <a:latin typeface="Calibri" pitchFamily="34" charset="0"/>
+              </a:rPr>
+              <a:t>linux</a:t>
+            </a:r>
+            <a:r>
+              <a:rPr lang="en-US" sz="2800" kern="0" dirty="0" smtClean="0">
+                <a:latin typeface="Calibri" pitchFamily="34" charset="0"/>
+              </a:rPr>
+              <a:t> version 12.10.</a:t>
+            </a:r>
           </a:p>
           <a:p>
             <a:pPr marL="0" indent="0" algn="ctr" eaLnBrk="1" hangingPunct="1">
@@ -4324,6 +4327,568 @@
     <p:extLst>
       <p:ext uri="{BB962C8B-B14F-4D97-AF65-F5344CB8AC3E}">
         <p14:creationId xmlns:p14="http://schemas.microsoft.com/office/powerpoint/2010/main" val="3259724835"/>
+      </p:ext>
+    </p:extLst>
+  </p:cSld>
+  <p:clrMapOvr>
+    <a:masterClrMapping/>
+  </p:clrMapOvr>
+  <mc:AlternateContent xmlns:mc="http://schemas.openxmlformats.org/markup-compatibility/2006" xmlns:p14="http://schemas.microsoft.com/office/powerpoint/2010/main">
+    <mc:Choice Requires="p14">
+      <p:transition p14:dur="0"/>
+    </mc:Choice>
+    <mc:Fallback xmlns="">
+      <p:transition/>
+    </mc:Fallback>
+  </mc:AlternateContent>
+  <p:timing>
+    <p:tnLst>
+      <p:par>
+        <p:cTn id="1" dur="indefinite" restart="never" nodeType="tmRoot"/>
+      </p:par>
+    </p:tnLst>
+  </p:timing>
+</p:sld>
+</file>
+
+<file path=ppt/slides/slide10.xml><?xml version="1.0" encoding="utf-8"?>
+<p:sld xmlns:a="http://schemas.openxmlformats.org/drawingml/2006/main" xmlns:r="http://schemas.openxmlformats.org/officeDocument/2006/relationships" xmlns:p="http://schemas.openxmlformats.org/presentationml/2006/main">
+  <p:cSld>
+    <p:spTree>
+      <p:nvGrpSpPr>
+        <p:cNvPr id="1" name=""/>
+        <p:cNvGrpSpPr/>
+        <p:nvPr/>
+      </p:nvGrpSpPr>
+      <p:grpSpPr>
+        <a:xfrm>
+          <a:off x="0" y="0"/>
+          <a:ext cx="0" cy="0"/>
+          <a:chOff x="0" y="0"/>
+          <a:chExt cx="0" cy="0"/>
+        </a:xfrm>
+      </p:grpSpPr>
+      <p:sp>
+        <p:nvSpPr>
+          <p:cNvPr id="4" name="Slide Number Placeholder 3"/>
+          <p:cNvSpPr>
+            <a:spLocks noGrp="1"/>
+          </p:cNvSpPr>
+          <p:nvPr>
+            <p:ph type="sldNum" sz="quarter" idx="12"/>
+          </p:nvPr>
+        </p:nvSpPr>
+        <p:spPr/>
+        <p:txBody>
+          <a:bodyPr/>
+          <a:lstStyle/>
+          <a:p>
+            <a:fld id="{C71C242F-20BE-4F6C-ABA6-9DCC8641EF60}" type="slidenum">
+              <a:rPr lang="en-US" smtClean="0"/>
+              <a:pPr/>
+              <a:t>10</a:t>
+            </a:fld>
+            <a:endParaRPr lang="en-US"/>
+          </a:p>
+        </p:txBody>
+      </p:sp>
+      <p:sp>
+        <p:nvSpPr>
+          <p:cNvPr id="6" name="Title 1"/>
+          <p:cNvSpPr txBox="1">
+            <a:spLocks/>
+          </p:cNvSpPr>
+          <p:nvPr/>
+        </p:nvSpPr>
+        <p:spPr bwMode="auto">
+          <a:xfrm>
+            <a:off x="914400" y="76200"/>
+            <a:ext cx="8153400" cy="685800"/>
+          </a:xfrm>
+          <a:prstGeom prst="rect">
+            <a:avLst/>
+          </a:prstGeom>
+          <a:noFill/>
+          <a:ln w="9525">
+            <a:noFill/>
+            <a:miter lim="800000"/>
+            <a:headEnd/>
+            <a:tailEnd/>
+          </a:ln>
+        </p:spPr>
+        <p:txBody>
+          <a:bodyPr vert="horz" wrap="square" lIns="91440" tIns="45720" rIns="91440" bIns="45720" numCol="1" anchor="ctr" anchorCtr="0" compatLnSpc="1">
+            <a:prstTxWarp prst="textNoShape">
+              <a:avLst/>
+            </a:prstTxWarp>
+          </a:bodyPr>
+          <a:lstStyle>
+            <a:lvl1pPr algn="ctr" rtl="0" fontAlgn="base">
+              <a:spcBef>
+                <a:spcPct val="0"/>
+              </a:spcBef>
+              <a:spcAft>
+                <a:spcPct val="0"/>
+              </a:spcAft>
+              <a:defRPr sz="4000">
+                <a:solidFill>
+                  <a:schemeClr val="tx2"/>
+                </a:solidFill>
+                <a:latin typeface="+mj-lt"/>
+                <a:ea typeface="+mj-ea"/>
+                <a:cs typeface="+mj-cs"/>
+              </a:defRPr>
+            </a:lvl1pPr>
+            <a:lvl2pPr algn="ctr" rtl="0" fontAlgn="base">
+              <a:spcBef>
+                <a:spcPct val="0"/>
+              </a:spcBef>
+              <a:spcAft>
+                <a:spcPct val="0"/>
+              </a:spcAft>
+              <a:defRPr sz="4400">
+                <a:solidFill>
+                  <a:schemeClr val="tx2"/>
+                </a:solidFill>
+                <a:latin typeface="Arial" charset="0"/>
+                <a:ea typeface="ＭＳ Ｐゴシック" pitchFamily="1" charset="-128"/>
+              </a:defRPr>
+            </a:lvl2pPr>
+            <a:lvl3pPr algn="ctr" rtl="0" fontAlgn="base">
+              <a:spcBef>
+                <a:spcPct val="0"/>
+              </a:spcBef>
+              <a:spcAft>
+                <a:spcPct val="0"/>
+              </a:spcAft>
+              <a:defRPr sz="4400">
+                <a:solidFill>
+                  <a:schemeClr val="tx2"/>
+                </a:solidFill>
+                <a:latin typeface="Arial" charset="0"/>
+                <a:ea typeface="ＭＳ Ｐゴシック" pitchFamily="1" charset="-128"/>
+              </a:defRPr>
+            </a:lvl3pPr>
+            <a:lvl4pPr algn="ctr" rtl="0" fontAlgn="base">
+              <a:spcBef>
+                <a:spcPct val="0"/>
+              </a:spcBef>
+              <a:spcAft>
+                <a:spcPct val="0"/>
+              </a:spcAft>
+              <a:defRPr sz="4400">
+                <a:solidFill>
+                  <a:schemeClr val="tx2"/>
+                </a:solidFill>
+                <a:latin typeface="Arial" charset="0"/>
+                <a:ea typeface="ＭＳ Ｐゴシック" pitchFamily="1" charset="-128"/>
+              </a:defRPr>
+            </a:lvl4pPr>
+            <a:lvl5pPr algn="ctr" rtl="0" fontAlgn="base">
+              <a:spcBef>
+                <a:spcPct val="0"/>
+              </a:spcBef>
+              <a:spcAft>
+                <a:spcPct val="0"/>
+              </a:spcAft>
+              <a:defRPr sz="4400">
+                <a:solidFill>
+                  <a:schemeClr val="tx2"/>
+                </a:solidFill>
+                <a:latin typeface="Arial" charset="0"/>
+                <a:ea typeface="ＭＳ Ｐゴシック" pitchFamily="1" charset="-128"/>
+              </a:defRPr>
+            </a:lvl5pPr>
+            <a:lvl6pPr marL="457200" algn="ctr" rtl="0" fontAlgn="base">
+              <a:spcBef>
+                <a:spcPct val="0"/>
+              </a:spcBef>
+              <a:spcAft>
+                <a:spcPct val="0"/>
+              </a:spcAft>
+              <a:defRPr sz="4400">
+                <a:solidFill>
+                  <a:schemeClr val="tx2"/>
+                </a:solidFill>
+                <a:latin typeface="Arial" charset="0"/>
+                <a:ea typeface="ＭＳ Ｐゴシック" pitchFamily="1" charset="-128"/>
+              </a:defRPr>
+            </a:lvl6pPr>
+            <a:lvl7pPr marL="914400" algn="ctr" rtl="0" fontAlgn="base">
+              <a:spcBef>
+                <a:spcPct val="0"/>
+              </a:spcBef>
+              <a:spcAft>
+                <a:spcPct val="0"/>
+              </a:spcAft>
+              <a:defRPr sz="4400">
+                <a:solidFill>
+                  <a:schemeClr val="tx2"/>
+                </a:solidFill>
+                <a:latin typeface="Arial" charset="0"/>
+                <a:ea typeface="ＭＳ Ｐゴシック" pitchFamily="1" charset="-128"/>
+              </a:defRPr>
+            </a:lvl7pPr>
+            <a:lvl8pPr marL="1371600" algn="ctr" rtl="0" fontAlgn="base">
+              <a:spcBef>
+                <a:spcPct val="0"/>
+              </a:spcBef>
+              <a:spcAft>
+                <a:spcPct val="0"/>
+              </a:spcAft>
+              <a:defRPr sz="4400">
+                <a:solidFill>
+                  <a:schemeClr val="tx2"/>
+                </a:solidFill>
+                <a:latin typeface="Arial" charset="0"/>
+                <a:ea typeface="ＭＳ Ｐゴシック" pitchFamily="1" charset="-128"/>
+              </a:defRPr>
+            </a:lvl8pPr>
+            <a:lvl9pPr marL="1828800" algn="ctr" rtl="0" fontAlgn="base">
+              <a:spcBef>
+                <a:spcPct val="0"/>
+              </a:spcBef>
+              <a:spcAft>
+                <a:spcPct val="0"/>
+              </a:spcAft>
+              <a:defRPr sz="4400">
+                <a:solidFill>
+                  <a:schemeClr val="tx2"/>
+                </a:solidFill>
+                <a:latin typeface="Arial" charset="0"/>
+                <a:ea typeface="ＭＳ Ｐゴシック" pitchFamily="1" charset="-128"/>
+              </a:defRPr>
+            </a:lvl9pPr>
+          </a:lstStyle>
+          <a:p>
+            <a:pPr algn="l" eaLnBrk="1" hangingPunct="1"/>
+            <a:r>
+              <a:rPr lang="en-US" sz="3600" b="1" kern="0" dirty="0" smtClean="0">
+                <a:latin typeface="Calibri" pitchFamily="34" charset="0"/>
+              </a:rPr>
+              <a:t>For more help</a:t>
+            </a:r>
+            <a:endParaRPr lang="en-US" sz="3600" kern="0" dirty="0">
+              <a:latin typeface="Calibri" pitchFamily="34" charset="0"/>
+            </a:endParaRPr>
+          </a:p>
+        </p:txBody>
+      </p:sp>
+      <p:sp>
+        <p:nvSpPr>
+          <p:cNvPr id="9" name="Content Placeholder 2"/>
+          <p:cNvSpPr txBox="1">
+            <a:spLocks/>
+          </p:cNvSpPr>
+          <p:nvPr/>
+        </p:nvSpPr>
+        <p:spPr>
+          <a:xfrm>
+            <a:off x="266700" y="1143000"/>
+            <a:ext cx="8610600" cy="5410200"/>
+          </a:xfrm>
+          <a:prstGeom prst="rect">
+            <a:avLst/>
+          </a:prstGeom>
+        </p:spPr>
+        <p:txBody>
+          <a:bodyPr/>
+          <a:lstStyle>
+            <a:lvl1pPr marL="342900" indent="-342900" algn="l" rtl="0" fontAlgn="base">
+              <a:spcBef>
+                <a:spcPct val="20000"/>
+              </a:spcBef>
+              <a:spcAft>
+                <a:spcPct val="0"/>
+              </a:spcAft>
+              <a:buChar char="•"/>
+              <a:defRPr sz="3200">
+                <a:solidFill>
+                  <a:schemeClr val="tx1"/>
+                </a:solidFill>
+                <a:latin typeface="+mn-lt"/>
+                <a:ea typeface="+mn-ea"/>
+                <a:cs typeface="+mn-cs"/>
+              </a:defRPr>
+            </a:lvl1pPr>
+            <a:lvl2pPr marL="742950" indent="-285750" algn="l" rtl="0" fontAlgn="base">
+              <a:spcBef>
+                <a:spcPct val="20000"/>
+              </a:spcBef>
+              <a:spcAft>
+                <a:spcPct val="0"/>
+              </a:spcAft>
+              <a:buChar char="–"/>
+              <a:defRPr sz="2800">
+                <a:solidFill>
+                  <a:schemeClr val="tx1"/>
+                </a:solidFill>
+                <a:latin typeface="+mn-lt"/>
+                <a:ea typeface="+mn-ea"/>
+              </a:defRPr>
+            </a:lvl2pPr>
+            <a:lvl3pPr marL="1143000" indent="-228600" algn="l" rtl="0" fontAlgn="base">
+              <a:spcBef>
+                <a:spcPct val="20000"/>
+              </a:spcBef>
+              <a:spcAft>
+                <a:spcPct val="0"/>
+              </a:spcAft>
+              <a:buChar char="•"/>
+              <a:defRPr sz="2400">
+                <a:solidFill>
+                  <a:schemeClr val="tx1"/>
+                </a:solidFill>
+                <a:latin typeface="+mn-lt"/>
+                <a:ea typeface="+mn-ea"/>
+              </a:defRPr>
+            </a:lvl3pPr>
+            <a:lvl4pPr marL="1600200" indent="-228600" algn="l" rtl="0" fontAlgn="base">
+              <a:spcBef>
+                <a:spcPct val="20000"/>
+              </a:spcBef>
+              <a:spcAft>
+                <a:spcPct val="0"/>
+              </a:spcAft>
+              <a:buChar char="–"/>
+              <a:defRPr sz="2000">
+                <a:solidFill>
+                  <a:schemeClr val="tx1"/>
+                </a:solidFill>
+                <a:latin typeface="+mn-lt"/>
+                <a:ea typeface="+mn-ea"/>
+              </a:defRPr>
+            </a:lvl4pPr>
+            <a:lvl5pPr marL="2057400" indent="-228600" algn="l" rtl="0" fontAlgn="base">
+              <a:spcBef>
+                <a:spcPct val="20000"/>
+              </a:spcBef>
+              <a:spcAft>
+                <a:spcPct val="0"/>
+              </a:spcAft>
+              <a:buChar char="»"/>
+              <a:defRPr sz="2000">
+                <a:solidFill>
+                  <a:schemeClr val="tx1"/>
+                </a:solidFill>
+                <a:latin typeface="+mn-lt"/>
+                <a:ea typeface="+mn-ea"/>
+              </a:defRPr>
+            </a:lvl5pPr>
+            <a:lvl6pPr marL="2514600" indent="-228600" algn="l" rtl="0" fontAlgn="base">
+              <a:spcBef>
+                <a:spcPct val="20000"/>
+              </a:spcBef>
+              <a:spcAft>
+                <a:spcPct val="0"/>
+              </a:spcAft>
+              <a:buChar char="»"/>
+              <a:defRPr sz="2000">
+                <a:solidFill>
+                  <a:schemeClr val="tx1"/>
+                </a:solidFill>
+                <a:latin typeface="+mn-lt"/>
+                <a:ea typeface="+mn-ea"/>
+              </a:defRPr>
+            </a:lvl6pPr>
+            <a:lvl7pPr marL="2971800" indent="-228600" algn="l" rtl="0" fontAlgn="base">
+              <a:spcBef>
+                <a:spcPct val="20000"/>
+              </a:spcBef>
+              <a:spcAft>
+                <a:spcPct val="0"/>
+              </a:spcAft>
+              <a:buChar char="»"/>
+              <a:defRPr sz="2000">
+                <a:solidFill>
+                  <a:schemeClr val="tx1"/>
+                </a:solidFill>
+                <a:latin typeface="+mn-lt"/>
+                <a:ea typeface="+mn-ea"/>
+              </a:defRPr>
+            </a:lvl7pPr>
+            <a:lvl8pPr marL="3429000" indent="-228600" algn="l" rtl="0" fontAlgn="base">
+              <a:spcBef>
+                <a:spcPct val="20000"/>
+              </a:spcBef>
+              <a:spcAft>
+                <a:spcPct val="0"/>
+              </a:spcAft>
+              <a:buChar char="»"/>
+              <a:defRPr sz="2000">
+                <a:solidFill>
+                  <a:schemeClr val="tx1"/>
+                </a:solidFill>
+                <a:latin typeface="+mn-lt"/>
+                <a:ea typeface="+mn-ea"/>
+              </a:defRPr>
+            </a:lvl8pPr>
+            <a:lvl9pPr marL="3886200" indent="-228600" algn="l" rtl="0" fontAlgn="base">
+              <a:spcBef>
+                <a:spcPct val="20000"/>
+              </a:spcBef>
+              <a:spcAft>
+                <a:spcPct val="0"/>
+              </a:spcAft>
+              <a:buChar char="»"/>
+              <a:defRPr sz="2000">
+                <a:solidFill>
+                  <a:schemeClr val="tx1"/>
+                </a:solidFill>
+                <a:latin typeface="+mn-lt"/>
+                <a:ea typeface="+mn-ea"/>
+              </a:defRPr>
+            </a:lvl9pPr>
+          </a:lstStyle>
+          <a:p>
+            <a:pPr marL="0" indent="0" eaLnBrk="1" hangingPunct="1">
+              <a:spcBef>
+                <a:spcPts val="0"/>
+              </a:spcBef>
+              <a:spcAft>
+                <a:spcPts val="3000"/>
+              </a:spcAft>
+              <a:buFontTx/>
+              <a:buNone/>
+            </a:pPr>
+            <a:r>
+              <a:rPr lang="en-US" sz="2800" kern="0" dirty="0" smtClean="0">
+                <a:latin typeface="Calibri" pitchFamily="34" charset="0"/>
+              </a:rPr>
+              <a:t>Check out the </a:t>
+            </a:r>
+            <a:r>
+              <a:rPr lang="en-US" sz="2800" b="1" kern="0" dirty="0" err="1" smtClean="0">
+                <a:latin typeface="Calibri" pitchFamily="34" charset="0"/>
+              </a:rPr>
+              <a:t>bioBakery</a:t>
+            </a:r>
+            <a:r>
+              <a:rPr lang="en-US" sz="2800" kern="0" dirty="0" smtClean="0">
+                <a:latin typeface="Calibri" pitchFamily="34" charset="0"/>
+              </a:rPr>
+              <a:t> wiki for more </a:t>
+            </a:r>
+            <a:r>
+              <a:rPr lang="en-US" sz="2800" kern="0" dirty="0" smtClean="0">
+                <a:latin typeface="Calibri" pitchFamily="34" charset="0"/>
+              </a:rPr>
+              <a:t>information:</a:t>
+            </a:r>
+            <a:br>
+              <a:rPr lang="en-US" sz="2800" kern="0" dirty="0" smtClean="0">
+                <a:latin typeface="Calibri" pitchFamily="34" charset="0"/>
+              </a:rPr>
+            </a:br>
+            <a:r>
+              <a:rPr lang="en-US" sz="2200" kern="0" cap="small" dirty="0" smtClean="0">
+                <a:latin typeface="Consolas" panose="020B0609020204030204" pitchFamily="49" charset="0"/>
+                <a:cs typeface="Consolas" panose="020B0609020204030204" pitchFamily="49" charset="0"/>
+                <a:hlinkClick r:id="rId2"/>
+              </a:rPr>
+              <a:t>https</a:t>
+            </a:r>
+            <a:r>
+              <a:rPr lang="en-US" sz="2200" kern="0" cap="small" dirty="0">
+                <a:latin typeface="Consolas" panose="020B0609020204030204" pitchFamily="49" charset="0"/>
+                <a:cs typeface="Consolas" panose="020B0609020204030204" pitchFamily="49" charset="0"/>
+                <a:hlinkClick r:id="rId2"/>
+              </a:rPr>
+              <a:t>://</a:t>
+            </a:r>
+            <a:r>
+              <a:rPr lang="en-US" sz="2200" kern="0" cap="small" dirty="0" smtClean="0">
+                <a:latin typeface="Consolas" panose="020B0609020204030204" pitchFamily="49" charset="0"/>
+                <a:cs typeface="Consolas" panose="020B0609020204030204" pitchFamily="49" charset="0"/>
+                <a:hlinkClick r:id="rId2"/>
+              </a:rPr>
+              <a:t>bitbucket.org/biobakery/biobakery/wiki/biobakery_wiki</a:t>
+            </a:r>
+            <a:endParaRPr lang="en-US" sz="2200" kern="0" cap="small" dirty="0" smtClean="0">
+              <a:latin typeface="Consolas" panose="020B0609020204030204" pitchFamily="49" charset="0"/>
+              <a:cs typeface="Consolas" panose="020B0609020204030204" pitchFamily="49" charset="0"/>
+            </a:endParaRPr>
+          </a:p>
+          <a:p>
+            <a:pPr marL="0" indent="0" eaLnBrk="1" hangingPunct="1">
+              <a:spcBef>
+                <a:spcPts val="0"/>
+              </a:spcBef>
+              <a:spcAft>
+                <a:spcPts val="3000"/>
+              </a:spcAft>
+              <a:buNone/>
+            </a:pPr>
+            <a:r>
+              <a:rPr lang="en-US" sz="2800" kern="0" dirty="0" smtClean="0">
+                <a:latin typeface="Calibri" pitchFamily="34" charset="0"/>
+              </a:rPr>
+              <a:t>You </a:t>
+            </a:r>
+            <a:r>
+              <a:rPr lang="en-US" sz="2800" kern="0" dirty="0">
+                <a:latin typeface="Calibri" pitchFamily="34" charset="0"/>
+              </a:rPr>
+              <a:t>can also join and email the </a:t>
+            </a:r>
+            <a:r>
+              <a:rPr lang="en-US" sz="2800" b="1" kern="0" dirty="0" err="1">
+                <a:latin typeface="Calibri" pitchFamily="34" charset="0"/>
+              </a:rPr>
+              <a:t>bioBakery</a:t>
+            </a:r>
+            <a:r>
+              <a:rPr lang="en-US" sz="2800" kern="0" dirty="0">
+                <a:latin typeface="Calibri" pitchFamily="34" charset="0"/>
+              </a:rPr>
+              <a:t> user </a:t>
+            </a:r>
+            <a:r>
+              <a:rPr lang="en-US" sz="2800" kern="0" dirty="0" smtClean="0">
+                <a:latin typeface="Calibri" pitchFamily="34" charset="0"/>
+              </a:rPr>
+              <a:t>group:</a:t>
+            </a:r>
+            <a:br>
+              <a:rPr lang="en-US" sz="2800" kern="0" dirty="0" smtClean="0">
+                <a:latin typeface="Calibri" pitchFamily="34" charset="0"/>
+              </a:rPr>
+            </a:br>
+            <a:r>
+              <a:rPr lang="en-US" sz="2200" kern="0" cap="small" dirty="0" smtClean="0">
+                <a:latin typeface="Consolas" panose="020B0609020204030204" pitchFamily="49" charset="0"/>
+                <a:cs typeface="Consolas" panose="020B0609020204030204" pitchFamily="49" charset="0"/>
+                <a:hlinkClick r:id="rId3"/>
+              </a:rPr>
+              <a:t>biobakery-users@googlegroups.com</a:t>
+            </a:r>
+            <a:endParaRPr lang="en-US" sz="2200" kern="0" cap="small" dirty="0" smtClean="0">
+              <a:latin typeface="Consolas" panose="020B0609020204030204" pitchFamily="49" charset="0"/>
+              <a:cs typeface="Consolas" panose="020B0609020204030204" pitchFamily="49" charset="0"/>
+            </a:endParaRPr>
+          </a:p>
+          <a:p>
+            <a:pPr marL="0" indent="0" eaLnBrk="1" hangingPunct="1">
+              <a:spcBef>
+                <a:spcPts val="0"/>
+              </a:spcBef>
+              <a:spcAft>
+                <a:spcPts val="3000"/>
+              </a:spcAft>
+              <a:buFontTx/>
+              <a:buNone/>
+            </a:pPr>
+            <a:endParaRPr lang="en-US" sz="1800" kern="0" dirty="0" smtClean="0">
+              <a:latin typeface="Consolas" panose="020B0609020204030204" pitchFamily="49" charset="0"/>
+              <a:cs typeface="Consolas" panose="020B0609020204030204" pitchFamily="49" charset="0"/>
+            </a:endParaRPr>
+          </a:p>
+        </p:txBody>
+      </p:sp>
+    </p:spTree>
+    <p:extLst>
+      <p:ext uri="{BB962C8B-B14F-4D97-AF65-F5344CB8AC3E}">
+        <p14:creationId xmlns:p14="http://schemas.microsoft.com/office/powerpoint/2010/main" val="1260589068"/>
       </p:ext>
     </p:extLst>
   </p:cSld>
@@ -4764,13 +5329,7 @@
               <a:rPr lang="en-US" sz="2800" kern="0" dirty="0" smtClean="0">
                 <a:latin typeface="Calibri" pitchFamily="34" charset="0"/>
               </a:rPr>
-              <a:t>This </a:t>
-            </a:r>
-            <a:r>
-              <a:rPr lang="en-US" sz="2800" kern="0" dirty="0" smtClean="0">
-                <a:latin typeface="Calibri" pitchFamily="34" charset="0"/>
-              </a:rPr>
-              <a:t>document introduces some important details of the </a:t>
+              <a:t>This document introduces some important details of the </a:t>
             </a:r>
             <a:r>
               <a:rPr lang="en-US" sz="2800" b="1" kern="0" dirty="0" err="1" smtClean="0">
@@ -4782,13 +5341,7 @@
               <a:rPr lang="en-US" sz="2800" kern="0" dirty="0" smtClean="0">
                 <a:latin typeface="Calibri" pitchFamily="34" charset="0"/>
               </a:rPr>
-              <a:t> </a:t>
-            </a:r>
-            <a:r>
-              <a:rPr lang="en-US" sz="2800" kern="0" dirty="0" smtClean="0">
-                <a:latin typeface="Calibri" pitchFamily="34" charset="0"/>
-              </a:rPr>
-              <a:t>environment.</a:t>
+              <a:t> environment.</a:t>
             </a:r>
           </a:p>
           <a:p>
@@ -4818,13 +5371,7 @@
               <a:rPr lang="en-US" sz="2800" kern="0" dirty="0" smtClean="0">
                 <a:latin typeface="Calibri" pitchFamily="34" charset="0"/>
               </a:rPr>
-              <a:t>, please visit</a:t>
-            </a:r>
-            <a:r>
-              <a:rPr lang="en-US" sz="2800" kern="0" dirty="0" smtClean="0">
-                <a:latin typeface="Calibri" pitchFamily="34" charset="0"/>
-              </a:rPr>
-              <a:t>:</a:t>
+              <a:t>, please visit:</a:t>
             </a:r>
             <a:br>
               <a:rPr lang="en-US" sz="2800" kern="0" dirty="0" smtClean="0">
@@ -4832,14 +5379,14 @@
               </a:rPr>
             </a:br>
             <a:r>
-              <a:rPr lang="en-US" sz="2400" kern="0" dirty="0" smtClean="0">
+              <a:rPr lang="en-US" sz="2400" kern="0" cap="small" dirty="0" smtClean="0">
                 <a:latin typeface="Consolas" panose="020B0609020204030204" pitchFamily="49" charset="0"/>
                 <a:cs typeface="Consolas" panose="020B0609020204030204" pitchFamily="49" charset="0"/>
                 <a:hlinkClick r:id="rId2"/>
               </a:rPr>
               <a:t>https://bitbucket.org/biobakery/biobakery</a:t>
             </a:r>
-            <a:endParaRPr lang="en-US" sz="2400" kern="0" dirty="0" smtClean="0">
+            <a:endParaRPr lang="en-US" sz="2400" kern="0" cap="small" dirty="0" smtClean="0">
               <a:latin typeface="Consolas" panose="020B0609020204030204" pitchFamily="49" charset="0"/>
               <a:cs typeface="Consolas" panose="020B0609020204030204" pitchFamily="49" charset="0"/>
             </a:endParaRPr>
@@ -4867,14 +5414,38 @@
               </a:rPr>
             </a:br>
             <a:r>
-              <a:rPr lang="en-US" sz="2400" kern="0" dirty="0" smtClean="0">
+              <a:rPr lang="en-US" sz="2400" kern="0" cap="small" dirty="0" smtClean="0">
                 <a:latin typeface="Consolas" panose="020B0609020204030204" pitchFamily="49" charset="0"/>
                 <a:cs typeface="Consolas" panose="020B0609020204030204" pitchFamily="49" charset="0"/>
                 <a:hlinkClick r:id="rId3"/>
               </a:rPr>
-              <a:t>http://huttenhower.sph.harvard.edu/biobakery</a:t>
-            </a:r>
-            <a:endParaRPr lang="en-US" sz="2400" kern="0" dirty="0" smtClean="0">
+              <a:t>http://</a:t>
+            </a:r>
+            <a:r>
+              <a:rPr lang="en-US" sz="2400" kern="0" cap="small" dirty="0" smtClean="0">
+                <a:latin typeface="Consolas" panose="020B0609020204030204" pitchFamily="49" charset="0"/>
+                <a:cs typeface="Consolas" panose="020B0609020204030204" pitchFamily="49" charset="0"/>
+                <a:hlinkClick r:id="rId3"/>
+              </a:rPr>
+              <a:t>huttenhower.sph.harvard.edu/research</a:t>
+            </a:r>
+            <a:endParaRPr lang="en-US" sz="2400" kern="0" cap="small" dirty="0" smtClean="0">
+              <a:latin typeface="Consolas" panose="020B0609020204030204" pitchFamily="49" charset="0"/>
+              <a:cs typeface="Consolas" panose="020B0609020204030204" pitchFamily="49" charset="0"/>
+            </a:endParaRPr>
+          </a:p>
+          <a:p>
+            <a:pPr marL="0" indent="0" eaLnBrk="1" hangingPunct="1">
+              <a:spcBef>
+                <a:spcPts val="0"/>
+              </a:spcBef>
+              <a:spcAft>
+                <a:spcPts val="3000"/>
+              </a:spcAft>
+              <a:buFontTx/>
+              <a:buNone/>
+            </a:pPr>
+            <a:endParaRPr lang="en-US" sz="2400" kern="0" cap="small" dirty="0" smtClean="0">
               <a:latin typeface="Consolas" panose="020B0609020204030204" pitchFamily="49" charset="0"/>
               <a:cs typeface="Consolas" panose="020B0609020204030204" pitchFamily="49" charset="0"/>
             </a:endParaRPr>
@@ -5331,7 +5902,7 @@
                 <a:spcPts val="0"/>
               </a:spcBef>
               <a:spcAft>
-                <a:spcPts val="600"/>
+                <a:spcPts val="3000"/>
               </a:spcAft>
               <a:buFontTx/>
               <a:buNone/>
@@ -5373,22 +5944,7 @@
                 <a:spcPts val="0"/>
               </a:spcBef>
               <a:spcAft>
-                <a:spcPts val="600"/>
-              </a:spcAft>
-              <a:buFontTx/>
-              <a:buNone/>
-            </a:pPr>
-            <a:endParaRPr lang="en-US" sz="2800" kern="0" dirty="0">
-              <a:latin typeface="Calibri" pitchFamily="34" charset="0"/>
-            </a:endParaRPr>
-          </a:p>
-          <a:p>
-            <a:pPr marL="0" indent="0" eaLnBrk="1" hangingPunct="1">
-              <a:spcBef>
-                <a:spcPts val="0"/>
-              </a:spcBef>
-              <a:spcAft>
-                <a:spcPts val="600"/>
+                <a:spcPts val="3000"/>
               </a:spcAft>
               <a:buFontTx/>
               <a:buNone/>
@@ -5454,13 +6010,19 @@
               <a:rPr lang="en-US" sz="2800" kern="0" dirty="0" smtClean="0">
                 <a:latin typeface="Calibri" pitchFamily="34" charset="0"/>
               </a:rPr>
-              <a:t> </a:t>
-            </a:r>
-            <a:r>
-              <a:rPr lang="en-US" sz="2800" kern="0" dirty="0" smtClean="0">
-                <a:latin typeface="Calibri" pitchFamily="34" charset="0"/>
-              </a:rPr>
-              <a:t>in the command prompt will permanently delete the file; in </a:t>
+              <a:t> in the </a:t>
+            </a:r>
+            <a:r>
+              <a:rPr lang="en-US" sz="2800" kern="0" dirty="0" smtClean="0">
+                <a:latin typeface="Calibri" pitchFamily="34" charset="0"/>
+              </a:rPr>
+              <a:t>terminal will </a:t>
+            </a:r>
+            <a:r>
+              <a:rPr lang="en-US" sz="2800" kern="0" dirty="0" smtClean="0">
+                <a:latin typeface="Calibri" pitchFamily="34" charset="0"/>
+              </a:rPr>
+              <a:t>permanently delete the file; in </a:t>
             </a:r>
             <a:r>
               <a:rPr lang="en-US" sz="2800" b="1" kern="0" dirty="0" err="1" smtClean="0">
@@ -5472,13 +6034,14 @@
               <a:rPr lang="en-US" sz="2800" kern="0" dirty="0" smtClean="0">
                 <a:latin typeface="Calibri" pitchFamily="34" charset="0"/>
               </a:rPr>
-              <a:t>, this command moves the file to the trash.</a:t>
-            </a:r>
-            <a:br>
-              <a:rPr lang="en-US" sz="2800" kern="0" dirty="0" smtClean="0">
-                <a:latin typeface="Calibri" pitchFamily="34" charset="0"/>
-              </a:rPr>
-            </a:br>
+              <a:t>, this command moves the file to the trash</a:t>
+            </a:r>
+            <a:r>
+              <a:rPr lang="en-US" sz="2800" kern="0" dirty="0" smtClean="0">
+                <a:latin typeface="Calibri" pitchFamily="34" charset="0"/>
+              </a:rPr>
+              <a:t>. </a:t>
+            </a:r>
             <a:r>
               <a:rPr lang="en-US" sz="2800" kern="0" dirty="0" smtClean="0">
                 <a:solidFill>
@@ -5488,7 +6051,18 @@
                 </a:solidFill>
                 <a:latin typeface="Calibri" pitchFamily="34" charset="0"/>
               </a:rPr>
-              <a:t>(Use </a:t>
+              <a:t>(</a:t>
+            </a:r>
+            <a:r>
+              <a:rPr lang="en-US" sz="2800" kern="0" dirty="0" smtClean="0">
+                <a:solidFill>
+                  <a:schemeClr val="tx1">
+                    <a:lumMod val="75000"/>
+                  </a:schemeClr>
+                </a:solidFill>
+                <a:latin typeface="Calibri" pitchFamily="34" charset="0"/>
+              </a:rPr>
+              <a:t>Use </a:t>
             </a:r>
             <a:r>
               <a:rPr lang="en-US" sz="2800" b="1" kern="0" dirty="0" err="1" smtClean="0">
@@ -5538,10 +6112,10 @@
                 </a:solidFill>
                 <a:latin typeface="Calibri" pitchFamily="34" charset="0"/>
               </a:rPr>
-              <a:t> </a:t>
-            </a:r>
-            <a:r>
-              <a:rPr lang="en-US" sz="2800" kern="0" dirty="0" smtClean="0">
+              <a:t> to </a:t>
+            </a:r>
+            <a:r>
+              <a:rPr lang="en-US" sz="2800" kern="0" dirty="0">
                 <a:solidFill>
                   <a:schemeClr val="tx1">
                     <a:lumMod val="75000"/>
@@ -5549,10 +6123,10 @@
                 </a:solidFill>
                 <a:latin typeface="Calibri" pitchFamily="34" charset="0"/>
               </a:rPr>
-              <a:t>to </a:t>
-            </a:r>
-            <a:r>
-              <a:rPr lang="en-US" sz="2800" kern="0" dirty="0">
+              <a:t>delete </a:t>
+            </a:r>
+            <a:r>
+              <a:rPr lang="en-US" sz="2800" kern="0" dirty="0" smtClean="0">
                 <a:solidFill>
                   <a:schemeClr val="tx1">
                     <a:lumMod val="75000"/>
@@ -5560,7 +6134,37 @@
                 </a:solidFill>
                 <a:latin typeface="Calibri" pitchFamily="34" charset="0"/>
               </a:rPr>
-              <a:t>delete </a:t>
+              <a:t>permanently.)</a:t>
+            </a:r>
+          </a:p>
+          <a:p>
+            <a:pPr marL="0" indent="0" eaLnBrk="1" hangingPunct="1">
+              <a:spcBef>
+                <a:spcPts val="0"/>
+              </a:spcBef>
+              <a:spcAft>
+                <a:spcPts val="3000"/>
+              </a:spcAft>
+              <a:buFontTx/>
+              <a:buNone/>
+            </a:pPr>
+            <a:r>
+              <a:rPr lang="en-US" sz="2800" b="1" kern="0" dirty="0" err="1" smtClean="0">
+                <a:latin typeface="Calibri" pitchFamily="34" charset="0"/>
+              </a:rPr>
+              <a:t>bioBakery</a:t>
+            </a:r>
+            <a:r>
+              <a:rPr lang="en-US" sz="2800" kern="0" dirty="0" smtClean="0">
+                <a:latin typeface="Calibri" pitchFamily="34" charset="0"/>
+              </a:rPr>
+              <a:t> </a:t>
+            </a:r>
+            <a:r>
+              <a:rPr lang="en-US" sz="2800" kern="0" dirty="0" smtClean="0">
+                <a:latin typeface="Calibri" pitchFamily="34" charset="0"/>
+              </a:rPr>
+              <a:t>will also prompt you before overwriting a file. </a:t>
             </a:r>
             <a:r>
               <a:rPr lang="en-US" sz="2800" kern="0" dirty="0" smtClean="0">
@@ -5571,79 +6175,7 @@
                 </a:solidFill>
                 <a:latin typeface="Calibri" pitchFamily="34" charset="0"/>
               </a:rPr>
-              <a:t>permanently.)</a:t>
-            </a:r>
-          </a:p>
-          <a:p>
-            <a:pPr marL="0" indent="0" eaLnBrk="1" hangingPunct="1">
-              <a:spcBef>
-                <a:spcPts val="0"/>
-              </a:spcBef>
-              <a:spcAft>
-                <a:spcPts val="600"/>
-              </a:spcAft>
-              <a:buFontTx/>
-              <a:buNone/>
-            </a:pPr>
-            <a:endParaRPr lang="en-US" sz="2800" kern="0" dirty="0">
-              <a:latin typeface="Calibri" pitchFamily="34" charset="0"/>
-            </a:endParaRPr>
-          </a:p>
-          <a:p>
-            <a:pPr marL="0" indent="0" eaLnBrk="1" hangingPunct="1">
-              <a:spcBef>
-                <a:spcPts val="0"/>
-              </a:spcBef>
-              <a:spcAft>
-                <a:spcPts val="600"/>
-              </a:spcAft>
-              <a:buFontTx/>
-              <a:buNone/>
-            </a:pPr>
-            <a:r>
-              <a:rPr lang="en-US" sz="2800" b="1" kern="0" dirty="0" err="1" smtClean="0">
-                <a:latin typeface="Calibri" pitchFamily="34" charset="0"/>
-              </a:rPr>
-              <a:t>bioBakery</a:t>
-            </a:r>
-            <a:r>
-              <a:rPr lang="en-US" sz="2800" kern="0" dirty="0" smtClean="0">
-                <a:latin typeface="Calibri" pitchFamily="34" charset="0"/>
-              </a:rPr>
-              <a:t> will also prompt you before overwriting a file. </a:t>
-            </a:r>
-            <a:r>
-              <a:rPr lang="en-US" sz="2800" kern="0" dirty="0" smtClean="0">
-                <a:solidFill>
-                  <a:schemeClr val="tx1">
-                    <a:lumMod val="75000"/>
-                  </a:schemeClr>
-                </a:solidFill>
-                <a:latin typeface="Calibri" pitchFamily="34" charset="0"/>
-              </a:rPr>
-              <a:t>(E.g. if you attempt to </a:t>
-            </a:r>
-            <a:r>
-              <a:rPr lang="en-US" sz="2800" kern="0" dirty="0" smtClean="0">
-                <a:solidFill>
-                  <a:schemeClr val="tx1">
-                    <a:lumMod val="75000"/>
-                  </a:schemeClr>
-                </a:solidFill>
-                <a:latin typeface="Calibri" pitchFamily="34" charset="0"/>
-              </a:rPr>
-              <a:t>move or copy </a:t>
-            </a:r>
-            <a:r>
-              <a:rPr lang="en-US" sz="2800" kern="0" dirty="0" smtClean="0">
-                <a:solidFill>
-                  <a:schemeClr val="tx1">
-                    <a:lumMod val="75000"/>
-                  </a:schemeClr>
-                </a:solidFill>
-                <a:latin typeface="Calibri" pitchFamily="34" charset="0"/>
-              </a:rPr>
-              <a:t>a file to a location with an identically named file.)</a:t>
+              <a:t>(E.g. if you attempt to move or copy a file to a location with an identically named file.)</a:t>
             </a:r>
             <a:endParaRPr lang="en-US" sz="2800" kern="0" dirty="0">
               <a:solidFill>
@@ -6091,7 +6623,7 @@
                 <a:spcPts val="0"/>
               </a:spcBef>
               <a:spcAft>
-                <a:spcPts val="600"/>
+                <a:spcPts val="3000"/>
               </a:spcAft>
               <a:buFontTx/>
               <a:buNone/>
@@ -6103,7 +6635,7 @@
               <a:t>You can open a file in </a:t>
             </a:r>
             <a:r>
-              <a:rPr lang="en-US" sz="2800" kern="0" dirty="0" err="1" smtClean="0">
+              <a:rPr lang="en-US" sz="2800" b="1" kern="0" dirty="0" err="1" smtClean="0">
                 <a:latin typeface="Calibri" pitchFamily="34" charset="0"/>
               </a:rPr>
               <a:t>bioBakery</a:t>
@@ -6112,13 +6644,7 @@
               <a:rPr lang="en-US" sz="2800" kern="0" dirty="0" smtClean="0">
                 <a:latin typeface="Calibri" pitchFamily="34" charset="0"/>
               </a:rPr>
-              <a:t> </a:t>
-            </a:r>
-            <a:r>
-              <a:rPr lang="en-US" sz="2800" kern="0" dirty="0" smtClean="0">
-                <a:latin typeface="Calibri" pitchFamily="34" charset="0"/>
-              </a:rPr>
-              <a:t>by typing </a:t>
+              <a:t> by typing </a:t>
             </a:r>
             <a:r>
               <a:rPr lang="en-US" sz="2800" b="1" kern="0" dirty="0" smtClean="0">
@@ -6144,7 +6670,19 @@
               <a:rPr lang="en-US" sz="2800" kern="0" dirty="0" smtClean="0">
                 <a:latin typeface="Calibri" pitchFamily="34" charset="0"/>
               </a:rPr>
-              <a:t> at the command prompt; this will open the file in its associated default program.</a:t>
+              <a:t> </a:t>
+            </a:r>
+            <a:r>
+              <a:rPr lang="en-US" sz="2800" kern="0" dirty="0" smtClean="0">
+                <a:latin typeface="Calibri" pitchFamily="34" charset="0"/>
+              </a:rPr>
+              <a:t>in the terminal; </a:t>
+            </a:r>
+            <a:r>
+              <a:rPr lang="en-US" sz="2800" kern="0" dirty="0" smtClean="0">
+                <a:latin typeface="Calibri" pitchFamily="34" charset="0"/>
+              </a:rPr>
+              <a:t>this will open the file in its associated default program.</a:t>
             </a:r>
           </a:p>
           <a:p>
@@ -6153,33 +6691,70 @@
                 <a:spcPts val="0"/>
               </a:spcBef>
               <a:spcAft>
-                <a:spcPts val="600"/>
+                <a:spcPts val="3000"/>
               </a:spcAft>
               <a:buFontTx/>
               <a:buNone/>
             </a:pPr>
+            <a:r>
+              <a:rPr lang="en-US" sz="2800" kern="0" dirty="0" smtClean="0">
+                <a:latin typeface="Calibri" pitchFamily="34" charset="0"/>
+              </a:rPr>
+              <a:t>Right </a:t>
+            </a:r>
+            <a:r>
+              <a:rPr lang="en-US" sz="2800" kern="0" dirty="0" smtClean="0">
+                <a:latin typeface="Calibri" pitchFamily="34" charset="0"/>
+              </a:rPr>
+              <a:t>clicking on the </a:t>
+            </a:r>
+            <a:r>
+              <a:rPr lang="en-US" sz="2800" kern="0" dirty="0" smtClean="0">
+                <a:latin typeface="Calibri" pitchFamily="34" charset="0"/>
+              </a:rPr>
+              <a:t>Desktop</a:t>
+            </a:r>
+            <a:r>
+              <a:rPr lang="en-US" sz="2800" kern="0" dirty="0" smtClean="0">
+                <a:latin typeface="Calibri" pitchFamily="34" charset="0"/>
+              </a:rPr>
+              <a:t>, a folder icon, or inside of a folder will give you the option to open a </a:t>
+            </a:r>
+            <a:r>
+              <a:rPr lang="en-US" sz="2800" kern="0" dirty="0" smtClean="0">
+                <a:latin typeface="Calibri" pitchFamily="34" charset="0"/>
+              </a:rPr>
+              <a:t>terminal at </a:t>
+            </a:r>
+            <a:r>
+              <a:rPr lang="en-US" sz="2800" kern="0" dirty="0" smtClean="0">
+                <a:latin typeface="Calibri" pitchFamily="34" charset="0"/>
+              </a:rPr>
+              <a:t>that </a:t>
+            </a:r>
+            <a:r>
+              <a:rPr lang="en-US" sz="2800" kern="0" dirty="0" smtClean="0">
+                <a:latin typeface="Calibri" pitchFamily="34" charset="0"/>
+              </a:rPr>
+              <a:t>location. </a:t>
+            </a:r>
+            <a:r>
+              <a:rPr lang="en-US" sz="2800" kern="0" dirty="0" smtClean="0">
+                <a:solidFill>
+                  <a:schemeClr val="tx1">
+                    <a:lumMod val="75000"/>
+                  </a:schemeClr>
+                </a:solidFill>
+                <a:latin typeface="Calibri" pitchFamily="34" charset="0"/>
+              </a:rPr>
+              <a:t>(Select “open terminal here”)</a:t>
+            </a:r>
             <a:endParaRPr lang="en-US" sz="2800" kern="0" dirty="0">
-              <a:latin typeface="Calibri" pitchFamily="34" charset="0"/>
-            </a:endParaRPr>
-          </a:p>
-          <a:p>
-            <a:pPr marL="0" indent="0" eaLnBrk="1" hangingPunct="1">
-              <a:spcBef>
-                <a:spcPts val="0"/>
-              </a:spcBef>
-              <a:spcAft>
-                <a:spcPts val="600"/>
-              </a:spcAft>
-              <a:buFontTx/>
-              <a:buNone/>
-            </a:pPr>
-            <a:r>
-              <a:rPr lang="en-US" sz="2800" kern="0" dirty="0" smtClean="0">
-                <a:latin typeface="Calibri" pitchFamily="34" charset="0"/>
-              </a:rPr>
-              <a:t>Right clicking on the desktop, a folder icon, or inside of a folder will give you the option to open a command prompt at that location.</a:t>
-            </a:r>
-            <a:endParaRPr lang="en-US" sz="2800" kern="0" dirty="0">
+              <a:solidFill>
+                <a:schemeClr val="tx1">
+                  <a:lumMod val="75000"/>
+                </a:schemeClr>
+              </a:solidFill>
               <a:latin typeface="Calibri" pitchFamily="34" charset="0"/>
             </a:endParaRPr>
           </a:p>
@@ -6436,6 +7011,12 @@
               </a:rPr>
               <a:t>bioBakery</a:t>
             </a:r>
+            <a:r>
+              <a:rPr lang="en-US" sz="3600" b="1" kern="0" dirty="0" smtClean="0">
+                <a:latin typeface="Calibri" pitchFamily="34" charset="0"/>
+              </a:rPr>
+              <a:t> (1)</a:t>
+            </a:r>
             <a:endParaRPr lang="en-US" sz="3600" kern="0" dirty="0">
               <a:latin typeface="Calibri" pitchFamily="34" charset="0"/>
             </a:endParaRPr>
@@ -6614,7 +7195,7 @@
                 <a:spcPts val="0"/>
               </a:spcBef>
               <a:spcAft>
-                <a:spcPts val="600"/>
+                <a:spcPts val="3000"/>
               </a:spcAft>
               <a:buFontTx/>
               <a:buNone/>
@@ -6647,7 +7228,68 @@
               <a:rPr lang="en-US" sz="2800" kern="0" dirty="0" smtClean="0">
                 <a:latin typeface="Calibri" pitchFamily="34" charset="0"/>
               </a:rPr>
-              <a:t> within a window as a separate operating system (the “guest OS”).</a:t>
+              <a:t> within </a:t>
+            </a:r>
+            <a:r>
+              <a:rPr lang="en-US" sz="2800" kern="0" dirty="0" smtClean="0">
+                <a:latin typeface="Calibri" pitchFamily="34" charset="0"/>
+              </a:rPr>
+              <a:t>a window as a separate operating system (the “guest OS”).</a:t>
+            </a:r>
+          </a:p>
+          <a:p>
+            <a:pPr marL="0" indent="0" eaLnBrk="1" hangingPunct="1">
+              <a:spcBef>
+                <a:spcPts val="0"/>
+              </a:spcBef>
+              <a:spcAft>
+                <a:spcPts val="3000"/>
+              </a:spcAft>
+              <a:buFontTx/>
+              <a:buNone/>
+            </a:pPr>
+            <a:r>
+              <a:rPr lang="en-US" sz="2800" kern="0" dirty="0" smtClean="0">
+                <a:latin typeface="Calibri" pitchFamily="34" charset="0"/>
+              </a:rPr>
+              <a:t>By </a:t>
+            </a:r>
+            <a:r>
+              <a:rPr lang="en-US" sz="2800" kern="0" dirty="0" smtClean="0">
+                <a:latin typeface="Calibri" pitchFamily="34" charset="0"/>
+              </a:rPr>
+              <a:t>default, the guest OS can only see files on the host OS if they are located within the </a:t>
+            </a:r>
+            <a:r>
+              <a:rPr lang="en-US" sz="2800" kern="0" dirty="0" smtClean="0">
+                <a:latin typeface="Calibri" pitchFamily="34" charset="0"/>
+              </a:rPr>
+              <a:t>host’s </a:t>
+            </a:r>
+            <a:r>
+              <a:rPr lang="en-US" sz="2800" kern="0" dirty="0" smtClean="0">
+                <a:solidFill>
+                  <a:schemeClr val="accent5">
+                    <a:lumMod val="20000"/>
+                    <a:lumOff val="80000"/>
+                  </a:schemeClr>
+                </a:solidFill>
+                <a:latin typeface="Consolas" panose="020B0609020204030204" pitchFamily="49" charset="0"/>
+                <a:cs typeface="Consolas" panose="020B0609020204030204" pitchFamily="49" charset="0"/>
+              </a:rPr>
+              <a:t>vagrant</a:t>
+            </a:r>
+            <a:r>
+              <a:rPr lang="en-US" sz="2800" kern="0" dirty="0" smtClean="0">
+                <a:latin typeface="Calibri" pitchFamily="34" charset="0"/>
+              </a:rPr>
+              <a:t> folder</a:t>
+            </a:r>
+            <a:r>
+              <a:rPr lang="en-US" sz="2800" kern="0" dirty="0" smtClean="0">
+                <a:latin typeface="Calibri" pitchFamily="34" charset="0"/>
+              </a:rPr>
+              <a:t>.</a:t>
             </a:r>
             <a:endParaRPr lang="en-US" sz="2800" kern="0" dirty="0" smtClean="0">
               <a:latin typeface="Calibri" pitchFamily="34" charset="0"/>
@@ -6659,136 +7301,64 @@
                 <a:spcPts val="0"/>
               </a:spcBef>
               <a:spcAft>
-                <a:spcPts val="600"/>
+                <a:spcPts val="3000"/>
               </a:spcAft>
               <a:buFontTx/>
               <a:buNone/>
             </a:pPr>
-            <a:endParaRPr lang="en-US" sz="2000" kern="0" dirty="0">
-              <a:latin typeface="Calibri" pitchFamily="34" charset="0"/>
-            </a:endParaRPr>
-          </a:p>
-          <a:p>
-            <a:pPr marL="0" indent="0" eaLnBrk="1" hangingPunct="1">
-              <a:spcBef>
-                <a:spcPts val="0"/>
-              </a:spcBef>
-              <a:spcAft>
-                <a:spcPts val="600"/>
-              </a:spcAft>
-              <a:buFontTx/>
-              <a:buNone/>
-            </a:pPr>
-            <a:r>
-              <a:rPr lang="en-US" sz="2800" kern="0" dirty="0" smtClean="0">
-                <a:latin typeface="Calibri" pitchFamily="34" charset="0"/>
-              </a:rPr>
-              <a:t>By default, the guest OS </a:t>
-            </a:r>
-            <a:r>
-              <a:rPr lang="en-US" sz="2800" kern="0" dirty="0" smtClean="0">
-                <a:latin typeface="Calibri" pitchFamily="34" charset="0"/>
-              </a:rPr>
-              <a:t>can only see files on the host OS if they are located within the Vagrant folder.</a:t>
-            </a:r>
-          </a:p>
-          <a:p>
-            <a:pPr marL="0" indent="0" eaLnBrk="1" hangingPunct="1">
-              <a:spcBef>
-                <a:spcPts val="0"/>
-              </a:spcBef>
-              <a:spcAft>
-                <a:spcPts val="600"/>
-              </a:spcAft>
-              <a:buFontTx/>
-              <a:buNone/>
-            </a:pPr>
-            <a:endParaRPr lang="en-US" sz="2000" kern="0" dirty="0">
-              <a:latin typeface="Calibri" pitchFamily="34" charset="0"/>
-            </a:endParaRPr>
-          </a:p>
-          <a:p>
-            <a:pPr marL="0" indent="0" eaLnBrk="1" hangingPunct="1">
-              <a:spcBef>
-                <a:spcPts val="0"/>
-              </a:spcBef>
-              <a:spcAft>
-                <a:spcPts val="600"/>
-              </a:spcAft>
-              <a:buFontTx/>
-              <a:buNone/>
-            </a:pPr>
-            <a:r>
-              <a:rPr lang="en-US" sz="2800" kern="0" dirty="0" smtClean="0">
-                <a:latin typeface="Calibri" pitchFamily="34" charset="0"/>
-                <a:hlinkClick r:id="rId2"/>
-              </a:rPr>
-              <a:t>Click here to learn how to share additional </a:t>
-            </a:r>
-            <a:r>
-              <a:rPr lang="en-US" sz="2800" kern="0" dirty="0" smtClean="0">
-                <a:latin typeface="Calibri" pitchFamily="34" charset="0"/>
-                <a:hlinkClick r:id="rId2"/>
-              </a:rPr>
-              <a:t>folders/files from the host OS with </a:t>
-            </a:r>
-            <a:r>
-              <a:rPr lang="en-US" sz="2800" kern="0" dirty="0" err="1" smtClean="0">
-                <a:latin typeface="Calibri" pitchFamily="34" charset="0"/>
-                <a:hlinkClick r:id="rId2"/>
+            <a:r>
+              <a:rPr lang="en-US" sz="2800" kern="0" dirty="0" smtClean="0">
+                <a:latin typeface="Calibri" pitchFamily="34" charset="0"/>
+                <a:cs typeface="Consolas" panose="020B0609020204030204" pitchFamily="49" charset="0"/>
+              </a:rPr>
+              <a:t>The vagrant folder </a:t>
+            </a:r>
+            <a:r>
+              <a:rPr lang="en-US" sz="2800" kern="0" dirty="0" smtClean="0">
+                <a:latin typeface="Calibri" pitchFamily="34" charset="0"/>
+                <a:cs typeface="Consolas" panose="020B0609020204030204" pitchFamily="49" charset="0"/>
+              </a:rPr>
+              <a:t>appears in </a:t>
+            </a:r>
+            <a:r>
+              <a:rPr lang="en-US" sz="2800" b="1" kern="0" dirty="0" err="1" smtClean="0">
+                <a:latin typeface="Calibri" pitchFamily="34" charset="0"/>
+                <a:cs typeface="Consolas" panose="020B0609020204030204" pitchFamily="49" charset="0"/>
               </a:rPr>
               <a:t>bioBakery</a:t>
             </a:r>
             <a:r>
               <a:rPr lang="en-US" sz="2800" kern="0" dirty="0" smtClean="0">
                 <a:latin typeface="Calibri" pitchFamily="34" charset="0"/>
-                <a:hlinkClick r:id="rId2"/>
-              </a:rPr>
-              <a:t>.</a:t>
-            </a:r>
-            <a:endParaRPr lang="en-US" sz="2800" kern="0" dirty="0" smtClean="0">
-              <a:latin typeface="Calibri" pitchFamily="34" charset="0"/>
-            </a:endParaRPr>
-          </a:p>
-          <a:p>
-            <a:pPr marL="0" indent="0" eaLnBrk="1" hangingPunct="1">
-              <a:spcBef>
-                <a:spcPts val="0"/>
-              </a:spcBef>
-              <a:spcAft>
-                <a:spcPts val="600"/>
-              </a:spcAft>
-              <a:buFontTx/>
-              <a:buNone/>
-            </a:pPr>
-            <a:endParaRPr lang="en-US" sz="2000" kern="0" dirty="0">
-              <a:latin typeface="Calibri" pitchFamily="34" charset="0"/>
-              <a:cs typeface="Consolas" panose="020B0609020204030204" pitchFamily="49" charset="0"/>
-            </a:endParaRPr>
-          </a:p>
-          <a:p>
-            <a:pPr marL="0" indent="0" eaLnBrk="1" hangingPunct="1">
-              <a:spcBef>
-                <a:spcPts val="0"/>
-              </a:spcBef>
-              <a:spcAft>
-                <a:spcPts val="600"/>
-              </a:spcAft>
-              <a:buFontTx/>
-              <a:buNone/>
-            </a:pPr>
-            <a:r>
-              <a:rPr lang="en-US" sz="2800" kern="0" dirty="0" smtClean="0">
-                <a:latin typeface="Calibri" pitchFamily="34" charset="0"/>
                 <a:cs typeface="Consolas" panose="020B0609020204030204" pitchFamily="49" charset="0"/>
               </a:rPr>
-              <a:t>We strongly recommend saving important files to the host OS so they are available outside of </a:t>
-            </a:r>
-            <a:r>
-              <a:rPr lang="en-US" sz="2800" kern="0" dirty="0" err="1" smtClean="0">
-                <a:latin typeface="Calibri" pitchFamily="34" charset="0"/>
+              <a:t> as </a:t>
+            </a:r>
+            <a:r>
+              <a:rPr lang="en-US" sz="2800" kern="0" dirty="0" smtClean="0">
+                <a:solidFill>
+                  <a:schemeClr val="accent5">
+                    <a:lumMod val="20000"/>
+                    <a:lumOff val="80000"/>
+                  </a:schemeClr>
+                </a:solidFill>
+                <a:latin typeface="Consolas" panose="020B0609020204030204" pitchFamily="49" charset="0"/>
                 <a:cs typeface="Consolas" panose="020B0609020204030204" pitchFamily="49" charset="0"/>
               </a:rPr>
+              <a:t>/vagrant</a:t>
+            </a:r>
+            <a:r>
+              <a:rPr lang="en-US" sz="2800" kern="0" dirty="0" smtClean="0">
+                <a:latin typeface="Calibri" pitchFamily="34" charset="0"/>
+                <a:cs typeface="Consolas" panose="020B0609020204030204" pitchFamily="49" charset="0"/>
+              </a:rPr>
+              <a:t>; a shortcut to this folder appears on the </a:t>
+            </a:r>
+            <a:r>
+              <a:rPr lang="en-US" sz="2800" b="1" kern="0" dirty="0" err="1" smtClean="0">
+                <a:latin typeface="Calibri" pitchFamily="34" charset="0"/>
+                <a:cs typeface="Consolas" panose="020B0609020204030204" pitchFamily="49" charset="0"/>
+              </a:rPr>
               <a:t>bioBakery</a:t>
             </a:r>
             <a:r>
@@ -6796,19 +7366,15 @@
                 <a:latin typeface="Calibri" pitchFamily="34" charset="0"/>
                 <a:cs typeface="Consolas" panose="020B0609020204030204" pitchFamily="49" charset="0"/>
               </a:rPr>
-              <a:t>.</a:t>
-            </a:r>
-            <a:endParaRPr lang="en-US" sz="2800" kern="0" dirty="0">
-              <a:latin typeface="Consolas" panose="020B0609020204030204" pitchFamily="49" charset="0"/>
-              <a:cs typeface="Consolas" panose="020B0609020204030204" pitchFamily="49" charset="0"/>
-            </a:endParaRPr>
+              <a:t> Desktop.</a:t>
+            </a:r>
           </a:p>
         </p:txBody>
       </p:sp>
     </p:spTree>
     <p:extLst>
       <p:ext uri="{BB962C8B-B14F-4D97-AF65-F5344CB8AC3E}">
-        <p14:creationId xmlns:p14="http://schemas.microsoft.com/office/powerpoint/2010/main" val="1730739676"/>
+        <p14:creationId xmlns:p14="http://schemas.microsoft.com/office/powerpoint/2010/main" val="1527398224"/>
       </p:ext>
     </p:extLst>
   </p:cSld>
@@ -7048,7 +7614,19 @@
               <a:rPr lang="en-US" sz="3600" b="1" kern="0" dirty="0" smtClean="0">
                 <a:latin typeface="Calibri" pitchFamily="34" charset="0"/>
               </a:rPr>
-              <a:t>PATH details</a:t>
+              <a:t>Sharing files with </a:t>
+            </a:r>
+            <a:r>
+              <a:rPr lang="en-US" sz="3600" b="1" kern="0" dirty="0" err="1" smtClean="0">
+                <a:latin typeface="Calibri" pitchFamily="34" charset="0"/>
+              </a:rPr>
+              <a:t>bioBakery</a:t>
+            </a:r>
+            <a:r>
+              <a:rPr lang="en-US" sz="3600" b="1" kern="0" dirty="0" smtClean="0">
+                <a:latin typeface="Calibri" pitchFamily="34" charset="0"/>
+              </a:rPr>
+              <a:t> (2)</a:t>
             </a:r>
             <a:endParaRPr lang="en-US" sz="3600" kern="0" dirty="0">
               <a:latin typeface="Calibri" pitchFamily="34" charset="0"/>
@@ -7228,100 +7806,32 @@
                 <a:spcPts val="0"/>
               </a:spcBef>
               <a:spcAft>
-                <a:spcPts val="600"/>
+                <a:spcPts val="3000"/>
               </a:spcAft>
               <a:buFontTx/>
               <a:buNone/>
             </a:pPr>
             <a:r>
-              <a:rPr lang="en-US" sz="2800" kern="0" dirty="0" smtClean="0">
-                <a:latin typeface="Calibri" pitchFamily="34" charset="0"/>
-              </a:rPr>
-              <a:t>All programs installed by </a:t>
-            </a:r>
-            <a:r>
-              <a:rPr lang="en-US" sz="2800" kern="0" dirty="0" err="1" smtClean="0">
-                <a:latin typeface="Calibri" pitchFamily="34" charset="0"/>
-              </a:rPr>
-              <a:t>biobakery</a:t>
-            </a:r>
-            <a:r>
-              <a:rPr lang="en-US" sz="2800" kern="0" dirty="0" smtClean="0">
-                <a:latin typeface="Calibri" pitchFamily="34" charset="0"/>
-              </a:rPr>
-              <a:t> are located in:</a:t>
-            </a:r>
-          </a:p>
-          <a:p>
-            <a:pPr marL="0" indent="0" eaLnBrk="1" hangingPunct="1">
-              <a:spcBef>
-                <a:spcPts val="0"/>
-              </a:spcBef>
-              <a:spcAft>
-                <a:spcPts val="600"/>
-              </a:spcAft>
-              <a:buFontTx/>
-              <a:buNone/>
-            </a:pPr>
-            <a:r>
-              <a:rPr lang="en-US" sz="2800" kern="0" dirty="0" smtClean="0">
-                <a:solidFill>
-                  <a:schemeClr val="tx2"/>
-                </a:solidFill>
-                <a:latin typeface="Consolas" panose="020B0609020204030204" pitchFamily="49" charset="0"/>
+              <a:rPr lang="en-US" sz="2800" kern="0" dirty="0">
+                <a:latin typeface="Calibri" pitchFamily="34" charset="0"/>
                 <a:cs typeface="Consolas" panose="020B0609020204030204" pitchFamily="49" charset="0"/>
               </a:rPr>
-              <a:t>/</a:t>
-            </a:r>
-            <a:r>
-              <a:rPr lang="en-US" sz="2800" kern="0" dirty="0" err="1" smtClean="0">
-                <a:solidFill>
-                  <a:schemeClr val="tx2"/>
-                </a:solidFill>
-                <a:latin typeface="Consolas" panose="020B0609020204030204" pitchFamily="49" charset="0"/>
+              <a:t>We strongly recommend saving important files to the host OS so they are available outside of </a:t>
+            </a:r>
+            <a:r>
+              <a:rPr lang="en-US" sz="2800" b="1" kern="0" dirty="0" err="1">
+                <a:latin typeface="Calibri" pitchFamily="34" charset="0"/>
                 <a:cs typeface="Consolas" panose="020B0609020204030204" pitchFamily="49" charset="0"/>
               </a:rPr>
-              <a:t>usr</a:t>
-            </a:r>
-            <a:r>
-              <a:rPr lang="en-US" sz="2800" kern="0" dirty="0" smtClean="0">
-                <a:solidFill>
-                  <a:schemeClr val="tx2"/>
-                </a:solidFill>
-                <a:latin typeface="Consolas" panose="020B0609020204030204" pitchFamily="49" charset="0"/>
+              <a:t>bioBakery</a:t>
+            </a:r>
+            <a:r>
+              <a:rPr lang="en-US" sz="2800" kern="0" dirty="0">
+                <a:latin typeface="Calibri" pitchFamily="34" charset="0"/>
                 <a:cs typeface="Consolas" panose="020B0609020204030204" pitchFamily="49" charset="0"/>
               </a:rPr>
-              <a:t>/share/</a:t>
-            </a:r>
-            <a:r>
-              <a:rPr lang="en-US" sz="2800" kern="0" dirty="0" err="1" smtClean="0">
-                <a:solidFill>
-                  <a:schemeClr val="tx2"/>
-                </a:solidFill>
-                <a:latin typeface="Consolas" panose="020B0609020204030204" pitchFamily="49" charset="0"/>
-                <a:cs typeface="Consolas" panose="020B0609020204030204" pitchFamily="49" charset="0"/>
-              </a:rPr>
-              <a:t>biobakery</a:t>
-            </a:r>
-            <a:endParaRPr lang="en-US" sz="2800" kern="0" dirty="0" smtClean="0">
-              <a:solidFill>
-                <a:schemeClr val="tx2"/>
-              </a:solidFill>
-              <a:latin typeface="Consolas" panose="020B0609020204030204" pitchFamily="49" charset="0"/>
-              <a:cs typeface="Consolas" panose="020B0609020204030204" pitchFamily="49" charset="0"/>
-            </a:endParaRPr>
-          </a:p>
-          <a:p>
-            <a:pPr marL="0" indent="0" eaLnBrk="1" hangingPunct="1">
-              <a:spcBef>
-                <a:spcPts val="0"/>
-              </a:spcBef>
-              <a:spcAft>
-                <a:spcPts val="600"/>
-              </a:spcAft>
-              <a:buFontTx/>
-              <a:buNone/>
-            </a:pPr>
+              <a:t>.</a:t>
+            </a:r>
             <a:endParaRPr lang="en-US" sz="2800" kern="0" dirty="0">
               <a:latin typeface="Consolas" panose="020B0609020204030204" pitchFamily="49" charset="0"/>
               <a:cs typeface="Consolas" panose="020B0609020204030204" pitchFamily="49" charset="0"/>
@@ -7333,35 +7843,58 @@
                 <a:spcPts val="0"/>
               </a:spcBef>
               <a:spcAft>
-                <a:spcPts val="600"/>
+                <a:spcPts val="3000"/>
               </a:spcAft>
               <a:buFontTx/>
               <a:buNone/>
             </a:pPr>
             <a:r>
-              <a:rPr lang="en-US" sz="2800" kern="0" dirty="0">
-                <a:latin typeface="Calibri" pitchFamily="34" charset="0"/>
-              </a:rPr>
-              <a:t>Executable programs </a:t>
-            </a:r>
-            <a:r>
-              <a:rPr lang="en-US" sz="2800" kern="0" dirty="0" smtClean="0">
-                <a:latin typeface="Calibri" pitchFamily="34" charset="0"/>
-              </a:rPr>
-              <a:t>located in this folder have </a:t>
-            </a:r>
-            <a:r>
-              <a:rPr lang="en-US" sz="2800" kern="0" dirty="0">
-                <a:latin typeface="Calibri" pitchFamily="34" charset="0"/>
-              </a:rPr>
-              <a:t>been added to the </a:t>
-            </a:r>
-            <a:r>
-              <a:rPr lang="en-US" sz="2800" kern="0" dirty="0" smtClean="0">
-                <a:latin typeface="Calibri" pitchFamily="34" charset="0"/>
-              </a:rPr>
-              <a:t>PATH environment variable.</a:t>
-            </a:r>
+              <a:rPr lang="en-US" sz="2800" kern="0" dirty="0" smtClean="0">
+                <a:latin typeface="Calibri" pitchFamily="34" charset="0"/>
+              </a:rPr>
+              <a:t>You may also be interested to share additional data folders from your host OS with </a:t>
+            </a:r>
+            <a:r>
+              <a:rPr lang="en-US" sz="2800" b="1" kern="0" dirty="0" err="1" smtClean="0">
+                <a:latin typeface="Calibri" pitchFamily="34" charset="0"/>
+              </a:rPr>
+              <a:t>bioBakery</a:t>
+            </a:r>
+            <a:r>
+              <a:rPr lang="en-US" sz="2800" kern="0" dirty="0" smtClean="0">
+                <a:latin typeface="Calibri" pitchFamily="34" charset="0"/>
+              </a:rPr>
+              <a:t>. </a:t>
+            </a:r>
+            <a:br>
+              <a:rPr lang="en-US" sz="2800" kern="0" dirty="0" smtClean="0">
+                <a:latin typeface="Calibri" pitchFamily="34" charset="0"/>
+              </a:rPr>
+            </a:br>
+            <a:r>
+              <a:rPr lang="en-US" sz="2800" kern="0" cap="small" dirty="0" smtClean="0">
+                <a:latin typeface="Calibri" pitchFamily="34" charset="0"/>
+                <a:hlinkClick r:id="rId2"/>
+              </a:rPr>
+              <a:t>Click </a:t>
+            </a:r>
+            <a:r>
+              <a:rPr lang="en-US" sz="2800" kern="0" cap="small" dirty="0" smtClean="0">
+                <a:latin typeface="Calibri" pitchFamily="34" charset="0"/>
+                <a:hlinkClick r:id="rId2"/>
+              </a:rPr>
+              <a:t>here to learn </a:t>
+            </a:r>
+            <a:r>
+              <a:rPr lang="en-US" sz="2800" kern="0" cap="small" dirty="0" smtClean="0">
+                <a:latin typeface="Calibri" pitchFamily="34" charset="0"/>
+                <a:hlinkClick r:id="rId2"/>
+              </a:rPr>
+              <a:t>how</a:t>
+            </a:r>
+            <a:endParaRPr lang="en-US" sz="2800" kern="0" cap="small" dirty="0" smtClean="0">
+              <a:latin typeface="Calibri" pitchFamily="34" charset="0"/>
+            </a:endParaRPr>
           </a:p>
           <a:p>
             <a:pPr marL="0" indent="0" eaLnBrk="1" hangingPunct="1">
@@ -7369,98 +7902,14 @@
                 <a:spcPts val="0"/>
               </a:spcBef>
               <a:spcAft>
-                <a:spcPts val="600"/>
+                <a:spcPts val="3000"/>
               </a:spcAft>
               <a:buFontTx/>
               <a:buNone/>
             </a:pPr>
-            <a:endParaRPr lang="en-US" sz="2800" kern="0" dirty="0">
+            <a:endParaRPr lang="en-US" sz="2000" kern="0" dirty="0">
               <a:latin typeface="Calibri" pitchFamily="34" charset="0"/>
-            </a:endParaRPr>
-          </a:p>
-          <a:p>
-            <a:pPr marL="0" indent="0" eaLnBrk="1" hangingPunct="1">
-              <a:spcBef>
-                <a:spcPts val="0"/>
-              </a:spcBef>
-              <a:spcAft>
-                <a:spcPts val="600"/>
-              </a:spcAft>
-              <a:buFontTx/>
-              <a:buNone/>
-            </a:pPr>
-            <a:r>
-              <a:rPr lang="en-US" sz="2800" kern="0" dirty="0" smtClean="0">
-                <a:latin typeface="Calibri" pitchFamily="34" charset="0"/>
-              </a:rPr>
-              <a:t>This means that </a:t>
-            </a:r>
-            <a:r>
-              <a:rPr lang="en-US" sz="2800" kern="0" dirty="0">
-                <a:latin typeface="Calibri" pitchFamily="34" charset="0"/>
-              </a:rPr>
-              <a:t>y</a:t>
-            </a:r>
-            <a:r>
-              <a:rPr lang="en-US" sz="2800" kern="0" dirty="0" smtClean="0">
-                <a:latin typeface="Calibri" pitchFamily="34" charset="0"/>
-              </a:rPr>
-              <a:t>ou can type a command like </a:t>
-            </a:r>
-          </a:p>
-          <a:p>
-            <a:pPr marL="0" indent="0" eaLnBrk="1" hangingPunct="1">
-              <a:spcBef>
-                <a:spcPts val="0"/>
-              </a:spcBef>
-              <a:spcAft>
-                <a:spcPts val="600"/>
-              </a:spcAft>
-              <a:buFontTx/>
-              <a:buNone/>
-            </a:pPr>
-            <a:r>
-              <a:rPr lang="en-US" sz="2800" kern="0" dirty="0" smtClean="0">
-                <a:solidFill>
-                  <a:schemeClr val="tx2"/>
-                </a:solidFill>
-                <a:latin typeface="Consolas" panose="020B0609020204030204" pitchFamily="49" charset="0"/>
-                <a:cs typeface="Consolas" panose="020B0609020204030204" pitchFamily="49" charset="0"/>
-              </a:rPr>
-              <a:t>$ python metaphlan.py --help </a:t>
-            </a:r>
-          </a:p>
-          <a:p>
-            <a:pPr marL="0" indent="0" eaLnBrk="1" hangingPunct="1">
-              <a:spcBef>
-                <a:spcPts val="0"/>
-              </a:spcBef>
-              <a:spcAft>
-                <a:spcPts val="600"/>
-              </a:spcAft>
-              <a:buFontTx/>
-              <a:buNone/>
-            </a:pPr>
-            <a:r>
-              <a:rPr lang="en-US" sz="2800" kern="0" dirty="0" smtClean="0">
-                <a:latin typeface="Calibri" pitchFamily="34" charset="0"/>
-              </a:rPr>
-              <a:t>from anywhere to see </a:t>
-            </a:r>
-            <a:r>
-              <a:rPr lang="en-US" sz="2800" kern="0" dirty="0" err="1" smtClean="0">
-                <a:latin typeface="Calibri" pitchFamily="34" charset="0"/>
-              </a:rPr>
-              <a:t>MetaPhlAn’s</a:t>
-            </a:r>
-            <a:r>
-              <a:rPr lang="en-US" sz="2800" kern="0" dirty="0" smtClean="0">
-                <a:latin typeface="Calibri" pitchFamily="34" charset="0"/>
-              </a:rPr>
-              <a:t> help output.</a:t>
-            </a:r>
-            <a:endParaRPr lang="en-US" sz="2800" kern="0" dirty="0">
-              <a:latin typeface="Calibri" pitchFamily="34" charset="0"/>
+              <a:cs typeface="Consolas" panose="020B0609020204030204" pitchFamily="49" charset="0"/>
             </a:endParaRPr>
           </a:p>
         </p:txBody>
@@ -7468,7 +7917,7 @@
     </p:spTree>
     <p:extLst>
       <p:ext uri="{BB962C8B-B14F-4D97-AF65-F5344CB8AC3E}">
-        <p14:creationId xmlns:p14="http://schemas.microsoft.com/office/powerpoint/2010/main" val="1509606621"/>
+        <p14:creationId xmlns:p14="http://schemas.microsoft.com/office/powerpoint/2010/main" val="1730739676"/>
       </p:ext>
     </p:extLst>
   </p:cSld>
@@ -7708,7 +8157,7 @@
               <a:rPr lang="en-US" sz="3600" b="1" kern="0" dirty="0" smtClean="0">
                 <a:latin typeface="Calibri" pitchFamily="34" charset="0"/>
               </a:rPr>
-              <a:t>Adding/upgrading programs</a:t>
+              <a:t>PATH details</a:t>
             </a:r>
             <a:endParaRPr lang="en-US" sz="3600" kern="0" dirty="0">
               <a:latin typeface="Calibri" pitchFamily="34" charset="0"/>
@@ -7888,7 +8337,7 @@
                 <a:spcPts val="0"/>
               </a:spcBef>
               <a:spcAft>
-                <a:spcPts val="600"/>
+                <a:spcPts val="3000"/>
               </a:spcAft>
               <a:buFontTx/>
               <a:buNone/>
@@ -7897,128 +8346,57 @@
               <a:rPr lang="en-US" sz="2800" kern="0" dirty="0" smtClean="0">
                 <a:latin typeface="Calibri" pitchFamily="34" charset="0"/>
               </a:rPr>
-              <a:t>&lt;*.deb&gt; </a:t>
-            </a:r>
-            <a:r>
-              <a:rPr lang="en-US" sz="2800" kern="0" dirty="0" smtClean="0">
-                <a:latin typeface="Calibri" pitchFamily="34" charset="0"/>
-              </a:rPr>
-              <a:t>installation files are available for </a:t>
-            </a:r>
-            <a:r>
-              <a:rPr lang="en-US" sz="2800" kern="0" dirty="0" err="1" smtClean="0">
-                <a:latin typeface="Calibri" pitchFamily="34" charset="0"/>
-              </a:rPr>
-              <a:t>Huttenhower</a:t>
-            </a:r>
-            <a:r>
-              <a:rPr lang="en-US" sz="2800" kern="0" dirty="0" smtClean="0">
-                <a:latin typeface="Calibri" pitchFamily="34" charset="0"/>
-              </a:rPr>
-              <a:t> Lab tools in this repository:</a:t>
-            </a:r>
-          </a:p>
-          <a:p>
-            <a:pPr marL="0" indent="0" eaLnBrk="1" hangingPunct="1">
-              <a:spcBef>
-                <a:spcPts val="0"/>
-              </a:spcBef>
-              <a:spcAft>
-                <a:spcPts val="600"/>
-              </a:spcAft>
-              <a:buFontTx/>
-              <a:buNone/>
-            </a:pPr>
-            <a:r>
-              <a:rPr lang="en-US" sz="1800" kern="0" dirty="0">
+              <a:t>All programs installed by </a:t>
+            </a:r>
+            <a:r>
+              <a:rPr lang="en-US" sz="2800" b="1" kern="0" dirty="0" err="1" smtClean="0">
+                <a:latin typeface="Calibri" pitchFamily="34" charset="0"/>
+              </a:rPr>
+              <a:t>biobakery</a:t>
+            </a:r>
+            <a:r>
+              <a:rPr lang="en-US" sz="2800" kern="0" dirty="0" smtClean="0">
+                <a:latin typeface="Calibri" pitchFamily="34" charset="0"/>
+              </a:rPr>
+              <a:t> are located </a:t>
+            </a:r>
+            <a:r>
+              <a:rPr lang="en-US" sz="2800" kern="0" dirty="0" smtClean="0">
+                <a:latin typeface="Calibri" pitchFamily="34" charset="0"/>
+              </a:rPr>
+              <a:t>in</a:t>
+            </a:r>
+            <a:r>
+              <a:rPr lang="en-US" sz="2800" kern="0" dirty="0">
+                <a:latin typeface="Calibri" pitchFamily="34" charset="0"/>
+              </a:rPr>
+              <a:t/>
+            </a:r>
+            <a:br>
+              <a:rPr lang="en-US" sz="2800" kern="0" dirty="0">
+                <a:latin typeface="Calibri" pitchFamily="34" charset="0"/>
+              </a:rPr>
+            </a:br>
+            <a:r>
+              <a:rPr lang="en-US" sz="2800" kern="0" dirty="0" smtClean="0">
+                <a:solidFill>
+                  <a:schemeClr val="tx2"/>
+                </a:solidFill>
                 <a:latin typeface="Consolas" panose="020B0609020204030204" pitchFamily="49" charset="0"/>
                 <a:cs typeface="Consolas" panose="020B0609020204030204" pitchFamily="49" charset="0"/>
-                <a:hlinkClick r:id="rId2"/>
-              </a:rPr>
-              <a:t>http://</a:t>
-            </a:r>
-            <a:r>
-              <a:rPr lang="en-US" sz="1800" kern="0" dirty="0" smtClean="0">
+              </a:rPr>
+              <a:t>/</a:t>
+            </a:r>
+            <a:r>
+              <a:rPr lang="en-US" sz="2800" kern="0" dirty="0" err="1" smtClean="0">
+                <a:solidFill>
+                  <a:schemeClr val="tx2"/>
+                </a:solidFill>
                 <a:latin typeface="Consolas" panose="020B0609020204030204" pitchFamily="49" charset="0"/>
                 <a:cs typeface="Consolas" panose="020B0609020204030204" pitchFamily="49" charset="0"/>
-                <a:hlinkClick r:id="rId2"/>
-              </a:rPr>
-              <a:t>huttenhower.sph.harvard.edu/biobakery-shop/deb-packages</a:t>
-            </a:r>
-            <a:endParaRPr lang="en-US" sz="1800" kern="0" dirty="0" smtClean="0">
-              <a:latin typeface="Consolas" panose="020B0609020204030204" pitchFamily="49" charset="0"/>
-              <a:cs typeface="Consolas" panose="020B0609020204030204" pitchFamily="49" charset="0"/>
-            </a:endParaRPr>
-          </a:p>
-          <a:p>
-            <a:pPr marL="0" indent="0" eaLnBrk="1" hangingPunct="1">
-              <a:spcBef>
-                <a:spcPts val="0"/>
-              </a:spcBef>
-              <a:spcAft>
-                <a:spcPts val="600"/>
-              </a:spcAft>
-              <a:buFontTx/>
-              <a:buNone/>
-            </a:pPr>
-            <a:endParaRPr lang="en-US" sz="1800" kern="0" dirty="0" smtClean="0">
-              <a:latin typeface="Consolas" panose="020B0609020204030204" pitchFamily="49" charset="0"/>
-              <a:cs typeface="Consolas" panose="020B0609020204030204" pitchFamily="49" charset="0"/>
-            </a:endParaRPr>
-          </a:p>
-          <a:p>
-            <a:pPr marL="0" indent="0" eaLnBrk="1" hangingPunct="1">
-              <a:spcBef>
-                <a:spcPts val="0"/>
-              </a:spcBef>
-              <a:spcAft>
-                <a:spcPts val="600"/>
-              </a:spcAft>
-              <a:buFontTx/>
-              <a:buNone/>
-            </a:pPr>
-            <a:r>
-              <a:rPr lang="en-US" sz="2800" kern="0" dirty="0">
-                <a:latin typeface="Calibri" pitchFamily="34" charset="0"/>
-              </a:rPr>
-              <a:t>To add or upgrade a </a:t>
-            </a:r>
-            <a:r>
-              <a:rPr lang="en-US" sz="2800" kern="0" dirty="0" err="1">
-                <a:latin typeface="Calibri" pitchFamily="34" charset="0"/>
-              </a:rPr>
-              <a:t>Huttenhower</a:t>
-            </a:r>
-            <a:r>
-              <a:rPr lang="en-US" sz="2800" kern="0" dirty="0">
-                <a:latin typeface="Calibri" pitchFamily="34" charset="0"/>
-              </a:rPr>
-              <a:t> Lab </a:t>
-            </a:r>
-            <a:r>
-              <a:rPr lang="en-US" sz="2800" kern="0" dirty="0" smtClean="0">
-                <a:latin typeface="Calibri" pitchFamily="34" charset="0"/>
-              </a:rPr>
-              <a:t>tool </a:t>
-            </a:r>
-            <a:r>
-              <a:rPr lang="en-US" sz="2800" kern="0" dirty="0">
-                <a:latin typeface="Calibri" pitchFamily="34" charset="0"/>
-              </a:rPr>
-              <a:t>run:</a:t>
-            </a:r>
-          </a:p>
-          <a:p>
-            <a:pPr marL="0" indent="0" eaLnBrk="1" hangingPunct="1">
-              <a:spcBef>
-                <a:spcPts val="0"/>
-              </a:spcBef>
-              <a:spcAft>
-                <a:spcPts val="600"/>
-              </a:spcAft>
-              <a:buFontTx/>
-              <a:buNone/>
-            </a:pPr>
+              </a:rPr>
+              <a:t>usr</a:t>
+            </a:r>
             <a:r>
               <a:rPr lang="en-US" sz="2800" kern="0" dirty="0" smtClean="0">
                 <a:solidFill>
@@ -8027,7 +8405,7 @@
                 <a:latin typeface="Consolas" panose="020B0609020204030204" pitchFamily="49" charset="0"/>
                 <a:cs typeface="Consolas" panose="020B0609020204030204" pitchFamily="49" charset="0"/>
               </a:rPr>
-              <a:t>$ </a:t>
+              <a:t>/share/</a:t>
             </a:r>
             <a:r>
               <a:rPr lang="en-US" sz="2800" kern="0" dirty="0" err="1" smtClean="0">
@@ -8037,37 +8415,7 @@
                 <a:latin typeface="Consolas" panose="020B0609020204030204" pitchFamily="49" charset="0"/>
                 <a:cs typeface="Consolas" panose="020B0609020204030204" pitchFamily="49" charset="0"/>
               </a:rPr>
-              <a:t>sudo</a:t>
-            </a:r>
-            <a:r>
-              <a:rPr lang="en-US" sz="2800" kern="0" dirty="0" smtClean="0">
-                <a:solidFill>
-                  <a:schemeClr val="tx2"/>
-                </a:solidFill>
-                <a:latin typeface="Consolas" panose="020B0609020204030204" pitchFamily="49" charset="0"/>
-                <a:cs typeface="Consolas" panose="020B0609020204030204" pitchFamily="49" charset="0"/>
-              </a:rPr>
-              <a:t> </a:t>
-            </a:r>
-            <a:r>
-              <a:rPr lang="en-US" sz="2800" kern="0" dirty="0">
-                <a:solidFill>
-                  <a:schemeClr val="tx2"/>
-                </a:solidFill>
-                <a:latin typeface="Consolas" panose="020B0609020204030204" pitchFamily="49" charset="0"/>
-                <a:cs typeface="Consolas" panose="020B0609020204030204" pitchFamily="49" charset="0"/>
-              </a:rPr>
-              <a:t>apt-get install </a:t>
-            </a:r>
-            <a:r>
-              <a:rPr lang="en-US" sz="2800" i="1" kern="0" dirty="0" err="1" smtClean="0">
-                <a:solidFill>
-                  <a:schemeClr val="tx2"/>
-                </a:solidFill>
-                <a:latin typeface="Consolas" panose="020B0609020204030204" pitchFamily="49" charset="0"/>
-                <a:cs typeface="Consolas" panose="020B0609020204030204" pitchFamily="49" charset="0"/>
-              </a:rPr>
-              <a:t>hutlab_tool</a:t>
+              <a:t>biobakery</a:t>
             </a:r>
             <a:endParaRPr lang="en-US" sz="2800" kern="0" dirty="0" smtClean="0">
               <a:solidFill>
@@ -8083,18 +8431,66 @@
                 <a:spcPts val="0"/>
               </a:spcBef>
               <a:spcAft>
-                <a:spcPts val="600"/>
+                <a:spcPts val="3000"/>
               </a:spcAft>
               <a:buFontTx/>
               <a:buNone/>
             </a:pPr>
-            <a:endParaRPr lang="en-US" sz="2800" kern="0" dirty="0">
-              <a:solidFill>
-                <a:schemeClr val="tx2"/>
-              </a:solidFill>
-              <a:latin typeface="Consolas" panose="020B0609020204030204" pitchFamily="49" charset="0"/>
-              <a:cs typeface="Consolas" panose="020B0609020204030204" pitchFamily="49" charset="0"/>
-            </a:endParaRPr>
+            <a:r>
+              <a:rPr lang="en-US" sz="2800" kern="0" dirty="0" smtClean="0">
+                <a:latin typeface="Calibri" pitchFamily="34" charset="0"/>
+              </a:rPr>
+              <a:t>Executable </a:t>
+            </a:r>
+            <a:r>
+              <a:rPr lang="en-US" sz="2800" kern="0" dirty="0">
+                <a:latin typeface="Calibri" pitchFamily="34" charset="0"/>
+              </a:rPr>
+              <a:t>programs </a:t>
+            </a:r>
+            <a:r>
+              <a:rPr lang="en-US" sz="2800" kern="0" dirty="0" smtClean="0">
+                <a:latin typeface="Calibri" pitchFamily="34" charset="0"/>
+              </a:rPr>
+              <a:t>located in this folder have </a:t>
+            </a:r>
+            <a:r>
+              <a:rPr lang="en-US" sz="2800" kern="0" dirty="0">
+                <a:latin typeface="Calibri" pitchFamily="34" charset="0"/>
+              </a:rPr>
+              <a:t>been added to the </a:t>
+            </a:r>
+            <a:r>
+              <a:rPr lang="en-US" sz="2800" kern="0" dirty="0" smtClean="0">
+                <a:solidFill>
+                  <a:schemeClr val="accent5">
+                    <a:lumMod val="20000"/>
+                    <a:lumOff val="80000"/>
+                  </a:schemeClr>
+                </a:solidFill>
+                <a:latin typeface="Consolas" panose="020B0609020204030204" pitchFamily="49" charset="0"/>
+                <a:cs typeface="Consolas" panose="020B0609020204030204" pitchFamily="49" charset="0"/>
+              </a:rPr>
+              <a:t>PATH</a:t>
+            </a:r>
+            <a:r>
+              <a:rPr lang="en-US" sz="2800" kern="0" dirty="0" smtClean="0">
+                <a:solidFill>
+                  <a:schemeClr val="accent5">
+                    <a:lumMod val="20000"/>
+                    <a:lumOff val="80000"/>
+                  </a:schemeClr>
+                </a:solidFill>
+                <a:latin typeface="Calibri" pitchFamily="34" charset="0"/>
+              </a:rPr>
+              <a:t> </a:t>
+            </a:r>
+            <a:r>
+              <a:rPr lang="en-US" sz="2800" kern="0" dirty="0" smtClean="0">
+                <a:latin typeface="Calibri" pitchFamily="34" charset="0"/>
+              </a:rPr>
+              <a:t>environment variable.</a:t>
+            </a:r>
           </a:p>
           <a:p>
             <a:pPr marL="0" indent="0" eaLnBrk="1" hangingPunct="1">
@@ -8102,7 +8498,7 @@
                 <a:spcPts val="0"/>
               </a:spcBef>
               <a:spcAft>
-                <a:spcPts val="600"/>
+                <a:spcPts val="3000"/>
               </a:spcAft>
               <a:buFontTx/>
               <a:buNone/>
@@ -8111,32 +8507,37 @@
               <a:rPr lang="en-US" sz="2800" kern="0" dirty="0" smtClean="0">
                 <a:latin typeface="Calibri" pitchFamily="34" charset="0"/>
               </a:rPr>
-              <a:t>The same command can be used to install other </a:t>
-            </a:r>
-            <a:r>
-              <a:rPr lang="en-US" sz="2800" kern="0" dirty="0" err="1" smtClean="0">
-                <a:latin typeface="Calibri" pitchFamily="34" charset="0"/>
-              </a:rPr>
-              <a:t>linux</a:t>
-            </a:r>
-            <a:r>
-              <a:rPr lang="en-US" sz="2800" kern="0" dirty="0" smtClean="0">
-                <a:latin typeface="Calibri" pitchFamily="34" charset="0"/>
-              </a:rPr>
-              <a:t> utilities (these are not supported):</a:t>
-            </a:r>
-          </a:p>
-          <a:p>
-            <a:pPr marL="0" indent="0" eaLnBrk="1" hangingPunct="1">
-              <a:spcBef>
-                <a:spcPts val="0"/>
-              </a:spcBef>
-              <a:spcAft>
-                <a:spcPts val="600"/>
-              </a:spcAft>
-              <a:buFontTx/>
-              <a:buNone/>
-            </a:pPr>
+              <a:t>This </a:t>
+            </a:r>
+            <a:r>
+              <a:rPr lang="en-US" sz="2800" kern="0" dirty="0" smtClean="0">
+                <a:latin typeface="Calibri" pitchFamily="34" charset="0"/>
+              </a:rPr>
+              <a:t>means that </a:t>
+            </a:r>
+            <a:r>
+              <a:rPr lang="en-US" sz="2800" kern="0" dirty="0">
+                <a:latin typeface="Calibri" pitchFamily="34" charset="0"/>
+              </a:rPr>
+              <a:t>y</a:t>
+            </a:r>
+            <a:r>
+              <a:rPr lang="en-US" sz="2800" kern="0" dirty="0" smtClean="0">
+                <a:latin typeface="Calibri" pitchFamily="34" charset="0"/>
+              </a:rPr>
+              <a:t>ou can type a command like </a:t>
+            </a:r>
+            <a:r>
+              <a:rPr lang="en-US" sz="2800" kern="0" dirty="0" smtClean="0">
+                <a:latin typeface="Calibri" pitchFamily="34" charset="0"/>
+              </a:rPr>
+              <a:t/>
+            </a:r>
+            <a:br>
+              <a:rPr lang="en-US" sz="2800" kern="0" dirty="0" smtClean="0">
+                <a:latin typeface="Calibri" pitchFamily="34" charset="0"/>
+              </a:rPr>
+            </a:br>
             <a:r>
               <a:rPr lang="en-US" sz="2800" kern="0" dirty="0" smtClean="0">
                 <a:solidFill>
@@ -8148,14 +8549,14 @@
               <a:t>$ </a:t>
             </a:r>
             <a:r>
-              <a:rPr lang="en-US" sz="2800" kern="0" dirty="0" err="1" smtClean="0">
+              <a:rPr lang="en-US" sz="2800" kern="0" dirty="0" smtClean="0">
                 <a:solidFill>
                   <a:schemeClr val="tx2"/>
                 </a:solidFill>
                 <a:latin typeface="Consolas" panose="020B0609020204030204" pitchFamily="49" charset="0"/>
                 <a:cs typeface="Consolas" panose="020B0609020204030204" pitchFamily="49" charset="0"/>
               </a:rPr>
-              <a:t>sudo</a:t>
+              <a:t>python metaphlan.py --help </a:t>
             </a:r>
             <a:r>
               <a:rPr lang="en-US" sz="2800" kern="0" dirty="0" smtClean="0">
@@ -8165,34 +8566,43 @@
                 <a:latin typeface="Consolas" panose="020B0609020204030204" pitchFamily="49" charset="0"/>
                 <a:cs typeface="Consolas" panose="020B0609020204030204" pitchFamily="49" charset="0"/>
               </a:rPr>
-              <a:t> </a:t>
-            </a:r>
-            <a:r>
-              <a:rPr lang="en-US" sz="2800" kern="0" dirty="0">
+              <a:t/>
+            </a:r>
+            <a:br>
+              <a:rPr lang="en-US" sz="2800" kern="0" dirty="0" smtClean="0">
                 <a:solidFill>
                   <a:schemeClr val="tx2"/>
                 </a:solidFill>
                 <a:latin typeface="Consolas" panose="020B0609020204030204" pitchFamily="49" charset="0"/>
                 <a:cs typeface="Consolas" panose="020B0609020204030204" pitchFamily="49" charset="0"/>
               </a:rPr>
-              <a:t>apt-get install </a:t>
-            </a:r>
-            <a:r>
-              <a:rPr lang="en-US" sz="2800" i="1" kern="0" dirty="0" err="1" smtClean="0">
-                <a:solidFill>
-                  <a:schemeClr val="tx2"/>
-                </a:solidFill>
-                <a:latin typeface="Consolas" panose="020B0609020204030204" pitchFamily="49" charset="0"/>
-                <a:cs typeface="Consolas" panose="020B0609020204030204" pitchFamily="49" charset="0"/>
-              </a:rPr>
-              <a:t>other_utility</a:t>
+            </a:br>
+            <a:r>
+              <a:rPr lang="en-US" sz="2800" kern="0" dirty="0" smtClean="0">
+                <a:latin typeface="Calibri" pitchFamily="34" charset="0"/>
+              </a:rPr>
+              <a:t>from </a:t>
+            </a:r>
+            <a:r>
+              <a:rPr lang="en-US" sz="2800" kern="0" dirty="0" smtClean="0">
+                <a:latin typeface="Calibri" pitchFamily="34" charset="0"/>
+              </a:rPr>
+              <a:t>anywhere to see </a:t>
+            </a:r>
+            <a:r>
+              <a:rPr lang="en-US" sz="2800" kern="0" dirty="0" err="1" smtClean="0">
+                <a:latin typeface="Calibri" pitchFamily="34" charset="0"/>
+              </a:rPr>
+              <a:t>MetaPhlAn’s</a:t>
+            </a:r>
+            <a:r>
+              <a:rPr lang="en-US" sz="2800" kern="0" dirty="0" smtClean="0">
+                <a:latin typeface="Calibri" pitchFamily="34" charset="0"/>
+              </a:rPr>
+              <a:t> help output.</a:t>
             </a:r>
             <a:endParaRPr lang="en-US" sz="2800" kern="0" dirty="0">
-              <a:solidFill>
-                <a:schemeClr val="tx2"/>
-              </a:solidFill>
-              <a:latin typeface="Consolas" panose="020B0609020204030204" pitchFamily="49" charset="0"/>
-              <a:cs typeface="Consolas" panose="020B0609020204030204" pitchFamily="49" charset="0"/>
+              <a:latin typeface="Calibri" pitchFamily="34" charset="0"/>
             </a:endParaRPr>
           </a:p>
         </p:txBody>
@@ -8200,7 +8610,7 @@
     </p:spTree>
     <p:extLst>
       <p:ext uri="{BB962C8B-B14F-4D97-AF65-F5344CB8AC3E}">
-        <p14:creationId xmlns:p14="http://schemas.microsoft.com/office/powerpoint/2010/main" val="4102604449"/>
+        <p14:creationId xmlns:p14="http://schemas.microsoft.com/office/powerpoint/2010/main" val="1509606621"/>
       </p:ext>
     </p:extLst>
   </p:cSld>
@@ -8440,7 +8850,564 @@
               <a:rPr lang="en-US" sz="3600" b="1" kern="0" dirty="0" smtClean="0">
                 <a:latin typeface="Calibri" pitchFamily="34" charset="0"/>
               </a:rPr>
-              <a:t>For more help</a:t>
+              <a:t>Additional software</a:t>
+            </a:r>
+            <a:endParaRPr lang="en-US" sz="3600" kern="0" dirty="0">
+              <a:latin typeface="Calibri" pitchFamily="34" charset="0"/>
+            </a:endParaRPr>
+          </a:p>
+        </p:txBody>
+      </p:sp>
+      <p:sp>
+        <p:nvSpPr>
+          <p:cNvPr id="5" name="Content Placeholder 2"/>
+          <p:cNvSpPr txBox="1">
+            <a:spLocks/>
+          </p:cNvSpPr>
+          <p:nvPr/>
+        </p:nvSpPr>
+        <p:spPr>
+          <a:xfrm>
+            <a:off x="266700" y="1143000"/>
+            <a:ext cx="8610600" cy="5410200"/>
+          </a:xfrm>
+          <a:prstGeom prst="rect">
+            <a:avLst/>
+          </a:prstGeom>
+        </p:spPr>
+        <p:txBody>
+          <a:bodyPr/>
+          <a:lstStyle>
+            <a:lvl1pPr marL="342900" indent="-342900" algn="l" rtl="0" fontAlgn="base">
+              <a:spcBef>
+                <a:spcPct val="20000"/>
+              </a:spcBef>
+              <a:spcAft>
+                <a:spcPct val="0"/>
+              </a:spcAft>
+              <a:buChar char="•"/>
+              <a:defRPr sz="3200">
+                <a:solidFill>
+                  <a:schemeClr val="tx1"/>
+                </a:solidFill>
+                <a:latin typeface="+mn-lt"/>
+                <a:ea typeface="+mn-ea"/>
+                <a:cs typeface="+mn-cs"/>
+              </a:defRPr>
+            </a:lvl1pPr>
+            <a:lvl2pPr marL="742950" indent="-285750" algn="l" rtl="0" fontAlgn="base">
+              <a:spcBef>
+                <a:spcPct val="20000"/>
+              </a:spcBef>
+              <a:spcAft>
+                <a:spcPct val="0"/>
+              </a:spcAft>
+              <a:buChar char="–"/>
+              <a:defRPr sz="2800">
+                <a:solidFill>
+                  <a:schemeClr val="tx1"/>
+                </a:solidFill>
+                <a:latin typeface="+mn-lt"/>
+                <a:ea typeface="+mn-ea"/>
+              </a:defRPr>
+            </a:lvl2pPr>
+            <a:lvl3pPr marL="1143000" indent="-228600" algn="l" rtl="0" fontAlgn="base">
+              <a:spcBef>
+                <a:spcPct val="20000"/>
+              </a:spcBef>
+              <a:spcAft>
+                <a:spcPct val="0"/>
+              </a:spcAft>
+              <a:buChar char="•"/>
+              <a:defRPr sz="2400">
+                <a:solidFill>
+                  <a:schemeClr val="tx1"/>
+                </a:solidFill>
+                <a:latin typeface="+mn-lt"/>
+                <a:ea typeface="+mn-ea"/>
+              </a:defRPr>
+            </a:lvl3pPr>
+            <a:lvl4pPr marL="1600200" indent="-228600" algn="l" rtl="0" fontAlgn="base">
+              <a:spcBef>
+                <a:spcPct val="20000"/>
+              </a:spcBef>
+              <a:spcAft>
+                <a:spcPct val="0"/>
+              </a:spcAft>
+              <a:buChar char="–"/>
+              <a:defRPr sz="2000">
+                <a:solidFill>
+                  <a:schemeClr val="tx1"/>
+                </a:solidFill>
+                <a:latin typeface="+mn-lt"/>
+                <a:ea typeface="+mn-ea"/>
+              </a:defRPr>
+            </a:lvl4pPr>
+            <a:lvl5pPr marL="2057400" indent="-228600" algn="l" rtl="0" fontAlgn="base">
+              <a:spcBef>
+                <a:spcPct val="20000"/>
+              </a:spcBef>
+              <a:spcAft>
+                <a:spcPct val="0"/>
+              </a:spcAft>
+              <a:buChar char="»"/>
+              <a:defRPr sz="2000">
+                <a:solidFill>
+                  <a:schemeClr val="tx1"/>
+                </a:solidFill>
+                <a:latin typeface="+mn-lt"/>
+                <a:ea typeface="+mn-ea"/>
+              </a:defRPr>
+            </a:lvl5pPr>
+            <a:lvl6pPr marL="2514600" indent="-228600" algn="l" rtl="0" fontAlgn="base">
+              <a:spcBef>
+                <a:spcPct val="20000"/>
+              </a:spcBef>
+              <a:spcAft>
+                <a:spcPct val="0"/>
+              </a:spcAft>
+              <a:buChar char="»"/>
+              <a:defRPr sz="2000">
+                <a:solidFill>
+                  <a:schemeClr val="tx1"/>
+                </a:solidFill>
+                <a:latin typeface="+mn-lt"/>
+                <a:ea typeface="+mn-ea"/>
+              </a:defRPr>
+            </a:lvl6pPr>
+            <a:lvl7pPr marL="2971800" indent="-228600" algn="l" rtl="0" fontAlgn="base">
+              <a:spcBef>
+                <a:spcPct val="20000"/>
+              </a:spcBef>
+              <a:spcAft>
+                <a:spcPct val="0"/>
+              </a:spcAft>
+              <a:buChar char="»"/>
+              <a:defRPr sz="2000">
+                <a:solidFill>
+                  <a:schemeClr val="tx1"/>
+                </a:solidFill>
+                <a:latin typeface="+mn-lt"/>
+                <a:ea typeface="+mn-ea"/>
+              </a:defRPr>
+            </a:lvl7pPr>
+            <a:lvl8pPr marL="3429000" indent="-228600" algn="l" rtl="0" fontAlgn="base">
+              <a:spcBef>
+                <a:spcPct val="20000"/>
+              </a:spcBef>
+              <a:spcAft>
+                <a:spcPct val="0"/>
+              </a:spcAft>
+              <a:buChar char="»"/>
+              <a:defRPr sz="2000">
+                <a:solidFill>
+                  <a:schemeClr val="tx1"/>
+                </a:solidFill>
+                <a:latin typeface="+mn-lt"/>
+                <a:ea typeface="+mn-ea"/>
+              </a:defRPr>
+            </a:lvl8pPr>
+            <a:lvl9pPr marL="3886200" indent="-228600" algn="l" rtl="0" fontAlgn="base">
+              <a:spcBef>
+                <a:spcPct val="20000"/>
+              </a:spcBef>
+              <a:spcAft>
+                <a:spcPct val="0"/>
+              </a:spcAft>
+              <a:buChar char="»"/>
+              <a:defRPr sz="2000">
+                <a:solidFill>
+                  <a:schemeClr val="tx1"/>
+                </a:solidFill>
+                <a:latin typeface="+mn-lt"/>
+                <a:ea typeface="+mn-ea"/>
+              </a:defRPr>
+            </a:lvl9pPr>
+          </a:lstStyle>
+          <a:p>
+            <a:pPr marL="0" indent="0" eaLnBrk="1" hangingPunct="1">
+              <a:spcBef>
+                <a:spcPts val="0"/>
+              </a:spcBef>
+              <a:spcAft>
+                <a:spcPts val="3000"/>
+              </a:spcAft>
+              <a:buFontTx/>
+              <a:buNone/>
+            </a:pPr>
+            <a:r>
+              <a:rPr lang="en-US" sz="2800" kern="0" dirty="0" smtClean="0">
+                <a:latin typeface="Calibri" pitchFamily="34" charset="0"/>
+                <a:cs typeface="Consolas" panose="020B0609020204030204" pitchFamily="49" charset="0"/>
+              </a:rPr>
+              <a:t>In addition to packaging </a:t>
+            </a:r>
+            <a:r>
+              <a:rPr lang="en-US" sz="2800" kern="0" dirty="0" err="1" smtClean="0">
+                <a:latin typeface="Calibri" pitchFamily="34" charset="0"/>
+                <a:cs typeface="Consolas" panose="020B0609020204030204" pitchFamily="49" charset="0"/>
+              </a:rPr>
+              <a:t>Huttenhower</a:t>
+            </a:r>
+            <a:r>
+              <a:rPr lang="en-US" sz="2800" kern="0" dirty="0" smtClean="0">
+                <a:latin typeface="Calibri" pitchFamily="34" charset="0"/>
+                <a:cs typeface="Consolas" panose="020B0609020204030204" pitchFamily="49" charset="0"/>
+              </a:rPr>
+              <a:t> lab tools, </a:t>
+            </a:r>
+            <a:r>
+              <a:rPr lang="en-US" sz="2800" b="1" kern="0" dirty="0" err="1" smtClean="0">
+                <a:latin typeface="Calibri" pitchFamily="34" charset="0"/>
+                <a:cs typeface="Consolas" panose="020B0609020204030204" pitchFamily="49" charset="0"/>
+              </a:rPr>
+              <a:t>bioBakery</a:t>
+            </a:r>
+            <a:r>
+              <a:rPr lang="en-US" sz="2800" kern="0" dirty="0" smtClean="0">
+                <a:latin typeface="Calibri" pitchFamily="34" charset="0"/>
+                <a:cs typeface="Consolas" panose="020B0609020204030204" pitchFamily="49" charset="0"/>
+              </a:rPr>
+              <a:t> contains all of the freely-distributable dependencies of those tools (e.g. bowtie2).</a:t>
+            </a:r>
+            <a:endParaRPr lang="en-US" sz="2000" kern="0" dirty="0">
+              <a:latin typeface="Calibri" pitchFamily="34" charset="0"/>
+            </a:endParaRPr>
+          </a:p>
+          <a:p>
+            <a:pPr marL="0" indent="0" eaLnBrk="1" hangingPunct="1">
+              <a:spcBef>
+                <a:spcPts val="0"/>
+              </a:spcBef>
+              <a:spcAft>
+                <a:spcPts val="3000"/>
+              </a:spcAft>
+              <a:buFontTx/>
+              <a:buNone/>
+            </a:pPr>
+            <a:r>
+              <a:rPr lang="en-US" sz="2800" kern="0" dirty="0" smtClean="0">
+                <a:latin typeface="Calibri" pitchFamily="34" charset="0"/>
+              </a:rPr>
+              <a:t>Some additional dependencies (e.g. </a:t>
+            </a:r>
+            <a:r>
+              <a:rPr lang="en-US" sz="2800" kern="0" dirty="0">
+                <a:latin typeface="Calibri" pitchFamily="34" charset="0"/>
+                <a:cs typeface="Consolas" panose="020B0609020204030204" pitchFamily="49" charset="0"/>
+              </a:rPr>
+              <a:t>USEARCH</a:t>
+            </a:r>
+            <a:r>
+              <a:rPr lang="en-US" sz="2800" kern="0" dirty="0" smtClean="0">
+                <a:latin typeface="Calibri" pitchFamily="34" charset="0"/>
+              </a:rPr>
+              <a:t>) cannot be distributed directly with </a:t>
+            </a:r>
+            <a:r>
+              <a:rPr lang="en-US" sz="2800" b="1" kern="0" dirty="0" err="1" smtClean="0">
+                <a:latin typeface="Calibri" pitchFamily="34" charset="0"/>
+              </a:rPr>
+              <a:t>bioBakery</a:t>
+            </a:r>
+            <a:r>
+              <a:rPr lang="en-US" sz="2800" kern="0" dirty="0" smtClean="0">
+                <a:latin typeface="Calibri" pitchFamily="34" charset="0"/>
+              </a:rPr>
+              <a:t>, but are free to add if the user wishes.</a:t>
+            </a:r>
+            <a:br>
+              <a:rPr lang="en-US" sz="2800" kern="0" dirty="0" smtClean="0">
+                <a:latin typeface="Calibri" pitchFamily="34" charset="0"/>
+              </a:rPr>
+            </a:br>
+            <a:r>
+              <a:rPr lang="en-US" sz="2800" kern="0" cap="small" dirty="0" smtClean="0">
+                <a:latin typeface="Calibri" pitchFamily="34" charset="0"/>
+                <a:hlinkClick r:id="rId2"/>
+              </a:rPr>
+              <a:t>Click </a:t>
+            </a:r>
+            <a:r>
+              <a:rPr lang="en-US" sz="2800" kern="0" cap="small" dirty="0" smtClean="0">
+                <a:latin typeface="Calibri" pitchFamily="34" charset="0"/>
+                <a:hlinkClick r:id="rId2"/>
+              </a:rPr>
+              <a:t>here to learn </a:t>
+            </a:r>
+            <a:r>
+              <a:rPr lang="en-US" sz="2800" kern="0" cap="small" dirty="0" smtClean="0">
+                <a:latin typeface="Calibri" pitchFamily="34" charset="0"/>
+                <a:hlinkClick r:id="rId2"/>
+              </a:rPr>
+              <a:t>how</a:t>
+            </a:r>
+            <a:endParaRPr lang="en-US" sz="2800" kern="0" cap="small" dirty="0" smtClean="0">
+              <a:latin typeface="Calibri" pitchFamily="34" charset="0"/>
+            </a:endParaRPr>
+          </a:p>
+          <a:p>
+            <a:pPr marL="0" indent="0" eaLnBrk="1" hangingPunct="1">
+              <a:spcBef>
+                <a:spcPts val="0"/>
+              </a:spcBef>
+              <a:spcAft>
+                <a:spcPts val="3000"/>
+              </a:spcAft>
+              <a:buFontTx/>
+              <a:buNone/>
+            </a:pPr>
+            <a:endParaRPr lang="en-US" sz="2000" kern="0" dirty="0">
+              <a:latin typeface="Calibri" pitchFamily="34" charset="0"/>
+              <a:cs typeface="Consolas" panose="020B0609020204030204" pitchFamily="49" charset="0"/>
+            </a:endParaRPr>
+          </a:p>
+        </p:txBody>
+      </p:sp>
+    </p:spTree>
+    <p:extLst>
+      <p:ext uri="{BB962C8B-B14F-4D97-AF65-F5344CB8AC3E}">
+        <p14:creationId xmlns:p14="http://schemas.microsoft.com/office/powerpoint/2010/main" val="1094307962"/>
+      </p:ext>
+    </p:extLst>
+  </p:cSld>
+  <p:clrMapOvr>
+    <a:masterClrMapping/>
+  </p:clrMapOvr>
+  <mc:AlternateContent xmlns:mc="http://schemas.openxmlformats.org/markup-compatibility/2006" xmlns:p14="http://schemas.microsoft.com/office/powerpoint/2010/main">
+    <mc:Choice Requires="p14">
+      <p:transition p14:dur="0"/>
+    </mc:Choice>
+    <mc:Fallback xmlns="">
+      <p:transition/>
+    </mc:Fallback>
+  </mc:AlternateContent>
+  <p:timing>
+    <p:tnLst>
+      <p:par>
+        <p:cTn id="1" dur="indefinite" restart="never" nodeType="tmRoot"/>
+      </p:par>
+    </p:tnLst>
+  </p:timing>
+</p:sld>
+</file>
+
+<file path=ppt/slides/slide9.xml><?xml version="1.0" encoding="utf-8"?>
+<p:sld xmlns:a="http://schemas.openxmlformats.org/drawingml/2006/main" xmlns:r="http://schemas.openxmlformats.org/officeDocument/2006/relationships" xmlns:p="http://schemas.openxmlformats.org/presentationml/2006/main">
+  <p:cSld>
+    <p:spTree>
+      <p:nvGrpSpPr>
+        <p:cNvPr id="1" name=""/>
+        <p:cNvGrpSpPr/>
+        <p:nvPr/>
+      </p:nvGrpSpPr>
+      <p:grpSpPr>
+        <a:xfrm>
+          <a:off x="0" y="0"/>
+          <a:ext cx="0" cy="0"/>
+          <a:chOff x="0" y="0"/>
+          <a:chExt cx="0" cy="0"/>
+        </a:xfrm>
+      </p:grpSpPr>
+      <p:sp>
+        <p:nvSpPr>
+          <p:cNvPr id="4" name="Slide Number Placeholder 3"/>
+          <p:cNvSpPr>
+            <a:spLocks noGrp="1"/>
+          </p:cNvSpPr>
+          <p:nvPr>
+            <p:ph type="sldNum" sz="quarter" idx="12"/>
+          </p:nvPr>
+        </p:nvSpPr>
+        <p:spPr/>
+        <p:txBody>
+          <a:bodyPr/>
+          <a:lstStyle/>
+          <a:p>
+            <a:fld id="{C71C242F-20BE-4F6C-ABA6-9DCC8641EF60}" type="slidenum">
+              <a:rPr lang="en-US" smtClean="0"/>
+              <a:pPr/>
+              <a:t>9</a:t>
+            </a:fld>
+            <a:endParaRPr lang="en-US"/>
+          </a:p>
+        </p:txBody>
+      </p:sp>
+      <p:sp>
+        <p:nvSpPr>
+          <p:cNvPr id="6" name="Title 1"/>
+          <p:cNvSpPr txBox="1">
+            <a:spLocks/>
+          </p:cNvSpPr>
+          <p:nvPr/>
+        </p:nvSpPr>
+        <p:spPr bwMode="auto">
+          <a:xfrm>
+            <a:off x="914400" y="76200"/>
+            <a:ext cx="8153400" cy="685800"/>
+          </a:xfrm>
+          <a:prstGeom prst="rect">
+            <a:avLst/>
+          </a:prstGeom>
+          <a:noFill/>
+          <a:ln w="9525">
+            <a:noFill/>
+            <a:miter lim="800000"/>
+            <a:headEnd/>
+            <a:tailEnd/>
+          </a:ln>
+        </p:spPr>
+        <p:txBody>
+          <a:bodyPr vert="horz" wrap="square" lIns="91440" tIns="45720" rIns="91440" bIns="45720" numCol="1" anchor="ctr" anchorCtr="0" compatLnSpc="1">
+            <a:prstTxWarp prst="textNoShape">
+              <a:avLst/>
+            </a:prstTxWarp>
+          </a:bodyPr>
+          <a:lstStyle>
+            <a:lvl1pPr algn="ctr" rtl="0" fontAlgn="base">
+              <a:spcBef>
+                <a:spcPct val="0"/>
+              </a:spcBef>
+              <a:spcAft>
+                <a:spcPct val="0"/>
+              </a:spcAft>
+              <a:defRPr sz="4000">
+                <a:solidFill>
+                  <a:schemeClr val="tx2"/>
+                </a:solidFill>
+                <a:latin typeface="+mj-lt"/>
+                <a:ea typeface="+mj-ea"/>
+                <a:cs typeface="+mj-cs"/>
+              </a:defRPr>
+            </a:lvl1pPr>
+            <a:lvl2pPr algn="ctr" rtl="0" fontAlgn="base">
+              <a:spcBef>
+                <a:spcPct val="0"/>
+              </a:spcBef>
+              <a:spcAft>
+                <a:spcPct val="0"/>
+              </a:spcAft>
+              <a:defRPr sz="4400">
+                <a:solidFill>
+                  <a:schemeClr val="tx2"/>
+                </a:solidFill>
+                <a:latin typeface="Arial" charset="0"/>
+                <a:ea typeface="ＭＳ Ｐゴシック" pitchFamily="1" charset="-128"/>
+              </a:defRPr>
+            </a:lvl2pPr>
+            <a:lvl3pPr algn="ctr" rtl="0" fontAlgn="base">
+              <a:spcBef>
+                <a:spcPct val="0"/>
+              </a:spcBef>
+              <a:spcAft>
+                <a:spcPct val="0"/>
+              </a:spcAft>
+              <a:defRPr sz="4400">
+                <a:solidFill>
+                  <a:schemeClr val="tx2"/>
+                </a:solidFill>
+                <a:latin typeface="Arial" charset="0"/>
+                <a:ea typeface="ＭＳ Ｐゴシック" pitchFamily="1" charset="-128"/>
+              </a:defRPr>
+            </a:lvl3pPr>
+            <a:lvl4pPr algn="ctr" rtl="0" fontAlgn="base">
+              <a:spcBef>
+                <a:spcPct val="0"/>
+              </a:spcBef>
+              <a:spcAft>
+                <a:spcPct val="0"/>
+              </a:spcAft>
+              <a:defRPr sz="4400">
+                <a:solidFill>
+                  <a:schemeClr val="tx2"/>
+                </a:solidFill>
+                <a:latin typeface="Arial" charset="0"/>
+                <a:ea typeface="ＭＳ Ｐゴシック" pitchFamily="1" charset="-128"/>
+              </a:defRPr>
+            </a:lvl4pPr>
+            <a:lvl5pPr algn="ctr" rtl="0" fontAlgn="base">
+              <a:spcBef>
+                <a:spcPct val="0"/>
+              </a:spcBef>
+              <a:spcAft>
+                <a:spcPct val="0"/>
+              </a:spcAft>
+              <a:defRPr sz="4400">
+                <a:solidFill>
+                  <a:schemeClr val="tx2"/>
+                </a:solidFill>
+                <a:latin typeface="Arial" charset="0"/>
+                <a:ea typeface="ＭＳ Ｐゴシック" pitchFamily="1" charset="-128"/>
+              </a:defRPr>
+            </a:lvl5pPr>
+            <a:lvl6pPr marL="457200" algn="ctr" rtl="0" fontAlgn="base">
+              <a:spcBef>
+                <a:spcPct val="0"/>
+              </a:spcBef>
+              <a:spcAft>
+                <a:spcPct val="0"/>
+              </a:spcAft>
+              <a:defRPr sz="4400">
+                <a:solidFill>
+                  <a:schemeClr val="tx2"/>
+                </a:solidFill>
+                <a:latin typeface="Arial" charset="0"/>
+                <a:ea typeface="ＭＳ Ｐゴシック" pitchFamily="1" charset="-128"/>
+              </a:defRPr>
+            </a:lvl6pPr>
+            <a:lvl7pPr marL="914400" algn="ctr" rtl="0" fontAlgn="base">
+              <a:spcBef>
+                <a:spcPct val="0"/>
+              </a:spcBef>
+              <a:spcAft>
+                <a:spcPct val="0"/>
+              </a:spcAft>
+              <a:defRPr sz="4400">
+                <a:solidFill>
+                  <a:schemeClr val="tx2"/>
+                </a:solidFill>
+                <a:latin typeface="Arial" charset="0"/>
+                <a:ea typeface="ＭＳ Ｐゴシック" pitchFamily="1" charset="-128"/>
+              </a:defRPr>
+            </a:lvl7pPr>
+            <a:lvl8pPr marL="1371600" algn="ctr" rtl="0" fontAlgn="base">
+              <a:spcBef>
+                <a:spcPct val="0"/>
+              </a:spcBef>
+              <a:spcAft>
+                <a:spcPct val="0"/>
+              </a:spcAft>
+              <a:defRPr sz="4400">
+                <a:solidFill>
+                  <a:schemeClr val="tx2"/>
+                </a:solidFill>
+                <a:latin typeface="Arial" charset="0"/>
+                <a:ea typeface="ＭＳ Ｐゴシック" pitchFamily="1" charset="-128"/>
+              </a:defRPr>
+            </a:lvl8pPr>
+            <a:lvl9pPr marL="1828800" algn="ctr" rtl="0" fontAlgn="base">
+              <a:spcBef>
+                <a:spcPct val="0"/>
+              </a:spcBef>
+              <a:spcAft>
+                <a:spcPct val="0"/>
+              </a:spcAft>
+              <a:defRPr sz="4400">
+                <a:solidFill>
+                  <a:schemeClr val="tx2"/>
+                </a:solidFill>
+                <a:latin typeface="Arial" charset="0"/>
+                <a:ea typeface="ＭＳ Ｐゴシック" pitchFamily="1" charset="-128"/>
+              </a:defRPr>
+            </a:lvl9pPr>
+          </a:lstStyle>
+          <a:p>
+            <a:pPr algn="l" eaLnBrk="1" hangingPunct="1"/>
+            <a:r>
+              <a:rPr lang="en-US" sz="3600" b="1" kern="0" dirty="0" smtClean="0">
+                <a:latin typeface="Calibri" pitchFamily="34" charset="0"/>
+              </a:rPr>
+              <a:t>Adding/upgrading programs</a:t>
             </a:r>
             <a:endParaRPr lang="en-US" sz="3600" kern="0" dirty="0">
               <a:latin typeface="Calibri" pitchFamily="34" charset="0"/>
@@ -8620,7 +9587,7 @@
                 <a:spcPts val="0"/>
               </a:spcBef>
               <a:spcAft>
-                <a:spcPts val="600"/>
+                <a:spcPts val="3000"/>
               </a:spcAft>
               <a:buFontTx/>
               <a:buNone/>
@@ -8629,20 +9596,106 @@
               <a:rPr lang="en-US" sz="2800" kern="0" dirty="0" smtClean="0">
                 <a:latin typeface="Calibri" pitchFamily="34" charset="0"/>
               </a:rPr>
-              <a:t>Check out the </a:t>
+              <a:t>To </a:t>
+            </a:r>
+            <a:r>
+              <a:rPr lang="en-US" sz="2800" kern="0" dirty="0">
+                <a:latin typeface="Calibri" pitchFamily="34" charset="0"/>
+              </a:rPr>
+              <a:t>add or upgrade a </a:t>
+            </a:r>
+            <a:r>
+              <a:rPr lang="en-US" sz="2800" kern="0" dirty="0" err="1">
+                <a:latin typeface="Calibri" pitchFamily="34" charset="0"/>
+              </a:rPr>
+              <a:t>Huttenhower</a:t>
+            </a:r>
+            <a:r>
+              <a:rPr lang="en-US" sz="2800" kern="0" dirty="0">
+                <a:latin typeface="Calibri" pitchFamily="34" charset="0"/>
+              </a:rPr>
+              <a:t> Lab </a:t>
+            </a:r>
+            <a:r>
+              <a:rPr lang="en-US" sz="2800" kern="0" dirty="0" smtClean="0">
+                <a:latin typeface="Calibri" pitchFamily="34" charset="0"/>
+              </a:rPr>
+              <a:t>tool </a:t>
+            </a:r>
+            <a:r>
+              <a:rPr lang="en-US" sz="2800" kern="0" dirty="0">
+                <a:latin typeface="Calibri" pitchFamily="34" charset="0"/>
+              </a:rPr>
+              <a:t>run</a:t>
+            </a:r>
+            <a:r>
+              <a:rPr lang="en-US" sz="2800" kern="0" dirty="0" smtClean="0">
+                <a:latin typeface="Calibri" pitchFamily="34" charset="0"/>
+              </a:rPr>
+              <a:t>:</a:t>
+            </a:r>
+            <a:br>
+              <a:rPr lang="en-US" sz="2800" kern="0" dirty="0" smtClean="0">
+                <a:latin typeface="Calibri" pitchFamily="34" charset="0"/>
+              </a:rPr>
+            </a:br>
+            <a:r>
+              <a:rPr lang="en-US" sz="2800" kern="0" dirty="0" smtClean="0">
+                <a:solidFill>
+                  <a:schemeClr val="tx2"/>
+                </a:solidFill>
+                <a:latin typeface="Consolas" panose="020B0609020204030204" pitchFamily="49" charset="0"/>
+                <a:cs typeface="Consolas" panose="020B0609020204030204" pitchFamily="49" charset="0"/>
+              </a:rPr>
+              <a:t>$ </a:t>
             </a:r>
             <a:r>
               <a:rPr lang="en-US" sz="2800" kern="0" dirty="0" err="1" smtClean="0">
-                <a:latin typeface="Calibri" pitchFamily="34" charset="0"/>
-              </a:rPr>
-              <a:t>bioBakery</a:t>
-            </a:r>
-            <a:r>
-              <a:rPr lang="en-US" sz="2800" kern="0" dirty="0" smtClean="0">
-                <a:latin typeface="Calibri" pitchFamily="34" charset="0"/>
-              </a:rPr>
-              <a:t> wiki for more information:</a:t>
-            </a:r>
+                <a:solidFill>
+                  <a:schemeClr val="tx2"/>
+                </a:solidFill>
+                <a:latin typeface="Consolas" panose="020B0609020204030204" pitchFamily="49" charset="0"/>
+                <a:cs typeface="Consolas" panose="020B0609020204030204" pitchFamily="49" charset="0"/>
+              </a:rPr>
+              <a:t>sudo</a:t>
+            </a:r>
+            <a:r>
+              <a:rPr lang="en-US" sz="2800" kern="0" dirty="0" smtClean="0">
+                <a:solidFill>
+                  <a:schemeClr val="tx2"/>
+                </a:solidFill>
+                <a:latin typeface="Consolas" panose="020B0609020204030204" pitchFamily="49" charset="0"/>
+                <a:cs typeface="Consolas" panose="020B0609020204030204" pitchFamily="49" charset="0"/>
+              </a:rPr>
+              <a:t> </a:t>
+            </a:r>
+            <a:r>
+              <a:rPr lang="en-US" sz="2800" kern="0" dirty="0">
+                <a:solidFill>
+                  <a:schemeClr val="tx2"/>
+                </a:solidFill>
+                <a:latin typeface="Consolas" panose="020B0609020204030204" pitchFamily="49" charset="0"/>
+                <a:cs typeface="Consolas" panose="020B0609020204030204" pitchFamily="49" charset="0"/>
+              </a:rPr>
+              <a:t>apt-get install </a:t>
+            </a:r>
+            <a:r>
+              <a:rPr lang="en-US" sz="2800" i="1" kern="0" dirty="0" err="1" smtClean="0">
+                <a:solidFill>
+                  <a:schemeClr val="tx2"/>
+                </a:solidFill>
+                <a:latin typeface="Consolas" panose="020B0609020204030204" pitchFamily="49" charset="0"/>
+                <a:cs typeface="Consolas" panose="020B0609020204030204" pitchFamily="49" charset="0"/>
+              </a:rPr>
+              <a:t>hutlab_tool</a:t>
+            </a:r>
+            <a:endParaRPr lang="en-US" sz="2000" kern="0" dirty="0">
+              <a:solidFill>
+                <a:schemeClr val="tx2"/>
+              </a:solidFill>
+              <a:latin typeface="Consolas" panose="020B0609020204030204" pitchFamily="49" charset="0"/>
+              <a:cs typeface="Consolas" panose="020B0609020204030204" pitchFamily="49" charset="0"/>
+            </a:endParaRPr>
           </a:p>
           <a:p>
             <a:pPr marL="0" indent="0" eaLnBrk="1" hangingPunct="1">
@@ -8650,113 +9703,94 @@
                 <a:spcPts val="0"/>
               </a:spcBef>
               <a:spcAft>
-                <a:spcPts val="600"/>
+                <a:spcPts val="3000"/>
               </a:spcAft>
               <a:buFontTx/>
               <a:buNone/>
             </a:pPr>
             <a:r>
-              <a:rPr lang="en-US" sz="1800" kern="0" dirty="0">
+              <a:rPr lang="en-US" sz="2800" kern="0" dirty="0" smtClean="0">
+                <a:latin typeface="Calibri" pitchFamily="34" charset="0"/>
+              </a:rPr>
+              <a:t>The same command can be used to install other </a:t>
+            </a:r>
+            <a:r>
+              <a:rPr lang="en-US" sz="2800" kern="0" dirty="0" err="1" smtClean="0">
+                <a:latin typeface="Calibri" pitchFamily="34" charset="0"/>
+              </a:rPr>
+              <a:t>linux</a:t>
+            </a:r>
+            <a:r>
+              <a:rPr lang="en-US" sz="2800" kern="0" dirty="0" smtClean="0">
+                <a:latin typeface="Calibri" pitchFamily="34" charset="0"/>
+              </a:rPr>
+              <a:t> utilities </a:t>
+            </a:r>
+            <a:r>
+              <a:rPr lang="en-US" sz="2800" kern="0" dirty="0" smtClean="0">
+                <a:latin typeface="Calibri" pitchFamily="34" charset="0"/>
+              </a:rPr>
+              <a:t>(unsupported):</a:t>
+            </a:r>
+            <a:br>
+              <a:rPr lang="en-US" sz="2800" kern="0" dirty="0" smtClean="0">
+                <a:latin typeface="Calibri" pitchFamily="34" charset="0"/>
+              </a:rPr>
+            </a:br>
+            <a:r>
+              <a:rPr lang="en-US" sz="2800" kern="0" dirty="0" smtClean="0">
+                <a:solidFill>
+                  <a:schemeClr val="tx2"/>
+                </a:solidFill>
                 <a:latin typeface="Consolas" panose="020B0609020204030204" pitchFamily="49" charset="0"/>
                 <a:cs typeface="Consolas" panose="020B0609020204030204" pitchFamily="49" charset="0"/>
-                <a:hlinkClick r:id="rId2"/>
-              </a:rPr>
-              <a:t>https://</a:t>
-            </a:r>
-            <a:r>
-              <a:rPr lang="en-US" sz="1800" kern="0" dirty="0" smtClean="0">
+              </a:rPr>
+              <a:t>$ </a:t>
+            </a:r>
+            <a:r>
+              <a:rPr lang="en-US" sz="2800" kern="0" dirty="0" err="1" smtClean="0">
+                <a:solidFill>
+                  <a:schemeClr val="tx2"/>
+                </a:solidFill>
                 <a:latin typeface="Consolas" panose="020B0609020204030204" pitchFamily="49" charset="0"/>
                 <a:cs typeface="Consolas" panose="020B0609020204030204" pitchFamily="49" charset="0"/>
-                <a:hlinkClick r:id="rId2"/>
-              </a:rPr>
-              <a:t>bitbucket.org/biobakery/biobakery/wiki/biobakery_wiki</a:t>
-            </a:r>
-            <a:endParaRPr lang="en-US" sz="1800" kern="0" dirty="0" smtClean="0">
-              <a:latin typeface="Consolas" panose="020B0609020204030204" pitchFamily="49" charset="0"/>
-              <a:cs typeface="Consolas" panose="020B0609020204030204" pitchFamily="49" charset="0"/>
-            </a:endParaRPr>
-          </a:p>
-          <a:p>
-            <a:pPr marL="0" indent="0" eaLnBrk="1" hangingPunct="1">
-              <a:spcBef>
-                <a:spcPts val="0"/>
-              </a:spcBef>
-              <a:spcAft>
-                <a:spcPts val="600"/>
-              </a:spcAft>
-              <a:buFontTx/>
-              <a:buNone/>
-            </a:pPr>
-            <a:endParaRPr lang="en-US" sz="1800" kern="0" dirty="0">
-              <a:latin typeface="Consolas" panose="020B0609020204030204" pitchFamily="49" charset="0"/>
-              <a:cs typeface="Consolas" panose="020B0609020204030204" pitchFamily="49" charset="0"/>
-            </a:endParaRPr>
-          </a:p>
-          <a:p>
-            <a:pPr marL="0" indent="0" eaLnBrk="1" hangingPunct="1">
-              <a:spcBef>
-                <a:spcPts val="0"/>
-              </a:spcBef>
-              <a:spcAft>
-                <a:spcPts val="600"/>
-              </a:spcAft>
-              <a:buNone/>
-            </a:pPr>
-            <a:r>
-              <a:rPr lang="en-US" sz="2800" kern="0" dirty="0">
-                <a:latin typeface="Calibri" pitchFamily="34" charset="0"/>
-              </a:rPr>
-              <a:t>You can also join and email the </a:t>
-            </a:r>
-            <a:r>
-              <a:rPr lang="en-US" sz="2800" kern="0" dirty="0" err="1">
-                <a:latin typeface="Calibri" pitchFamily="34" charset="0"/>
-              </a:rPr>
-              <a:t>bioBakery</a:t>
-            </a:r>
-            <a:r>
-              <a:rPr lang="en-US" sz="2800" kern="0" dirty="0">
-                <a:latin typeface="Calibri" pitchFamily="34" charset="0"/>
-              </a:rPr>
-              <a:t> user group:</a:t>
-            </a:r>
-          </a:p>
-          <a:p>
-            <a:pPr marL="0" indent="0" eaLnBrk="1" hangingPunct="1">
-              <a:spcBef>
-                <a:spcPts val="0"/>
-              </a:spcBef>
-              <a:spcAft>
-                <a:spcPts val="600"/>
-              </a:spcAft>
-              <a:buFontTx/>
-              <a:buNone/>
-            </a:pPr>
-            <a:r>
-              <a:rPr lang="en-US" sz="1800" kern="0" dirty="0" smtClean="0">
+              </a:rPr>
+              <a:t>sudo</a:t>
+            </a:r>
+            <a:r>
+              <a:rPr lang="en-US" sz="2800" kern="0" dirty="0" smtClean="0">
+                <a:solidFill>
+                  <a:schemeClr val="tx2"/>
+                </a:solidFill>
                 <a:latin typeface="Consolas" panose="020B0609020204030204" pitchFamily="49" charset="0"/>
                 <a:cs typeface="Consolas" panose="020B0609020204030204" pitchFamily="49" charset="0"/>
-                <a:hlinkClick r:id="rId3"/>
-              </a:rPr>
-              <a:t>biobakery-users@googlegroups.com</a:t>
-            </a:r>
-            <a:endParaRPr lang="en-US" sz="1800" kern="0" dirty="0" smtClean="0">
-              <a:latin typeface="Consolas" panose="020B0609020204030204" pitchFamily="49" charset="0"/>
-              <a:cs typeface="Consolas" panose="020B0609020204030204" pitchFamily="49" charset="0"/>
-            </a:endParaRPr>
-          </a:p>
-          <a:p>
-            <a:pPr marL="0" indent="0" eaLnBrk="1" hangingPunct="1">
-              <a:spcBef>
-                <a:spcPts val="0"/>
-              </a:spcBef>
-              <a:spcAft>
-                <a:spcPts val="600"/>
-              </a:spcAft>
-              <a:buFontTx/>
-              <a:buNone/>
-            </a:pPr>
-            <a:endParaRPr lang="en-US" sz="1800" kern="0" dirty="0" smtClean="0">
+              </a:rPr>
+              <a:t> </a:t>
+            </a:r>
+            <a:r>
+              <a:rPr lang="en-US" sz="2800" kern="0" dirty="0">
+                <a:solidFill>
+                  <a:schemeClr val="tx2"/>
+                </a:solidFill>
+                <a:latin typeface="Consolas" panose="020B0609020204030204" pitchFamily="49" charset="0"/>
+                <a:cs typeface="Consolas" panose="020B0609020204030204" pitchFamily="49" charset="0"/>
+              </a:rPr>
+              <a:t>apt-get install </a:t>
+            </a:r>
+            <a:r>
+              <a:rPr lang="en-US" sz="2800" i="1" kern="0" dirty="0" err="1" smtClean="0">
+                <a:solidFill>
+                  <a:schemeClr val="tx2"/>
+                </a:solidFill>
+                <a:latin typeface="Consolas" panose="020B0609020204030204" pitchFamily="49" charset="0"/>
+                <a:cs typeface="Consolas" panose="020B0609020204030204" pitchFamily="49" charset="0"/>
+              </a:rPr>
+              <a:t>other_utility</a:t>
+            </a:r>
+            <a:endParaRPr lang="en-US" sz="2800" kern="0" dirty="0">
+              <a:solidFill>
+                <a:schemeClr val="tx2"/>
+              </a:solidFill>
               <a:latin typeface="Consolas" panose="020B0609020204030204" pitchFamily="49" charset="0"/>
               <a:cs typeface="Consolas" panose="020B0609020204030204" pitchFamily="49" charset="0"/>
             </a:endParaRPr>
@@ -8766,7 +9800,7 @@
     </p:spTree>
     <p:extLst>
       <p:ext uri="{BB962C8B-B14F-4D97-AF65-F5344CB8AC3E}">
-        <p14:creationId xmlns:p14="http://schemas.microsoft.com/office/powerpoint/2010/main" val="1260589068"/>
+        <p14:creationId xmlns:p14="http://schemas.microsoft.com/office/powerpoint/2010/main" val="4102604449"/>
       </p:ext>
     </p:extLst>
   </p:cSld>

</xml_diff>

<commit_message>
Update the welcome files to reflect the latest version (ie ubuntu 16.04 and brew without sudo)
</commit_message>
<xml_diff>
--- a/vagrant/biobakery-gui/WELCOME.pptx
+++ b/vagrant/biobakery-gui/WELCOME.pptx
@@ -11444,7 +11444,7 @@
       </p:sp>
       <p:pic>
         <p:nvPicPr>
-          <p:cNvPr id="11" name="Shape 11"/>
+          <p:cNvPr descr="C:\Documents and Settings\eblis\My Documents\My Dropbox\working\website_09-27-09\logo_big.png" id="11" name="Shape 11"/>
           <p:cNvPicPr preferRelativeResize="0"/>
           <p:nvPr/>
         </p:nvPicPr>
@@ -12249,7 +12249,7 @@
                 <a:cs typeface="Calibri"/>
                 <a:sym typeface="Calibri"/>
               </a:rPr>
-              <a:t>5</a:t>
+              <a:t>6.04 LTS</a:t>
             </a:r>
             <a:r>
               <a:rPr b="0" i="0" lang="en-US" sz="2800" u="none" cap="none" strike="noStrike">
@@ -12261,7 +12261,31 @@
                 <a:cs typeface="Calibri"/>
                 <a:sym typeface="Calibri"/>
               </a:rPr>
-              <a:t>.10 (Wily Werewolf).</a:t>
+              <a:t> </a:t>
+            </a:r>
+            <a:r>
+              <a:rPr lang="en-US" sz="2800">
+                <a:solidFill>
+                  <a:schemeClr val="lt1"/>
+                </a:solidFill>
+                <a:latin typeface="Calibri"/>
+                <a:ea typeface="Calibri"/>
+                <a:cs typeface="Calibri"/>
+                <a:sym typeface="Calibri"/>
+              </a:rPr>
+              <a:t>(Xenial Xerus</a:t>
+            </a:r>
+            <a:r>
+              <a:rPr b="0" i="0" lang="en-US" sz="2800" u="none" cap="none" strike="noStrike">
+                <a:solidFill>
+                  <a:schemeClr val="lt1"/>
+                </a:solidFill>
+                <a:latin typeface="Calibri"/>
+                <a:ea typeface="Calibri"/>
+                <a:cs typeface="Calibri"/>
+                <a:sym typeface="Calibri"/>
+              </a:rPr>
+              <a:t>).</a:t>
             </a:r>
           </a:p>
           <a:p>
@@ -12325,9 +12349,6 @@
   <p:clrMapOvr>
     <a:masterClrMapping/>
   </p:clrMapOvr>
-  <p:transition spd="slow">
-    <p:fade/>
-  </p:transition>
 </p:sld>
 </file>
 
@@ -12660,9 +12681,6 @@
   <p:clrMapOvr>
     <a:masterClrMapping/>
   </p:clrMapOvr>
-  <p:transition spd="slow">
-    <p:fade/>
-  </p:transition>
 </p:sld>
 </file>
 
@@ -13058,9 +13076,6 @@
   <p:clrMapOvr>
     <a:masterClrMapping/>
   </p:clrMapOvr>
-  <p:transition spd="slow">
-    <p:fade/>
-  </p:transition>
 </p:sld>
 </file>
 
@@ -13454,9 +13469,6 @@
   <p:clrMapOvr>
     <a:masterClrMapping/>
   </p:clrMapOvr>
-  <p:transition spd="slow">
-    <p:fade/>
-  </p:transition>
 </p:sld>
 </file>
 
@@ -13738,9 +13750,6 @@
   <p:clrMapOvr>
     <a:masterClrMapping/>
   </p:clrMapOvr>
-  <p:transition spd="slow">
-    <p:fade/>
-  </p:transition>
 </p:sld>
 </file>
 
@@ -14064,31 +14073,7 @@
                 <a:cs typeface="Calibri"/>
                 <a:sym typeface="Calibri"/>
               </a:rPr>
-              <a:t>; a shortcut to this folder appears on the </a:t>
-            </a:r>
-            <a:r>
-              <a:rPr b="1" i="0" lang="en-US" sz="2800" u="none" cap="none" strike="noStrike">
-                <a:solidFill>
-                  <a:schemeClr val="lt1"/>
-                </a:solidFill>
-                <a:latin typeface="Calibri"/>
-                <a:ea typeface="Calibri"/>
-                <a:cs typeface="Calibri"/>
-                <a:sym typeface="Calibri"/>
-              </a:rPr>
-              <a:t>bioBakery</a:t>
-            </a:r>
-            <a:r>
-              <a:rPr b="0" i="0" lang="en-US" sz="2800" u="none" cap="none" strike="noStrike">
-                <a:solidFill>
-                  <a:schemeClr val="lt1"/>
-                </a:solidFill>
-                <a:latin typeface="Calibri"/>
-                <a:ea typeface="Calibri"/>
-                <a:cs typeface="Calibri"/>
-                <a:sym typeface="Calibri"/>
-              </a:rPr>
-              <a:t> Desktop.</a:t>
+              <a:t>.</a:t>
             </a:r>
           </a:p>
         </p:txBody>
@@ -14098,9 +14083,6 @@
   <p:clrMapOvr>
     <a:masterClrMapping/>
   </p:clrMapOvr>
-  <p:transition spd="slow">
-    <p:fade/>
-  </p:transition>
 </p:sld>
 </file>
 
@@ -14409,9 +14391,6 @@
   <p:clrMapOvr>
     <a:masterClrMapping/>
   </p:clrMapOvr>
-  <p:transition spd="slow">
-    <p:fade/>
-  </p:transition>
 </p:sld>
 </file>
 
@@ -14886,9 +14865,6 @@
   <p:clrMapOvr>
     <a:masterClrMapping/>
   </p:clrMapOvr>
-  <p:transition spd="slow">
-    <p:fade/>
-  </p:transition>
 </p:sld>
 </file>
 
@@ -15281,9 +15257,6 @@
   <p:clrMapOvr>
     <a:masterClrMapping/>
   </p:clrMapOvr>
-  <p:transition spd="slow">
-    <p:fade/>
-  </p:transition>
 </p:sld>
 </file>
 
@@ -15502,7 +15475,7 @@
                 <a:cs typeface="Consolas"/>
                 <a:sym typeface="Consolas"/>
               </a:rPr>
-              <a:t>$ sudo </a:t>
+              <a:t>$ </a:t>
             </a:r>
             <a:r>
               <a:rPr lang="en-US" sz="2800">
@@ -15669,7 +15642,7 @@
                 <a:cs typeface="Consolas"/>
                 <a:sym typeface="Consolas"/>
               </a:rPr>
-              <a:t>$ sudo brew install </a:t>
+              <a:t>$ brew install </a:t>
             </a:r>
             <a:r>
               <a:rPr i="1" lang="en-US" sz="2800">
@@ -15744,9 +15717,6 @@
   <p:clrMapOvr>
     <a:masterClrMapping/>
   </p:clrMapOvr>
-  <p:transition spd="slow">
-    <p:fade/>
-  </p:transition>
 </p:sld>
 </file>
 

</xml_diff>